<commit_message>
removed comments from presentation
</commit_message>
<xml_diff>
--- a/docs/zpp_final_presentation.pptx
+++ b/docs/zpp_final_presentation.pptx
@@ -2,41 +2,41 @@
 <file path=ppt/presentation.xml><?xml version="1.0" encoding="utf-8"?>
 <p:presentation xmlns:a="http://schemas.openxmlformats.org/drawingml/2006/main" xmlns:r="http://schemas.openxmlformats.org/officeDocument/2006/relationships" xmlns:mc="http://schemas.openxmlformats.org/markup-compatibility/2006" xmlns:mv="urn:schemas-microsoft-com:mac:vml" xmlns:p="http://schemas.openxmlformats.org/presentationml/2006/main" xmlns:c="http://schemas.openxmlformats.org/drawingml/2006/chart" xmlns:dgm="http://schemas.openxmlformats.org/drawingml/2006/diagram" xmlns:o="urn:schemas-microsoft-com:office:office" xmlns:v="urn:schemas-microsoft-com:vml" xmlns:pvml="urn:schemas-microsoft-com:office:powerpoint" xmlns:com="http://schemas.openxmlformats.org/drawingml/2006/compatibility" xmlns:p14="http://schemas.microsoft.com/office/powerpoint/2010/main" xmlns:p15="http://schemas.microsoft.com/office/powerpoint/2012/main" xmlns:ahyp="http://schemas.microsoft.com/office/drawing/2018/hyperlinkcolor" autoCompressPictures="0" embedTrueTypeFonts="1" strictFirstAndLastChars="0" saveSubsetFonts="1">
   <p:sldMasterIdLst>
-    <p:sldMasterId id="2147483659" r:id="rId5"/>
+    <p:sldMasterId id="2147483659" r:id="rId4"/>
   </p:sldMasterIdLst>
   <p:notesMasterIdLst>
-    <p:notesMasterId r:id="rId6"/>
+    <p:notesMasterId r:id="rId5"/>
   </p:notesMasterIdLst>
   <p:sldIdLst>
-    <p:sldId id="256" r:id="rId7"/>
-    <p:sldId id="257" r:id="rId8"/>
-    <p:sldId id="258" r:id="rId9"/>
-    <p:sldId id="259" r:id="rId10"/>
-    <p:sldId id="260" r:id="rId11"/>
-    <p:sldId id="261" r:id="rId12"/>
-    <p:sldId id="262" r:id="rId13"/>
-    <p:sldId id="263" r:id="rId14"/>
-    <p:sldId id="264" r:id="rId15"/>
-    <p:sldId id="265" r:id="rId16"/>
-    <p:sldId id="266" r:id="rId17"/>
-    <p:sldId id="267" r:id="rId18"/>
+    <p:sldId id="256" r:id="rId6"/>
+    <p:sldId id="257" r:id="rId7"/>
+    <p:sldId id="258" r:id="rId8"/>
+    <p:sldId id="259" r:id="rId9"/>
+    <p:sldId id="260" r:id="rId10"/>
+    <p:sldId id="261" r:id="rId11"/>
+    <p:sldId id="262" r:id="rId12"/>
+    <p:sldId id="263" r:id="rId13"/>
+    <p:sldId id="264" r:id="rId14"/>
+    <p:sldId id="265" r:id="rId15"/>
+    <p:sldId id="266" r:id="rId16"/>
+    <p:sldId id="267" r:id="rId17"/>
   </p:sldIdLst>
   <p:sldSz cy="5143500" cx="9144000"/>
   <p:notesSz cx="6858000" cy="9144000"/>
   <p:embeddedFontLst>
     <p:embeddedFont>
       <p:font typeface="Montserrat"/>
-      <p:regular r:id="rId19"/>
-      <p:bold r:id="rId20"/>
-      <p:italic r:id="rId21"/>
-      <p:boldItalic r:id="rId22"/>
+      <p:regular r:id="rId18"/>
+      <p:bold r:id="rId19"/>
+      <p:italic r:id="rId20"/>
+      <p:boldItalic r:id="rId21"/>
     </p:embeddedFont>
     <p:embeddedFont>
       <p:font typeface="Lato"/>
-      <p:regular r:id="rId23"/>
-      <p:bold r:id="rId24"/>
-      <p:italic r:id="rId25"/>
-      <p:boldItalic r:id="rId26"/>
+      <p:regular r:id="rId22"/>
+      <p:bold r:id="rId23"/>
+      <p:italic r:id="rId24"/>
+      <p:boldItalic r:id="rId25"/>
     </p:embeddedFont>
   </p:embeddedFontLst>
   <p:defaultTextStyle>
@@ -285,49 +285,6 @@
     </p:ext>
   </p:extLst>
 </p:presentation>
-</file>
-
-<file path=ppt/commentAuthors.xml><?xml version="1.0" encoding="utf-8"?>
-<p:cmAuthorLst xmlns:a="http://schemas.openxmlformats.org/drawingml/2006/main" xmlns:r="http://schemas.openxmlformats.org/officeDocument/2006/relationships" xmlns:mc="http://schemas.openxmlformats.org/markup-compatibility/2006" xmlns:mv="urn:schemas-microsoft-com:mac:vml" xmlns:p="http://schemas.openxmlformats.org/presentationml/2006/main" xmlns:c="http://schemas.openxmlformats.org/drawingml/2006/chart" xmlns:dgm="http://schemas.openxmlformats.org/drawingml/2006/diagram" xmlns:o="urn:schemas-microsoft-com:office:office" xmlns:v="urn:schemas-microsoft-com:vml" xmlns:pvml="urn:schemas-microsoft-com:office:powerpoint" xmlns:com="http://schemas.openxmlformats.org/drawingml/2006/compatibility" xmlns:p14="http://schemas.microsoft.com/office/powerpoint/2010/main" xmlns:p15="http://schemas.microsoft.com/office/powerpoint/2012/main" xmlns:ahyp="http://schemas.microsoft.com/office/drawing/2018/hyperlinkcolor">
-  <p:cmAuthor clrIdx="0" id="0" initials="" lastIdx="2" name="zz aa"/>
-  <p:cmAuthor clrIdx="1" id="1" initials="" lastIdx="3" name="Szymon Kozłowski"/>
-</p:cmAuthorLst>
-</file>
-
-<file path=ppt/comments/comment1.xml><?xml version="1.0" encoding="utf-8"?>
-<p:cmLst xmlns:a="http://schemas.openxmlformats.org/drawingml/2006/main" xmlns:r="http://schemas.openxmlformats.org/officeDocument/2006/relationships" xmlns:mc="http://schemas.openxmlformats.org/markup-compatibility/2006" xmlns:mv="urn:schemas-microsoft-com:mac:vml" xmlns:p="http://schemas.openxmlformats.org/presentationml/2006/main" xmlns:c="http://schemas.openxmlformats.org/drawingml/2006/chart" xmlns:dgm="http://schemas.openxmlformats.org/drawingml/2006/diagram" xmlns:o="urn:schemas-microsoft-com:office:office" xmlns:v="urn:schemas-microsoft-com:vml" xmlns:pvml="urn:schemas-microsoft-com:office:powerpoint" xmlns:com="http://schemas.openxmlformats.org/drawingml/2006/compatibility" xmlns:p14="http://schemas.microsoft.com/office/powerpoint/2010/main" xmlns:p15="http://schemas.microsoft.com/office/powerpoint/2012/main" xmlns:ahyp="http://schemas.microsoft.com/office/drawing/2018/hyperlinkcolor">
-  <p:cm authorId="0" idx="1" dt="2025-04-14T19:45:46.364">
-    <p:pos x="196" y="2405"/>
-    <p:text>Może moglibyśmy wymienić po dwukropku Konrada i Macieja. Opinia?</p:text>
-  </p:cm>
-  <p:cm authorId="1" idx="1" dt="2025-04-14T19:45:46.364">
-    <p:pos x="196" y="2405"/>
-    <p:text>ja bym dodał jakoś na końcu 
-"special thanks to company representatives: " czy coś takiego</p:text>
-  </p:cm>
-</p:cmLst>
-</file>
-
-<file path=ppt/comments/comment2.xml><?xml version="1.0" encoding="utf-8"?>
-<p:cmLst xmlns:a="http://schemas.openxmlformats.org/drawingml/2006/main" xmlns:r="http://schemas.openxmlformats.org/officeDocument/2006/relationships" xmlns:mc="http://schemas.openxmlformats.org/markup-compatibility/2006" xmlns:mv="urn:schemas-microsoft-com:mac:vml" xmlns:p="http://schemas.openxmlformats.org/presentationml/2006/main" xmlns:c="http://schemas.openxmlformats.org/drawingml/2006/chart" xmlns:dgm="http://schemas.openxmlformats.org/drawingml/2006/diagram" xmlns:o="urn:schemas-microsoft-com:office:office" xmlns:v="urn:schemas-microsoft-com:vml" xmlns:pvml="urn:schemas-microsoft-com:office:powerpoint" xmlns:com="http://schemas.openxmlformats.org/drawingml/2006/compatibility" xmlns:p14="http://schemas.microsoft.com/office/powerpoint/2010/main" xmlns:p15="http://schemas.microsoft.com/office/powerpoint/2012/main" xmlns:ahyp="http://schemas.microsoft.com/office/drawing/2018/hyperlinkcolor">
-  <p:cm authorId="0" idx="2" dt="2025-04-14T19:46:34.856">
-    <p:pos x="817" y="366"/>
-    <p:text>Podoba mi się ten slajd, ale zastanawiam się czy taki czelen nie powinien być przed "lets use llms". Ale chwilę nad tym myślałem i wiele nie wymyśliłem; pogadajmy o tym przy najbliższej okazji</p:text>
-  </p:cm>
-  <p:cm authorId="1" idx="2" dt="2025-04-14T19:46:34.856">
-    <p:pos x="817" y="366"/>
-    <p:text>w zasadzie to byłoby bardziej spójne, zamienię kolejność</p:text>
-  </p:cm>
-</p:cmLst>
-</file>
-
-<file path=ppt/comments/comment3.xml><?xml version="1.0" encoding="utf-8"?>
-<p:cmLst xmlns:a="http://schemas.openxmlformats.org/drawingml/2006/main" xmlns:r="http://schemas.openxmlformats.org/officeDocument/2006/relationships" xmlns:mc="http://schemas.openxmlformats.org/markup-compatibility/2006" xmlns:mv="urn:schemas-microsoft-com:mac:vml" xmlns:p="http://schemas.openxmlformats.org/presentationml/2006/main" xmlns:c="http://schemas.openxmlformats.org/drawingml/2006/chart" xmlns:dgm="http://schemas.openxmlformats.org/drawingml/2006/diagram" xmlns:o="urn:schemas-microsoft-com:office:office" xmlns:v="urn:schemas-microsoft-com:vml" xmlns:pvml="urn:schemas-microsoft-com:office:powerpoint" xmlns:com="http://schemas.openxmlformats.org/drawingml/2006/compatibility" xmlns:p14="http://schemas.microsoft.com/office/powerpoint/2010/main" xmlns:p15="http://schemas.microsoft.com/office/powerpoint/2012/main" xmlns:ahyp="http://schemas.microsoft.com/office/drawing/2018/hyperlinkcolor">
-  <p:cm authorId="1" idx="3" dt="2025-04-15T10:50:52.505">
-    <p:pos x="6000" y="0"/>
-    <p:text>ja bym tu dał twój bertowski diagram</p:text>
-  </p:cm>
-</p:cmLst>
 </file>
 
 <file path=ppt/notesMasters/notesMaster1.xml><?xml version="1.0" encoding="utf-8"?>
@@ -860,7 +817,7 @@
   <p:cSld>
     <p:spTree>
       <p:nvGrpSpPr>
-        <p:cNvPr id="201" name="Shape 201"/>
+        <p:cNvPr id="202" name="Shape 202"/>
         <p:cNvGrpSpPr/>
         <p:nvPr/>
       </p:nvGrpSpPr>
@@ -874,7 +831,7 @@
       </p:grpSpPr>
       <p:sp>
         <p:nvSpPr>
-          <p:cNvPr id="202" name="Google Shape;202;g3523d13703c_0_0:notes"/>
+          <p:cNvPr id="203" name="Google Shape;203;g3523d13703c_0_0:notes"/>
           <p:cNvSpPr/>
           <p:nvPr>
             <p:ph idx="2" type="sldImg"/>
@@ -909,7 +866,7 @@
       </p:sp>
       <p:sp>
         <p:nvSpPr>
-          <p:cNvPr id="203" name="Google Shape;203;g3523d13703c_0_0:notes"/>
+          <p:cNvPr id="204" name="Google Shape;204;g3523d13703c_0_0:notes"/>
           <p:cNvSpPr txBox="1"/>
           <p:nvPr>
             <p:ph idx="1" type="body"/>
@@ -940,8 +897,7 @@
               <a:buNone/>
             </a:pPr>
             <a:r>
-              <a:rPr lang="pl"/>
-              <a:t>nie zagłębiać się</a:t>
+              <a:t/>
             </a:r>
             <a:endParaRPr/>
           </a:p>
@@ -960,7 +916,7 @@
   <p:cSld>
     <p:spTree>
       <p:nvGrpSpPr>
-        <p:cNvPr id="207" name="Shape 207"/>
+        <p:cNvPr id="208" name="Shape 208"/>
         <p:cNvGrpSpPr/>
         <p:nvPr/>
       </p:nvGrpSpPr>
@@ -974,7 +930,7 @@
       </p:grpSpPr>
       <p:sp>
         <p:nvSpPr>
-          <p:cNvPr id="208" name="Google Shape;208;g352132635d5_0_1155:notes"/>
+          <p:cNvPr id="209" name="Google Shape;209;g352132635d5_0_1155:notes"/>
           <p:cNvSpPr/>
           <p:nvPr>
             <p:ph idx="2" type="sldImg"/>
@@ -1009,7 +965,7 @@
       </p:sp>
       <p:sp>
         <p:nvSpPr>
-          <p:cNvPr id="209" name="Google Shape;209;g352132635d5_0_1155:notes"/>
+          <p:cNvPr id="210" name="Google Shape;210;g352132635d5_0_1155:notes"/>
           <p:cNvSpPr txBox="1"/>
           <p:nvPr>
             <p:ph idx="1" type="body"/>
@@ -1059,7 +1015,7 @@
   <p:cSld>
     <p:spTree>
       <p:nvGrpSpPr>
-        <p:cNvPr id="215" name="Shape 215"/>
+        <p:cNvPr id="216" name="Shape 216"/>
         <p:cNvGrpSpPr/>
         <p:nvPr/>
       </p:nvGrpSpPr>
@@ -1073,7 +1029,7 @@
       </p:grpSpPr>
       <p:sp>
         <p:nvSpPr>
-          <p:cNvPr id="216" name="Google Shape;216;g352132635d5_0_1161:notes"/>
+          <p:cNvPr id="217" name="Google Shape;217;g352132635d5_0_1161:notes"/>
           <p:cNvSpPr/>
           <p:nvPr>
             <p:ph idx="2" type="sldImg"/>
@@ -1108,7 +1064,7 @@
       </p:sp>
       <p:sp>
         <p:nvSpPr>
-          <p:cNvPr id="217" name="Google Shape;217;g352132635d5_0_1161:notes"/>
+          <p:cNvPr id="218" name="Google Shape;218;g352132635d5_0_1161:notes"/>
           <p:cNvSpPr txBox="1"/>
           <p:nvPr>
             <p:ph idx="1" type="body"/>
@@ -1238,15 +1194,7 @@
               <a:buNone/>
             </a:pPr>
             <a:r>
-              <a:rPr lang="pl"/>
-              <a:t>Q: where data will be stored</a:t>
-            </a:r>
-            <a:br>
-              <a:rPr lang="pl"/>
-            </a:br>
-            <a:r>
-              <a:rPr lang="pl"/>
-              <a:t>A: it will be sent to the external server, (server is outside of the scope of our project)</a:t>
+              <a:t/>
             </a:r>
             <a:endParaRPr/>
           </a:p>
@@ -1345,8 +1293,7 @@
               <a:buNone/>
             </a:pPr>
             <a:r>
-              <a:rPr lang="pl"/>
-              <a:t>As we get all the screen content it can possibly contain confidential/personal info</a:t>
+              <a:t/>
             </a:r>
             <a:endParaRPr/>
           </a:p>
@@ -1365,7 +1312,7 @@
   <p:cSld>
     <p:spTree>
       <p:nvGrpSpPr>
-        <p:cNvPr id="153" name="Shape 153"/>
+        <p:cNvPr id="154" name="Shape 154"/>
         <p:cNvGrpSpPr/>
         <p:nvPr/>
       </p:nvGrpSpPr>
@@ -1379,7 +1326,7 @@
       </p:grpSpPr>
       <p:sp>
         <p:nvSpPr>
-          <p:cNvPr id="154" name="Google Shape;154;g34a720c2f31_0_10:notes"/>
+          <p:cNvPr id="155" name="Google Shape;155;g34a720c2f31_0_10:notes"/>
           <p:cNvSpPr/>
           <p:nvPr>
             <p:ph idx="2" type="sldImg"/>
@@ -1414,7 +1361,7 @@
       </p:sp>
       <p:sp>
         <p:nvSpPr>
-          <p:cNvPr id="155" name="Google Shape;155;g34a720c2f31_0_10:notes"/>
+          <p:cNvPr id="156" name="Google Shape;156;g34a720c2f31_0_10:notes"/>
           <p:cNvSpPr txBox="1"/>
           <p:nvPr>
             <p:ph idx="1" type="body"/>
@@ -1445,40 +1392,7 @@
               <a:buNone/>
             </a:pPr>
             <a:r>
-              <a:rPr lang="pl"/>
-              <a:t>-obtained via Android Accessibility API</a:t>
-            </a:r>
-            <a:endParaRPr/>
-          </a:p>
-          <a:p>
-            <a:pPr indent="0" lvl="0" marL="0" rtl="0" algn="l">
-              <a:spcBef>
-                <a:spcPts val="0"/>
-              </a:spcBef>
-              <a:spcAft>
-                <a:spcPts val="0"/>
-              </a:spcAft>
-              <a:buNone/>
-            </a:pPr>
-            <a:r>
-              <a:rPr lang="pl"/>
-              <a:t>Q: what is the last col?</a:t>
-            </a:r>
-            <a:endParaRPr/>
-          </a:p>
-          <a:p>
-            <a:pPr indent="0" lvl="0" marL="0" rtl="0" algn="l">
-              <a:spcBef>
-                <a:spcPts val="0"/>
-              </a:spcBef>
-              <a:spcAft>
-                <a:spcPts val="0"/>
-              </a:spcAft>
-              <a:buNone/>
-            </a:pPr>
-            <a:r>
-              <a:rPr lang="pl"/>
-              <a:t>A: view depth in the XML tree</a:t>
+              <a:t/>
             </a:r>
             <a:endParaRPr/>
           </a:p>
@@ -1497,7 +1411,7 @@
   <p:cSld>
     <p:spTree>
       <p:nvGrpSpPr>
-        <p:cNvPr id="159" name="Shape 159"/>
+        <p:cNvPr id="160" name="Shape 160"/>
         <p:cNvGrpSpPr/>
         <p:nvPr/>
       </p:nvGrpSpPr>
@@ -1511,7 +1425,7 @@
       </p:grpSpPr>
       <p:sp>
         <p:nvSpPr>
-          <p:cNvPr id="160" name="Google Shape;160;g3523cb17868_0_1:notes"/>
+          <p:cNvPr id="161" name="Google Shape;161;g3523cb17868_0_1:notes"/>
           <p:cNvSpPr/>
           <p:nvPr>
             <p:ph idx="2" type="sldImg"/>
@@ -1546,7 +1460,7 @@
       </p:sp>
       <p:sp>
         <p:nvSpPr>
-          <p:cNvPr id="161" name="Google Shape;161;g3523cb17868_0_1:notes"/>
+          <p:cNvPr id="162" name="Google Shape;162;g3523cb17868_0_1:notes"/>
           <p:cNvSpPr txBox="1"/>
           <p:nvPr>
             <p:ph idx="1" type="body"/>
@@ -1577,15 +1491,7 @@
               <a:buNone/>
             </a:pPr>
             <a:r>
-              <a:rPr lang="pl"/>
-              <a:t>Q: why not price as numeric value?</a:t>
-            </a:r>
-            <a:br>
-              <a:rPr lang="pl"/>
-            </a:br>
-            <a:r>
-              <a:rPr lang="pl"/>
-              <a:t>A: coupons might have nontrivial discounts, like get one free if you have spent at least $xyz on some product group</a:t>
+              <a:t/>
             </a:r>
             <a:endParaRPr/>
           </a:p>
@@ -1604,7 +1510,7 @@
   <p:cSld>
     <p:spTree>
       <p:nvGrpSpPr>
-        <p:cNvPr id="167" name="Shape 167"/>
+        <p:cNvPr id="168" name="Shape 168"/>
         <p:cNvGrpSpPr/>
         <p:nvPr/>
       </p:nvGrpSpPr>
@@ -1618,7 +1524,7 @@
       </p:grpSpPr>
       <p:sp>
         <p:nvSpPr>
-          <p:cNvPr id="168" name="Google Shape;168;g34a720c2f31_0_22:notes"/>
+          <p:cNvPr id="169" name="Google Shape;169;g34a720c2f31_0_22:notes"/>
           <p:cNvSpPr/>
           <p:nvPr>
             <p:ph idx="2" type="sldImg"/>
@@ -1653,7 +1559,7 @@
       </p:sp>
       <p:sp>
         <p:nvSpPr>
-          <p:cNvPr id="169" name="Google Shape;169;g34a720c2f31_0_22:notes"/>
+          <p:cNvPr id="170" name="Google Shape;170;g34a720c2f31_0_22:notes"/>
           <p:cNvSpPr txBox="1"/>
           <p:nvPr>
             <p:ph idx="1" type="body"/>
@@ -1684,15 +1590,7 @@
               <a:buNone/>
             </a:pPr>
             <a:r>
-              <a:rPr lang="pl"/>
-              <a:t>Q: how llms guarantee that no private data is considered as coupon and sent to the server?</a:t>
-            </a:r>
-            <a:br>
-              <a:rPr lang="pl"/>
-            </a:br>
-            <a:r>
-              <a:rPr lang="pl"/>
-              <a:t>A: It does not xd (idk what to say here)</a:t>
+              <a:t/>
             </a:r>
             <a:endParaRPr/>
           </a:p>
@@ -1711,7 +1609,7 @@
   <p:cSld>
     <p:spTree>
       <p:nvGrpSpPr>
-        <p:cNvPr id="172" name="Shape 172"/>
+        <p:cNvPr id="173" name="Shape 173"/>
         <p:cNvGrpSpPr/>
         <p:nvPr/>
       </p:nvGrpSpPr>
@@ -1725,7 +1623,7 @@
       </p:grpSpPr>
       <p:sp>
         <p:nvSpPr>
-          <p:cNvPr id="173" name="Google Shape;173;g34b8f2231fd_0_0:notes"/>
+          <p:cNvPr id="174" name="Google Shape;174;g34b8f2231fd_0_0:notes"/>
           <p:cNvSpPr/>
           <p:nvPr>
             <p:ph idx="2" type="sldImg"/>
@@ -1760,7 +1658,7 @@
       </p:sp>
       <p:sp>
         <p:nvSpPr>
-          <p:cNvPr id="174" name="Google Shape;174;g34b8f2231fd_0_0:notes"/>
+          <p:cNvPr id="175" name="Google Shape;175;g34b8f2231fd_0_0:notes"/>
           <p:cNvSpPr txBox="1"/>
           <p:nvPr>
             <p:ph idx="1" type="body"/>
@@ -1810,7 +1708,7 @@
   <p:cSld>
     <p:spTree>
       <p:nvGrpSpPr>
-        <p:cNvPr id="183" name="Shape 183"/>
+        <p:cNvPr id="184" name="Shape 184"/>
         <p:cNvGrpSpPr/>
         <p:nvPr/>
       </p:nvGrpSpPr>
@@ -1824,7 +1722,7 @@
       </p:grpSpPr>
       <p:sp>
         <p:nvSpPr>
-          <p:cNvPr id="184" name="Google Shape;184;g34a720c2f31_0_28:notes"/>
+          <p:cNvPr id="185" name="Google Shape;185;g34a720c2f31_0_28:notes"/>
           <p:cNvSpPr/>
           <p:nvPr>
             <p:ph idx="2" type="sldImg"/>
@@ -1859,7 +1757,7 @@
       </p:sp>
       <p:sp>
         <p:nvSpPr>
-          <p:cNvPr id="185" name="Google Shape;185;g34a720c2f31_0_28:notes"/>
+          <p:cNvPr id="186" name="Google Shape;186;g34a720c2f31_0_28:notes"/>
           <p:cNvSpPr txBox="1"/>
           <p:nvPr>
             <p:ph idx="1" type="body"/>
@@ -1890,8 +1788,7 @@
               <a:buNone/>
             </a:pPr>
             <a:r>
-              <a:rPr lang="pl"/>
-              <a:t>wpomnieć tu coś o tym że wyzwaniem jest wgl odpalenie takiego modelu na telefonie</a:t>
+              <a:t/>
             </a:r>
             <a:endParaRPr/>
           </a:p>
@@ -1910,7 +1807,7 @@
   <p:cSld>
     <p:spTree>
       <p:nvGrpSpPr>
-        <p:cNvPr id="192" name="Shape 192"/>
+        <p:cNvPr id="193" name="Shape 193"/>
         <p:cNvGrpSpPr/>
         <p:nvPr/>
       </p:nvGrpSpPr>
@@ -1924,7 +1821,7 @@
       </p:grpSpPr>
       <p:sp>
         <p:nvSpPr>
-          <p:cNvPr id="193" name="Google Shape;193;g34a720c2f31_0_35:notes"/>
+          <p:cNvPr id="194" name="Google Shape;194;g34a720c2f31_0_35:notes"/>
           <p:cNvSpPr/>
           <p:nvPr>
             <p:ph idx="2" type="sldImg"/>
@@ -1959,7 +1856,7 @@
       </p:sp>
       <p:sp>
         <p:nvSpPr>
-          <p:cNvPr id="194" name="Google Shape;194;g34a720c2f31_0_35:notes"/>
+          <p:cNvPr id="195" name="Google Shape;195;g34a720c2f31_0_35:notes"/>
           <p:cNvSpPr txBox="1"/>
           <p:nvPr>
             <p:ph idx="1" type="body"/>
@@ -10419,7 +10316,7 @@
   <p:cSld>
     <p:spTree>
       <p:nvGrpSpPr>
-        <p:cNvPr id="204" name="Shape 204"/>
+        <p:cNvPr id="205" name="Shape 205"/>
         <p:cNvGrpSpPr/>
         <p:nvPr/>
       </p:nvGrpSpPr>
@@ -10433,7 +10330,7 @@
       </p:grpSpPr>
       <p:sp>
         <p:nvSpPr>
-          <p:cNvPr id="205" name="Google Shape;205;p22"/>
+          <p:cNvPr id="206" name="Google Shape;206;p22"/>
           <p:cNvSpPr txBox="1"/>
           <p:nvPr>
             <p:ph type="title"/>
@@ -10473,7 +10370,7 @@
       </p:sp>
       <p:pic>
         <p:nvPicPr>
-          <p:cNvPr id="206" name="Google Shape;206;p22" title="zpp.png"/>
+          <p:cNvPr id="207" name="Google Shape;207;p22" title="zpp.png"/>
           <p:cNvPicPr preferRelativeResize="0"/>
           <p:nvPr/>
         </p:nvPicPr>
@@ -10512,7 +10409,7 @@
   <p:cSld>
     <p:spTree>
       <p:nvGrpSpPr>
-        <p:cNvPr id="210" name="Shape 210"/>
+        <p:cNvPr id="211" name="Shape 211"/>
         <p:cNvGrpSpPr/>
         <p:nvPr/>
       </p:nvGrpSpPr>
@@ -10526,7 +10423,7 @@
       </p:grpSpPr>
       <p:sp>
         <p:nvSpPr>
-          <p:cNvPr id="211" name="Google Shape;211;p23"/>
+          <p:cNvPr id="212" name="Google Shape;212;p23"/>
           <p:cNvSpPr txBox="1"/>
           <p:nvPr>
             <p:ph type="title"/>
@@ -10576,7 +10473,7 @@
       </p:sp>
       <p:sp>
         <p:nvSpPr>
-          <p:cNvPr id="212" name="Google Shape;212;p23"/>
+          <p:cNvPr id="213" name="Google Shape;213;p23"/>
           <p:cNvSpPr txBox="1"/>
           <p:nvPr>
             <p:ph idx="1" type="body"/>
@@ -10667,67 +10564,9 @@
           </a:p>
         </p:txBody>
       </p:sp>
-      <p:sp>
-        <p:nvSpPr>
-          <p:cNvPr id="213" name="Google Shape;213;p23"/>
-          <p:cNvSpPr txBox="1"/>
-          <p:nvPr/>
-        </p:nvSpPr>
-        <p:spPr>
-          <a:xfrm>
-            <a:off x="5777725" y="1567550"/>
-            <a:ext cx="2055900" cy="2272200"/>
-          </a:xfrm>
-          <a:prstGeom prst="rect">
-            <a:avLst/>
-          </a:prstGeom>
-          <a:noFill/>
-          <a:ln>
-            <a:noFill/>
-          </a:ln>
-        </p:spPr>
-        <p:txBody>
-          <a:bodyPr anchorCtr="0" anchor="t" bIns="91425" lIns="91425" spcFirstLastPara="1" rIns="91425" wrap="square" tIns="91425">
-            <a:noAutofit/>
-          </a:bodyPr>
-          <a:lstStyle/>
-          <a:p>
-            <a:pPr indent="0" lvl="0" marL="0" rtl="0" algn="l">
-              <a:spcBef>
-                <a:spcPts val="0"/>
-              </a:spcBef>
-              <a:spcAft>
-                <a:spcPts val="0"/>
-              </a:spcAft>
-              <a:buNone/>
-            </a:pPr>
-            <a:r>
-              <a:rPr lang="pl" sz="1300">
-                <a:solidFill>
-                  <a:schemeClr val="lt1"/>
-                </a:solidFill>
-                <a:latin typeface="Lato"/>
-                <a:ea typeface="Lato"/>
-                <a:cs typeface="Lato"/>
-                <a:sym typeface="Lato"/>
-              </a:rPr>
-              <a:t>Jak Kamil zrobi skrypty do wykresów to bym tutaj dał jakiś, można by wtedy powiedzieć zdanie o nim</a:t>
-            </a:r>
-            <a:endParaRPr sz="1300">
-              <a:solidFill>
-                <a:schemeClr val="lt1"/>
-              </a:solidFill>
-              <a:latin typeface="Lato"/>
-              <a:ea typeface="Lato"/>
-              <a:cs typeface="Lato"/>
-              <a:sym typeface="Lato"/>
-            </a:endParaRPr>
-          </a:p>
-        </p:txBody>
-      </p:sp>
       <p:pic>
         <p:nvPicPr>
-          <p:cNvPr id="214" name="Google Shape;214;p23"/>
+          <p:cNvPr id="214" name="Google Shape;214;p23" title="llama_vs_bert_precision.png"/>
           <p:cNvPicPr preferRelativeResize="0"/>
           <p:nvPr/>
         </p:nvPicPr>
@@ -10741,8 +10580,36 @@
         </p:blipFill>
         <p:spPr>
           <a:xfrm>
-            <a:off x="4002276" y="916787"/>
-            <a:ext cx="4449325" cy="3309924"/>
+            <a:off x="4820859" y="152400"/>
+            <a:ext cx="3252189" cy="2419350"/>
+          </a:xfrm>
+          <a:prstGeom prst="rect">
+            <a:avLst/>
+          </a:prstGeom>
+          <a:noFill/>
+          <a:ln>
+            <a:noFill/>
+          </a:ln>
+        </p:spPr>
+      </p:pic>
+      <p:pic>
+        <p:nvPicPr>
+          <p:cNvPr id="215" name="Google Shape;215;p23" title="llama_vs_bert_recall.png"/>
+          <p:cNvPicPr preferRelativeResize="0"/>
+          <p:nvPr/>
+        </p:nvPicPr>
+        <p:blipFill>
+          <a:blip r:embed="rId4">
+            <a:alphaModFix/>
+          </a:blip>
+          <a:stretch>
+            <a:fillRect/>
+          </a:stretch>
+        </p:blipFill>
+        <p:spPr>
+          <a:xfrm>
+            <a:off x="4820850" y="2571758"/>
+            <a:ext cx="3252199" cy="2419367"/>
           </a:xfrm>
           <a:prstGeom prst="rect">
             <a:avLst/>
@@ -10766,7 +10633,7 @@
   <p:cSld>
     <p:spTree>
       <p:nvGrpSpPr>
-        <p:cNvPr id="218" name="Shape 218"/>
+        <p:cNvPr id="219" name="Shape 219"/>
         <p:cNvGrpSpPr/>
         <p:nvPr/>
       </p:nvGrpSpPr>
@@ -10780,7 +10647,7 @@
       </p:grpSpPr>
       <p:sp>
         <p:nvSpPr>
-          <p:cNvPr id="219" name="Google Shape;219;p24"/>
+          <p:cNvPr id="220" name="Google Shape;220;p24"/>
           <p:cNvSpPr txBox="1"/>
           <p:nvPr>
             <p:ph type="title"/>
@@ -10848,7 +10715,7 @@
       </p:sp>
       <p:sp>
         <p:nvSpPr>
-          <p:cNvPr id="220" name="Google Shape;220;p24"/>
+          <p:cNvPr id="221" name="Google Shape;221;p24"/>
           <p:cNvSpPr txBox="1"/>
           <p:nvPr>
             <p:ph idx="1" type="body"/>
@@ -10888,7 +10755,7 @@
       </p:sp>
       <p:pic>
         <p:nvPicPr>
-          <p:cNvPr id="221" name="Google Shape;221;p24"/>
+          <p:cNvPr id="222" name="Google Shape;222;p24"/>
           <p:cNvPicPr preferRelativeResize="0"/>
           <p:nvPr/>
         </p:nvPicPr>
@@ -10916,7 +10783,7 @@
       </p:pic>
       <p:sp>
         <p:nvSpPr>
-          <p:cNvPr id="222" name="Google Shape;222;p24"/>
+          <p:cNvPr id="223" name="Google Shape;223;p24"/>
           <p:cNvSpPr txBox="1"/>
           <p:nvPr>
             <p:ph idx="1" type="body"/>
@@ -11389,6 +11256,34 @@
           </a:p>
         </p:txBody>
       </p:sp>
+      <p:pic>
+        <p:nvPicPr>
+          <p:cNvPr id="153" name="Google Shape;153;p15"/>
+          <p:cNvPicPr preferRelativeResize="0"/>
+          <p:nvPr/>
+        </p:nvPicPr>
+        <p:blipFill>
+          <a:blip r:embed="rId3">
+            <a:alphaModFix/>
+          </a:blip>
+          <a:stretch>
+            <a:fillRect/>
+          </a:stretch>
+        </p:blipFill>
+        <p:spPr>
+          <a:xfrm>
+            <a:off x="5808975" y="900425"/>
+            <a:ext cx="2684327" cy="3342650"/>
+          </a:xfrm>
+          <a:prstGeom prst="rect">
+            <a:avLst/>
+          </a:prstGeom>
+          <a:noFill/>
+          <a:ln>
+            <a:noFill/>
+          </a:ln>
+        </p:spPr>
+      </p:pic>
     </p:spTree>
   </p:cSld>
   <p:clrMapOvr>
@@ -11402,7 +11297,7 @@
   <p:cSld>
     <p:spTree>
       <p:nvGrpSpPr>
-        <p:cNvPr id="156" name="Shape 156"/>
+        <p:cNvPr id="157" name="Shape 157"/>
         <p:cNvGrpSpPr/>
         <p:nvPr/>
       </p:nvGrpSpPr>
@@ -11416,7 +11311,7 @@
       </p:grpSpPr>
       <p:sp>
         <p:nvSpPr>
-          <p:cNvPr id="157" name="Google Shape;157;p16"/>
+          <p:cNvPr id="158" name="Google Shape;158;p16"/>
           <p:cNvSpPr txBox="1"/>
           <p:nvPr>
             <p:ph type="title"/>
@@ -11466,7 +11361,7 @@
       </p:sp>
       <p:pic>
         <p:nvPicPr>
-          <p:cNvPr id="158" name="Google Shape;158;p16"/>
+          <p:cNvPr id="159" name="Google Shape;159;p16"/>
           <p:cNvPicPr preferRelativeResize="0"/>
           <p:nvPr/>
         </p:nvPicPr>
@@ -11480,8 +11375,8 @@
         </p:blipFill>
         <p:spPr>
           <a:xfrm>
-            <a:off x="152400" y="2339600"/>
-            <a:ext cx="8839198" cy="1646454"/>
+            <a:off x="305400" y="2333625"/>
+            <a:ext cx="8533199" cy="1589450"/>
           </a:xfrm>
           <a:prstGeom prst="rect">
             <a:avLst/>
@@ -11505,7 +11400,7 @@
   <p:cSld>
     <p:spTree>
       <p:nvGrpSpPr>
-        <p:cNvPr id="162" name="Shape 162"/>
+        <p:cNvPr id="163" name="Shape 163"/>
         <p:cNvGrpSpPr/>
         <p:nvPr/>
       </p:nvGrpSpPr>
@@ -11519,7 +11414,7 @@
       </p:grpSpPr>
       <p:sp>
         <p:nvSpPr>
-          <p:cNvPr id="163" name="Google Shape;163;p17"/>
+          <p:cNvPr id="164" name="Google Shape;164;p17"/>
           <p:cNvSpPr txBox="1"/>
           <p:nvPr>
             <p:ph type="title"/>
@@ -11559,7 +11454,7 @@
       </p:sp>
       <p:sp>
         <p:nvSpPr>
-          <p:cNvPr id="164" name="Google Shape;164;p17"/>
+          <p:cNvPr id="165" name="Google Shape;165;p17"/>
           <p:cNvSpPr txBox="1"/>
           <p:nvPr>
             <p:ph idx="1" type="body"/>
@@ -11603,7 +11498,7 @@
       </p:sp>
       <p:pic>
         <p:nvPicPr>
-          <p:cNvPr id="165" name="Google Shape;165;p17"/>
+          <p:cNvPr id="166" name="Google Shape;166;p17"/>
           <p:cNvPicPr preferRelativeResize="0"/>
           <p:nvPr/>
         </p:nvPicPr>
@@ -11631,7 +11526,7 @@
       </p:pic>
       <p:sp>
         <p:nvSpPr>
-          <p:cNvPr id="166" name="Google Shape;166;p17"/>
+          <p:cNvPr id="167" name="Google Shape;167;p17"/>
           <p:cNvSpPr txBox="1"/>
           <p:nvPr/>
         </p:nvSpPr>
@@ -11755,7 +11650,7 @@
   <p:cSld>
     <p:spTree>
       <p:nvGrpSpPr>
-        <p:cNvPr id="170" name="Shape 170"/>
+        <p:cNvPr id="171" name="Shape 171"/>
         <p:cNvGrpSpPr/>
         <p:nvPr/>
       </p:nvGrpSpPr>
@@ -11769,7 +11664,7 @@
       </p:grpSpPr>
       <p:sp>
         <p:nvSpPr>
-          <p:cNvPr id="171" name="Google Shape;171;p18"/>
+          <p:cNvPr id="172" name="Google Shape;172;p18"/>
           <p:cNvSpPr txBox="1"/>
           <p:nvPr>
             <p:ph type="title"/>
@@ -11830,7 +11725,7 @@
   <p:cSld>
     <p:spTree>
       <p:nvGrpSpPr>
-        <p:cNvPr id="175" name="Shape 175"/>
+        <p:cNvPr id="176" name="Shape 176"/>
         <p:cNvGrpSpPr/>
         <p:nvPr/>
       </p:nvGrpSpPr>
@@ -11844,7 +11739,7 @@
       </p:grpSpPr>
       <p:sp>
         <p:nvSpPr>
-          <p:cNvPr id="176" name="Google Shape;176;p19"/>
+          <p:cNvPr id="177" name="Google Shape;177;p19"/>
           <p:cNvSpPr txBox="1"/>
           <p:nvPr>
             <p:ph type="title"/>
@@ -11894,7 +11789,7 @@
       </p:sp>
       <p:pic>
         <p:nvPicPr>
-          <p:cNvPr id="177" name="Google Shape;177;p19"/>
+          <p:cNvPr id="178" name="Google Shape;178;p19"/>
           <p:cNvPicPr preferRelativeResize="0"/>
           <p:nvPr/>
         </p:nvPicPr>
@@ -11922,7 +11817,7 @@
       </p:pic>
       <p:pic>
         <p:nvPicPr>
-          <p:cNvPr id="178" name="Google Shape;178;p19"/>
+          <p:cNvPr id="179" name="Google Shape;179;p19"/>
           <p:cNvPicPr preferRelativeResize="0"/>
           <p:nvPr/>
         </p:nvPicPr>
@@ -11950,7 +11845,7 @@
       </p:pic>
       <p:pic>
         <p:nvPicPr>
-          <p:cNvPr id="179" name="Google Shape;179;p19"/>
+          <p:cNvPr id="180" name="Google Shape;180;p19"/>
           <p:cNvPicPr preferRelativeResize="0"/>
           <p:nvPr/>
         </p:nvPicPr>
@@ -11978,7 +11873,7 @@
       </p:pic>
       <p:pic>
         <p:nvPicPr>
-          <p:cNvPr id="180" name="Google Shape;180;p19"/>
+          <p:cNvPr id="181" name="Google Shape;181;p19"/>
           <p:cNvPicPr preferRelativeResize="0"/>
           <p:nvPr/>
         </p:nvPicPr>
@@ -12006,7 +11901,7 @@
       </p:pic>
       <p:pic>
         <p:nvPicPr>
-          <p:cNvPr id="181" name="Google Shape;181;p19"/>
+          <p:cNvPr id="182" name="Google Shape;182;p19"/>
           <p:cNvPicPr preferRelativeResize="0"/>
           <p:nvPr/>
         </p:nvPicPr>
@@ -12034,7 +11929,7 @@
       </p:pic>
       <p:pic>
         <p:nvPicPr>
-          <p:cNvPr id="182" name="Google Shape;182;p19"/>
+          <p:cNvPr id="183" name="Google Shape;183;p19"/>
           <p:cNvPicPr preferRelativeResize="0"/>
           <p:nvPr/>
         </p:nvPicPr>
@@ -12073,7 +11968,7 @@
   <p:cSld>
     <p:spTree>
       <p:nvGrpSpPr>
-        <p:cNvPr id="186" name="Shape 186"/>
+        <p:cNvPr id="187" name="Shape 187"/>
         <p:cNvGrpSpPr/>
         <p:nvPr/>
       </p:nvGrpSpPr>
@@ -12087,7 +11982,7 @@
       </p:grpSpPr>
       <p:sp>
         <p:nvSpPr>
-          <p:cNvPr id="187" name="Google Shape;187;p20"/>
+          <p:cNvPr id="188" name="Google Shape;188;p20"/>
           <p:cNvSpPr txBox="1"/>
           <p:nvPr>
             <p:ph type="title"/>
@@ -12137,7 +12032,7 @@
       </p:sp>
       <p:sp>
         <p:nvSpPr>
-          <p:cNvPr id="188" name="Google Shape;188;p20"/>
+          <p:cNvPr id="189" name="Google Shape;189;p20"/>
           <p:cNvSpPr txBox="1"/>
           <p:nvPr>
             <p:ph idx="1" type="body"/>
@@ -12187,7 +12082,7 @@
       </p:sp>
       <p:sp>
         <p:nvSpPr>
-          <p:cNvPr id="189" name="Google Shape;189;p20"/>
+          <p:cNvPr id="190" name="Google Shape;190;p20"/>
           <p:cNvSpPr txBox="1"/>
           <p:nvPr>
             <p:ph idx="1" type="body"/>
@@ -12235,7 +12130,7 @@
             </a:pPr>
             <a:r>
               <a:rPr lang="pl"/>
-              <a:t>appr. 1 billion params - still too much</a:t>
+              <a:t>appr. 1 billion params</a:t>
             </a:r>
             <a:endParaRPr/>
           </a:p>
@@ -12243,7 +12138,7 @@
       </p:sp>
       <p:sp>
         <p:nvSpPr>
-          <p:cNvPr id="190" name="Google Shape;190;p20"/>
+          <p:cNvPr id="191" name="Google Shape;191;p20"/>
           <p:cNvSpPr txBox="1"/>
           <p:nvPr/>
         </p:nvSpPr>
@@ -12416,7 +12311,7 @@
       </p:sp>
       <p:pic>
         <p:nvPicPr>
-          <p:cNvPr id="191" name="Google Shape;191;p20"/>
+          <p:cNvPr id="192" name="Google Shape;192;p20"/>
           <p:cNvPicPr preferRelativeResize="0"/>
           <p:nvPr/>
         </p:nvPicPr>
@@ -12455,7 +12350,7 @@
   <p:cSld>
     <p:spTree>
       <p:nvGrpSpPr>
-        <p:cNvPr id="195" name="Shape 195"/>
+        <p:cNvPr id="196" name="Shape 196"/>
         <p:cNvGrpSpPr/>
         <p:nvPr/>
       </p:nvGrpSpPr>
@@ -12469,7 +12364,7 @@
       </p:grpSpPr>
       <p:sp>
         <p:nvSpPr>
-          <p:cNvPr id="196" name="Google Shape;196;p21"/>
+          <p:cNvPr id="197" name="Google Shape;197;p21"/>
           <p:cNvSpPr txBox="1"/>
           <p:nvPr>
             <p:ph type="title"/>
@@ -12519,7 +12414,7 @@
       </p:sp>
       <p:sp>
         <p:nvSpPr>
-          <p:cNvPr id="197" name="Google Shape;197;p21"/>
+          <p:cNvPr id="198" name="Google Shape;198;p21"/>
           <p:cNvSpPr txBox="1"/>
           <p:nvPr>
             <p:ph idx="1" type="body"/>
@@ -12575,7 +12470,7 @@
       </p:sp>
       <p:sp>
         <p:nvSpPr>
-          <p:cNvPr id="198" name="Google Shape;198;p21"/>
+          <p:cNvPr id="199" name="Google Shape;199;p21"/>
           <p:cNvSpPr txBox="1"/>
           <p:nvPr/>
         </p:nvSpPr>
@@ -12707,7 +12602,7 @@
       </p:sp>
       <p:sp>
         <p:nvSpPr>
-          <p:cNvPr id="199" name="Google Shape;199;p21"/>
+          <p:cNvPr id="200" name="Google Shape;200;p21"/>
           <p:cNvSpPr txBox="1"/>
           <p:nvPr/>
         </p:nvSpPr>
@@ -12765,12 +12660,12 @@
       </p:sp>
       <p:pic>
         <p:nvPicPr>
-          <p:cNvPr id="200" name="Google Shape;200;p21"/>
+          <p:cNvPr id="201" name="Google Shape;201;p21"/>
           <p:cNvPicPr preferRelativeResize="0"/>
           <p:nvPr/>
         </p:nvPicPr>
         <p:blipFill>
-          <a:blip r:embed="rId4">
+          <a:blip r:embed="rId3">
             <a:alphaModFix/>
           </a:blip>
           <a:stretch>

</xml_diff>

<commit_message>
First iteration of changes.
</commit_message>
<xml_diff>
--- a/docs/zpp_final_presentation.pptx
+++ b/docs/zpp_final_presentation.pptx
@@ -2,41 +2,44 @@
 <file path=ppt/presentation.xml><?xml version="1.0" encoding="utf-8"?>
 <p:presentation xmlns:a="http://schemas.openxmlformats.org/drawingml/2006/main" xmlns:r="http://schemas.openxmlformats.org/officeDocument/2006/relationships" xmlns:mc="http://schemas.openxmlformats.org/markup-compatibility/2006" xmlns:mv="urn:schemas-microsoft-com:mac:vml" xmlns:p="http://schemas.openxmlformats.org/presentationml/2006/main" xmlns:c="http://schemas.openxmlformats.org/drawingml/2006/chart" xmlns:dgm="http://schemas.openxmlformats.org/drawingml/2006/diagram" xmlns:o="urn:schemas-microsoft-com:office:office" xmlns:v="urn:schemas-microsoft-com:vml" xmlns:pvml="urn:schemas-microsoft-com:office:powerpoint" xmlns:com="http://schemas.openxmlformats.org/drawingml/2006/compatibility" xmlns:p14="http://schemas.microsoft.com/office/powerpoint/2010/main" xmlns:p15="http://schemas.microsoft.com/office/powerpoint/2012/main" xmlns:ahyp="http://schemas.microsoft.com/office/drawing/2018/hyperlinkcolor" autoCompressPictures="0" embedTrueTypeFonts="1" strictFirstAndLastChars="0" saveSubsetFonts="1">
   <p:sldMasterIdLst>
-    <p:sldMasterId id="2147483659" r:id="rId4"/>
+    <p:sldMasterId id="2147483659" r:id="rId5"/>
   </p:sldMasterIdLst>
   <p:notesMasterIdLst>
-    <p:notesMasterId r:id="rId5"/>
+    <p:notesMasterId r:id="rId6"/>
   </p:notesMasterIdLst>
   <p:sldIdLst>
-    <p:sldId id="256" r:id="rId6"/>
-    <p:sldId id="257" r:id="rId7"/>
-    <p:sldId id="258" r:id="rId8"/>
-    <p:sldId id="259" r:id="rId9"/>
-    <p:sldId id="260" r:id="rId10"/>
-    <p:sldId id="261" r:id="rId11"/>
-    <p:sldId id="262" r:id="rId12"/>
-    <p:sldId id="263" r:id="rId13"/>
-    <p:sldId id="264" r:id="rId14"/>
-    <p:sldId id="265" r:id="rId15"/>
-    <p:sldId id="266" r:id="rId16"/>
-    <p:sldId id="267" r:id="rId17"/>
+    <p:sldId id="256" r:id="rId7"/>
+    <p:sldId id="257" r:id="rId8"/>
+    <p:sldId id="258" r:id="rId9"/>
+    <p:sldId id="259" r:id="rId10"/>
+    <p:sldId id="260" r:id="rId11"/>
+    <p:sldId id="261" r:id="rId12"/>
+    <p:sldId id="262" r:id="rId13"/>
+    <p:sldId id="263" r:id="rId14"/>
+    <p:sldId id="264" r:id="rId15"/>
+    <p:sldId id="265" r:id="rId16"/>
+    <p:sldId id="266" r:id="rId17"/>
+    <p:sldId id="267" r:id="rId18"/>
+    <p:sldId id="268" r:id="rId19"/>
+    <p:sldId id="269" r:id="rId20"/>
+    <p:sldId id="270" r:id="rId21"/>
   </p:sldIdLst>
   <p:sldSz cy="5143500" cx="9144000"/>
   <p:notesSz cx="6858000" cy="9144000"/>
   <p:embeddedFontLst>
     <p:embeddedFont>
       <p:font typeface="Montserrat"/>
-      <p:regular r:id="rId18"/>
-      <p:bold r:id="rId19"/>
-      <p:italic r:id="rId20"/>
-      <p:boldItalic r:id="rId21"/>
-    </p:embeddedFont>
-    <p:embeddedFont>
-      <p:font typeface="Lato"/>
       <p:regular r:id="rId22"/>
       <p:bold r:id="rId23"/>
       <p:italic r:id="rId24"/>
       <p:boldItalic r:id="rId25"/>
+    </p:embeddedFont>
+    <p:embeddedFont>
+      <p:font typeface="Lato"/>
+      <p:regular r:id="rId26"/>
+      <p:bold r:id="rId27"/>
+      <p:italic r:id="rId28"/>
+      <p:boldItalic r:id="rId29"/>
     </p:embeddedFont>
   </p:embeddedFontLst>
   <p:defaultTextStyle>
@@ -285,6 +288,30 @@
     </p:ext>
   </p:extLst>
 </p:presentation>
+</file>
+
+<file path=ppt/commentAuthors.xml><?xml version="1.0" encoding="utf-8"?>
+<p:cmAuthorLst xmlns:a="http://schemas.openxmlformats.org/drawingml/2006/main" xmlns:r="http://schemas.openxmlformats.org/officeDocument/2006/relationships" xmlns:mc="http://schemas.openxmlformats.org/markup-compatibility/2006" xmlns:mv="urn:schemas-microsoft-com:mac:vml" xmlns:p="http://schemas.openxmlformats.org/presentationml/2006/main" xmlns:c="http://schemas.openxmlformats.org/drawingml/2006/chart" xmlns:dgm="http://schemas.openxmlformats.org/drawingml/2006/diagram" xmlns:o="urn:schemas-microsoft-com:office:office" xmlns:v="urn:schemas-microsoft-com:vml" xmlns:pvml="urn:schemas-microsoft-com:office:powerpoint" xmlns:com="http://schemas.openxmlformats.org/drawingml/2006/compatibility" xmlns:p14="http://schemas.microsoft.com/office/powerpoint/2010/main" xmlns:p15="http://schemas.microsoft.com/office/powerpoint/2012/main" xmlns:ahyp="http://schemas.microsoft.com/office/drawing/2018/hyperlinkcolor">
+  <p:cmAuthor clrIdx="0" id="0" initials="" lastIdx="2" name="Szymon Kozłowski"/>
+</p:cmAuthorLst>
+</file>
+
+<file path=ppt/comments/comment1.xml><?xml version="1.0" encoding="utf-8"?>
+<p:cmLst xmlns:a="http://schemas.openxmlformats.org/drawingml/2006/main" xmlns:r="http://schemas.openxmlformats.org/officeDocument/2006/relationships" xmlns:mc="http://schemas.openxmlformats.org/markup-compatibility/2006" xmlns:mv="urn:schemas-microsoft-com:mac:vml" xmlns:p="http://schemas.openxmlformats.org/presentationml/2006/main" xmlns:c="http://schemas.openxmlformats.org/drawingml/2006/chart" xmlns:dgm="http://schemas.openxmlformats.org/drawingml/2006/diagram" xmlns:o="urn:schemas-microsoft-com:office:office" xmlns:v="urn:schemas-microsoft-com:vml" xmlns:pvml="urn:schemas-microsoft-com:office:powerpoint" xmlns:com="http://schemas.openxmlformats.org/drawingml/2006/compatibility" xmlns:p14="http://schemas.microsoft.com/office/powerpoint/2010/main" xmlns:p15="http://schemas.microsoft.com/office/powerpoint/2012/main" xmlns:ahyp="http://schemas.microsoft.com/office/drawing/2018/hyperlinkcolor">
+  <p:cm authorId="0" idx="1" dt="2025-04-24T07:02:54.004">
+    <p:pos x="6000" y="0"/>
+    <p:text>zasoby od firmy, zgody userów, rozmiar datasetów na slajdzie o danych, slajd o założeniach i targetach benchmarkowania;konkretne liczby i tlumaczenia</p:text>
+  </p:cm>
+</p:cmLst>
+</file>
+
+<file path=ppt/comments/comment2.xml><?xml version="1.0" encoding="utf-8"?>
+<p:cmLst xmlns:a="http://schemas.openxmlformats.org/drawingml/2006/main" xmlns:r="http://schemas.openxmlformats.org/officeDocument/2006/relationships" xmlns:mc="http://schemas.openxmlformats.org/markup-compatibility/2006" xmlns:mv="urn:schemas-microsoft-com:mac:vml" xmlns:p="http://schemas.openxmlformats.org/presentationml/2006/main" xmlns:c="http://schemas.openxmlformats.org/drawingml/2006/chart" xmlns:dgm="http://schemas.openxmlformats.org/drawingml/2006/diagram" xmlns:o="urn:schemas-microsoft-com:office:office" xmlns:v="urn:schemas-microsoft-com:vml" xmlns:pvml="urn:schemas-microsoft-com:office:powerpoint" xmlns:com="http://schemas.openxmlformats.org/drawingml/2006/compatibility" xmlns:p14="http://schemas.microsoft.com/office/powerpoint/2010/main" xmlns:p15="http://schemas.microsoft.com/office/powerpoint/2012/main" xmlns:ahyp="http://schemas.microsoft.com/office/drawing/2018/hyperlinkcolor">
+  <p:cm authorId="0" idx="2" dt="2025-04-15T10:50:52.505">
+    <p:pos x="6000" y="0"/>
+    <p:text>ja bym tu dał twój bertowski diagram</p:text>
+  </p:cm>
+</p:cmLst>
 </file>
 
 <file path=ppt/notesMasters/notesMaster1.xml><?xml version="1.0" encoding="utf-8"?>
@@ -817,7 +844,7 @@
   <p:cSld>
     <p:spTree>
       <p:nvGrpSpPr>
-        <p:cNvPr id="202" name="Shape 202"/>
+        <p:cNvPr id="197" name="Shape 197"/>
         <p:cNvGrpSpPr/>
         <p:nvPr/>
       </p:nvGrpSpPr>
@@ -831,7 +858,7 @@
       </p:grpSpPr>
       <p:sp>
         <p:nvSpPr>
-          <p:cNvPr id="203" name="Google Shape;203;g3523d13703c_0_0:notes"/>
+          <p:cNvPr id="198" name="Google Shape;198;g3508c605f85_0_8:notes"/>
           <p:cNvSpPr/>
           <p:nvPr>
             <p:ph idx="2" type="sldImg"/>
@@ -866,7 +893,7 @@
       </p:sp>
       <p:sp>
         <p:nvSpPr>
-          <p:cNvPr id="204" name="Google Shape;204;g3523d13703c_0_0:notes"/>
+          <p:cNvPr id="199" name="Google Shape;199;g3508c605f85_0_8:notes"/>
           <p:cNvSpPr txBox="1"/>
           <p:nvPr>
             <p:ph idx="1" type="body"/>
@@ -916,7 +943,7 @@
   <p:cSld>
     <p:spTree>
       <p:nvGrpSpPr>
-        <p:cNvPr id="208" name="Shape 208"/>
+        <p:cNvPr id="204" name="Shape 204"/>
         <p:cNvGrpSpPr/>
         <p:nvPr/>
       </p:nvGrpSpPr>
@@ -930,7 +957,7 @@
       </p:grpSpPr>
       <p:sp>
         <p:nvSpPr>
-          <p:cNvPr id="209" name="Google Shape;209;g352132635d5_0_1155:notes"/>
+          <p:cNvPr id="205" name="Google Shape;205;g34a720c2f31_0_28:notes"/>
           <p:cNvSpPr/>
           <p:nvPr>
             <p:ph idx="2" type="sldImg"/>
@@ -965,7 +992,7 @@
       </p:sp>
       <p:sp>
         <p:nvSpPr>
-          <p:cNvPr id="210" name="Google Shape;210;g352132635d5_0_1155:notes"/>
+          <p:cNvPr id="206" name="Google Shape;206;g34a720c2f31_0_28:notes"/>
           <p:cNvSpPr txBox="1"/>
           <p:nvPr>
             <p:ph idx="1" type="body"/>
@@ -996,7 +1023,8 @@
               <a:buNone/>
             </a:pPr>
             <a:r>
-              <a:t/>
+              <a:rPr lang="pl"/>
+              <a:t>wpomnieć tu coś o tym że wyzwaniem jest wgl odpalenie takiego modelu na telefonie</a:t>
             </a:r>
             <a:endParaRPr/>
           </a:p>
@@ -1015,7 +1043,7 @@
   <p:cSld>
     <p:spTree>
       <p:nvGrpSpPr>
-        <p:cNvPr id="216" name="Shape 216"/>
+        <p:cNvPr id="213" name="Shape 213"/>
         <p:cNvGrpSpPr/>
         <p:nvPr/>
       </p:nvGrpSpPr>
@@ -1029,7 +1057,7 @@
       </p:grpSpPr>
       <p:sp>
         <p:nvSpPr>
-          <p:cNvPr id="217" name="Google Shape;217;g352132635d5_0_1161:notes"/>
+          <p:cNvPr id="214" name="Google Shape;214;g34a720c2f31_0_35:notes"/>
           <p:cNvSpPr/>
           <p:nvPr>
             <p:ph idx="2" type="sldImg"/>
@@ -1064,7 +1092,305 @@
       </p:sp>
       <p:sp>
         <p:nvSpPr>
-          <p:cNvPr id="218" name="Google Shape;218;g352132635d5_0_1161:notes"/>
+          <p:cNvPr id="215" name="Google Shape;215;g34a720c2f31_0_35:notes"/>
+          <p:cNvSpPr txBox="1"/>
+          <p:nvPr>
+            <p:ph idx="1" type="body"/>
+          </p:nvPr>
+        </p:nvSpPr>
+        <p:spPr>
+          <a:xfrm>
+            <a:off x="685800" y="4343400"/>
+            <a:ext cx="5486400" cy="4114800"/>
+          </a:xfrm>
+          <a:prstGeom prst="rect">
+            <a:avLst/>
+          </a:prstGeom>
+        </p:spPr>
+        <p:txBody>
+          <a:bodyPr anchorCtr="0" anchor="t" bIns="91425" lIns="91425" spcFirstLastPara="1" rIns="91425" wrap="square" tIns="91425">
+            <a:noAutofit/>
+          </a:bodyPr>
+          <a:lstStyle/>
+          <a:p>
+            <a:pPr indent="0" lvl="0" marL="0" rtl="0" algn="l">
+              <a:spcBef>
+                <a:spcPts val="0"/>
+              </a:spcBef>
+              <a:spcAft>
+                <a:spcPts val="0"/>
+              </a:spcAft>
+              <a:buNone/>
+            </a:pPr>
+            <a:r>
+              <a:t/>
+            </a:r>
+            <a:endParaRPr/>
+          </a:p>
+        </p:txBody>
+      </p:sp>
+    </p:spTree>
+  </p:cSld>
+  <p:clrMapOvr>
+    <a:masterClrMapping/>
+  </p:clrMapOvr>
+</p:notes>
+</file>
+
+<file path=ppt/notesSlides/notesSlide13.xml><?xml version="1.0" encoding="utf-8"?>
+<p:notes xmlns:a="http://schemas.openxmlformats.org/drawingml/2006/main" xmlns:r="http://schemas.openxmlformats.org/officeDocument/2006/relationships" xmlns:mc="http://schemas.openxmlformats.org/markup-compatibility/2006" xmlns:mv="urn:schemas-microsoft-com:mac:vml" xmlns:p="http://schemas.openxmlformats.org/presentationml/2006/main" xmlns:c="http://schemas.openxmlformats.org/drawingml/2006/chart" xmlns:dgm="http://schemas.openxmlformats.org/drawingml/2006/diagram" xmlns:o="urn:schemas-microsoft-com:office:office" xmlns:v="urn:schemas-microsoft-com:vml" xmlns:pvml="urn:schemas-microsoft-com:office:powerpoint" xmlns:com="http://schemas.openxmlformats.org/drawingml/2006/compatibility" xmlns:p14="http://schemas.microsoft.com/office/powerpoint/2010/main" xmlns:p15="http://schemas.microsoft.com/office/powerpoint/2012/main" xmlns:ahyp="http://schemas.microsoft.com/office/drawing/2018/hyperlinkcolor" showMasterPhAnim="0" showMasterSp="0">
+  <p:cSld>
+    <p:spTree>
+      <p:nvGrpSpPr>
+        <p:cNvPr id="222" name="Shape 222"/>
+        <p:cNvGrpSpPr/>
+        <p:nvPr/>
+      </p:nvGrpSpPr>
+      <p:grpSpPr>
+        <a:xfrm>
+          <a:off x="0" y="0"/>
+          <a:ext cx="0" cy="0"/>
+          <a:chOff x="0" y="0"/>
+          <a:chExt cx="0" cy="0"/>
+        </a:xfrm>
+      </p:grpSpPr>
+      <p:sp>
+        <p:nvSpPr>
+          <p:cNvPr id="223" name="Google Shape;223;g3523d13703c_0_0:notes"/>
+          <p:cNvSpPr/>
+          <p:nvPr>
+            <p:ph idx="2" type="sldImg"/>
+          </p:nvPr>
+        </p:nvSpPr>
+        <p:spPr>
+          <a:xfrm>
+            <a:off x="381300" y="685800"/>
+            <a:ext cx="6096000" cy="3429000"/>
+          </a:xfrm>
+          <a:custGeom>
+            <a:rect b="b" l="l" r="r" t="t"/>
+            <a:pathLst>
+              <a:path extrusionOk="0" h="120000" w="120000">
+                <a:moveTo>
+                  <a:pt x="0" y="0"/>
+                </a:moveTo>
+                <a:lnTo>
+                  <a:pt x="120000" y="0"/>
+                </a:lnTo>
+                <a:lnTo>
+                  <a:pt x="120000" y="120000"/>
+                </a:lnTo>
+                <a:lnTo>
+                  <a:pt x="0" y="120000"/>
+                </a:lnTo>
+                <a:close/>
+              </a:path>
+            </a:pathLst>
+          </a:custGeom>
+        </p:spPr>
+      </p:sp>
+      <p:sp>
+        <p:nvSpPr>
+          <p:cNvPr id="224" name="Google Shape;224;g3523d13703c_0_0:notes"/>
+          <p:cNvSpPr txBox="1"/>
+          <p:nvPr>
+            <p:ph idx="1" type="body"/>
+          </p:nvPr>
+        </p:nvSpPr>
+        <p:spPr>
+          <a:xfrm>
+            <a:off x="685800" y="4343400"/>
+            <a:ext cx="5486400" cy="4114800"/>
+          </a:xfrm>
+          <a:prstGeom prst="rect">
+            <a:avLst/>
+          </a:prstGeom>
+        </p:spPr>
+        <p:txBody>
+          <a:bodyPr anchorCtr="0" anchor="t" bIns="91425" lIns="91425" spcFirstLastPara="1" rIns="91425" wrap="square" tIns="91425">
+            <a:noAutofit/>
+          </a:bodyPr>
+          <a:lstStyle/>
+          <a:p>
+            <a:pPr indent="0" lvl="0" marL="0" rtl="0" algn="l">
+              <a:spcBef>
+                <a:spcPts val="0"/>
+              </a:spcBef>
+              <a:spcAft>
+                <a:spcPts val="0"/>
+              </a:spcAft>
+              <a:buNone/>
+            </a:pPr>
+            <a:r>
+              <a:rPr lang="pl"/>
+              <a:t>nie zagłębiać się</a:t>
+            </a:r>
+            <a:endParaRPr/>
+          </a:p>
+        </p:txBody>
+      </p:sp>
+    </p:spTree>
+  </p:cSld>
+  <p:clrMapOvr>
+    <a:masterClrMapping/>
+  </p:clrMapOvr>
+</p:notes>
+</file>
+
+<file path=ppt/notesSlides/notesSlide14.xml><?xml version="1.0" encoding="utf-8"?>
+<p:notes xmlns:a="http://schemas.openxmlformats.org/drawingml/2006/main" xmlns:r="http://schemas.openxmlformats.org/officeDocument/2006/relationships" xmlns:mc="http://schemas.openxmlformats.org/markup-compatibility/2006" xmlns:mv="urn:schemas-microsoft-com:mac:vml" xmlns:p="http://schemas.openxmlformats.org/presentationml/2006/main" xmlns:c="http://schemas.openxmlformats.org/drawingml/2006/chart" xmlns:dgm="http://schemas.openxmlformats.org/drawingml/2006/diagram" xmlns:o="urn:schemas-microsoft-com:office:office" xmlns:v="urn:schemas-microsoft-com:vml" xmlns:pvml="urn:schemas-microsoft-com:office:powerpoint" xmlns:com="http://schemas.openxmlformats.org/drawingml/2006/compatibility" xmlns:p14="http://schemas.microsoft.com/office/powerpoint/2010/main" xmlns:p15="http://schemas.microsoft.com/office/powerpoint/2012/main" xmlns:ahyp="http://schemas.microsoft.com/office/drawing/2018/hyperlinkcolor" showMasterPhAnim="0" showMasterSp="0">
+  <p:cSld>
+    <p:spTree>
+      <p:nvGrpSpPr>
+        <p:cNvPr id="228" name="Shape 228"/>
+        <p:cNvGrpSpPr/>
+        <p:nvPr/>
+      </p:nvGrpSpPr>
+      <p:grpSpPr>
+        <a:xfrm>
+          <a:off x="0" y="0"/>
+          <a:ext cx="0" cy="0"/>
+          <a:chOff x="0" y="0"/>
+          <a:chExt cx="0" cy="0"/>
+        </a:xfrm>
+      </p:grpSpPr>
+      <p:sp>
+        <p:nvSpPr>
+          <p:cNvPr id="229" name="Google Shape;229;g352132635d5_0_1155:notes"/>
+          <p:cNvSpPr/>
+          <p:nvPr>
+            <p:ph idx="2" type="sldImg"/>
+          </p:nvPr>
+        </p:nvSpPr>
+        <p:spPr>
+          <a:xfrm>
+            <a:off x="381300" y="685800"/>
+            <a:ext cx="6096000" cy="3429000"/>
+          </a:xfrm>
+          <a:custGeom>
+            <a:rect b="b" l="l" r="r" t="t"/>
+            <a:pathLst>
+              <a:path extrusionOk="0" h="120000" w="120000">
+                <a:moveTo>
+                  <a:pt x="0" y="0"/>
+                </a:moveTo>
+                <a:lnTo>
+                  <a:pt x="120000" y="0"/>
+                </a:lnTo>
+                <a:lnTo>
+                  <a:pt x="120000" y="120000"/>
+                </a:lnTo>
+                <a:lnTo>
+                  <a:pt x="0" y="120000"/>
+                </a:lnTo>
+                <a:close/>
+              </a:path>
+            </a:pathLst>
+          </a:custGeom>
+        </p:spPr>
+      </p:sp>
+      <p:sp>
+        <p:nvSpPr>
+          <p:cNvPr id="230" name="Google Shape;230;g352132635d5_0_1155:notes"/>
+          <p:cNvSpPr txBox="1"/>
+          <p:nvPr>
+            <p:ph idx="1" type="body"/>
+          </p:nvPr>
+        </p:nvSpPr>
+        <p:spPr>
+          <a:xfrm>
+            <a:off x="685800" y="4343400"/>
+            <a:ext cx="5486400" cy="4114800"/>
+          </a:xfrm>
+          <a:prstGeom prst="rect">
+            <a:avLst/>
+          </a:prstGeom>
+        </p:spPr>
+        <p:txBody>
+          <a:bodyPr anchorCtr="0" anchor="t" bIns="91425" lIns="91425" spcFirstLastPara="1" rIns="91425" wrap="square" tIns="91425">
+            <a:noAutofit/>
+          </a:bodyPr>
+          <a:lstStyle/>
+          <a:p>
+            <a:pPr indent="0" lvl="0" marL="0" rtl="0" algn="l">
+              <a:spcBef>
+                <a:spcPts val="0"/>
+              </a:spcBef>
+              <a:spcAft>
+                <a:spcPts val="0"/>
+              </a:spcAft>
+              <a:buNone/>
+            </a:pPr>
+            <a:r>
+              <a:t/>
+            </a:r>
+            <a:endParaRPr/>
+          </a:p>
+        </p:txBody>
+      </p:sp>
+    </p:spTree>
+  </p:cSld>
+  <p:clrMapOvr>
+    <a:masterClrMapping/>
+  </p:clrMapOvr>
+</p:notes>
+</file>
+
+<file path=ppt/notesSlides/notesSlide15.xml><?xml version="1.0" encoding="utf-8"?>
+<p:notes xmlns:a="http://schemas.openxmlformats.org/drawingml/2006/main" xmlns:r="http://schemas.openxmlformats.org/officeDocument/2006/relationships" xmlns:mc="http://schemas.openxmlformats.org/markup-compatibility/2006" xmlns:mv="urn:schemas-microsoft-com:mac:vml" xmlns:p="http://schemas.openxmlformats.org/presentationml/2006/main" xmlns:c="http://schemas.openxmlformats.org/drawingml/2006/chart" xmlns:dgm="http://schemas.openxmlformats.org/drawingml/2006/diagram" xmlns:o="urn:schemas-microsoft-com:office:office" xmlns:v="urn:schemas-microsoft-com:vml" xmlns:pvml="urn:schemas-microsoft-com:office:powerpoint" xmlns:com="http://schemas.openxmlformats.org/drawingml/2006/compatibility" xmlns:p14="http://schemas.microsoft.com/office/powerpoint/2010/main" xmlns:p15="http://schemas.microsoft.com/office/powerpoint/2012/main" xmlns:ahyp="http://schemas.microsoft.com/office/drawing/2018/hyperlinkcolor" showMasterPhAnim="0" showMasterSp="0">
+  <p:cSld>
+    <p:spTree>
+      <p:nvGrpSpPr>
+        <p:cNvPr id="236" name="Shape 236"/>
+        <p:cNvGrpSpPr/>
+        <p:nvPr/>
+      </p:nvGrpSpPr>
+      <p:grpSpPr>
+        <a:xfrm>
+          <a:off x="0" y="0"/>
+          <a:ext cx="0" cy="0"/>
+          <a:chOff x="0" y="0"/>
+          <a:chExt cx="0" cy="0"/>
+        </a:xfrm>
+      </p:grpSpPr>
+      <p:sp>
+        <p:nvSpPr>
+          <p:cNvPr id="237" name="Google Shape;237;g352132635d5_0_1161:notes"/>
+          <p:cNvSpPr/>
+          <p:nvPr>
+            <p:ph idx="2" type="sldImg"/>
+          </p:nvPr>
+        </p:nvSpPr>
+        <p:spPr>
+          <a:xfrm>
+            <a:off x="381300" y="685800"/>
+            <a:ext cx="6096000" cy="3429000"/>
+          </a:xfrm>
+          <a:custGeom>
+            <a:rect b="b" l="l" r="r" t="t"/>
+            <a:pathLst>
+              <a:path extrusionOk="0" h="120000" w="120000">
+                <a:moveTo>
+                  <a:pt x="0" y="0"/>
+                </a:moveTo>
+                <a:lnTo>
+                  <a:pt x="120000" y="0"/>
+                </a:lnTo>
+                <a:lnTo>
+                  <a:pt x="120000" y="120000"/>
+                </a:lnTo>
+                <a:lnTo>
+                  <a:pt x="0" y="120000"/>
+                </a:lnTo>
+                <a:close/>
+              </a:path>
+            </a:pathLst>
+          </a:custGeom>
+        </p:spPr>
+      </p:sp>
+      <p:sp>
+        <p:nvSpPr>
+          <p:cNvPr id="238" name="Google Shape;238;g352132635d5_0_1161:notes"/>
           <p:cNvSpPr txBox="1"/>
           <p:nvPr>
             <p:ph idx="1" type="body"/>
@@ -1194,7 +1520,15 @@
               <a:buNone/>
             </a:pPr>
             <a:r>
-              <a:t/>
+              <a:rPr lang="pl"/>
+              <a:t>Q: where data will be stored</a:t>
+            </a:r>
+            <a:br>
+              <a:rPr lang="pl"/>
+            </a:br>
+            <a:r>
+              <a:rPr lang="pl"/>
+              <a:t>A: it will be sent to the external server, (server is outside of the scope of our project)</a:t>
             </a:r>
             <a:endParaRPr/>
           </a:p>
@@ -1227,7 +1561,7 @@
       </p:grpSpPr>
       <p:sp>
         <p:nvSpPr>
-          <p:cNvPr id="148" name="Google Shape;148;g34a720c2f31_0_17:notes"/>
+          <p:cNvPr id="148" name="Google Shape;148;g3508c605f85_0_0:notes"/>
           <p:cNvSpPr/>
           <p:nvPr>
             <p:ph idx="2" type="sldImg"/>
@@ -1262,7 +1596,7 @@
       </p:sp>
       <p:sp>
         <p:nvSpPr>
-          <p:cNvPr id="149" name="Google Shape;149;g34a720c2f31_0_17:notes"/>
+          <p:cNvPr id="149" name="Google Shape;149;g3508c605f85_0_0:notes"/>
           <p:cNvSpPr txBox="1"/>
           <p:nvPr>
             <p:ph idx="1" type="body"/>
@@ -1326,7 +1660,7 @@
       </p:grpSpPr>
       <p:sp>
         <p:nvSpPr>
-          <p:cNvPr id="155" name="Google Shape;155;g34a720c2f31_0_10:notes"/>
+          <p:cNvPr id="155" name="Google Shape;155;g34a720c2f31_0_17:notes"/>
           <p:cNvSpPr/>
           <p:nvPr>
             <p:ph idx="2" type="sldImg"/>
@@ -1361,7 +1695,7 @@
       </p:sp>
       <p:sp>
         <p:nvSpPr>
-          <p:cNvPr id="156" name="Google Shape;156;g34a720c2f31_0_10:notes"/>
+          <p:cNvPr id="156" name="Google Shape;156;g34a720c2f31_0_17:notes"/>
           <p:cNvSpPr txBox="1"/>
           <p:nvPr>
             <p:ph idx="1" type="body"/>
@@ -1392,7 +1726,8 @@
               <a:buNone/>
             </a:pPr>
             <a:r>
-              <a:t/>
+              <a:rPr lang="pl"/>
+              <a:t>As we get all the screen content it can possibly contain confidential/personal info</a:t>
             </a:r>
             <a:endParaRPr/>
           </a:p>
@@ -1411,7 +1746,7 @@
   <p:cSld>
     <p:spTree>
       <p:nvGrpSpPr>
-        <p:cNvPr id="160" name="Shape 160"/>
+        <p:cNvPr id="161" name="Shape 161"/>
         <p:cNvGrpSpPr/>
         <p:nvPr/>
       </p:nvGrpSpPr>
@@ -1425,7 +1760,7 @@
       </p:grpSpPr>
       <p:sp>
         <p:nvSpPr>
-          <p:cNvPr id="161" name="Google Shape;161;g3523cb17868_0_1:notes"/>
+          <p:cNvPr id="162" name="Google Shape;162;g34a720c2f31_0_10:notes"/>
           <p:cNvSpPr/>
           <p:nvPr>
             <p:ph idx="2" type="sldImg"/>
@@ -1460,7 +1795,7 @@
       </p:sp>
       <p:sp>
         <p:nvSpPr>
-          <p:cNvPr id="162" name="Google Shape;162;g3523cb17868_0_1:notes"/>
+          <p:cNvPr id="163" name="Google Shape;163;g34a720c2f31_0_10:notes"/>
           <p:cNvSpPr txBox="1"/>
           <p:nvPr>
             <p:ph idx="1" type="body"/>
@@ -1491,7 +1826,40 @@
               <a:buNone/>
             </a:pPr>
             <a:r>
-              <a:t/>
+              <a:rPr lang="pl"/>
+              <a:t>-obtained via Android Accessibility API</a:t>
+            </a:r>
+            <a:endParaRPr/>
+          </a:p>
+          <a:p>
+            <a:pPr indent="0" lvl="0" marL="0" rtl="0" algn="l">
+              <a:spcBef>
+                <a:spcPts val="0"/>
+              </a:spcBef>
+              <a:spcAft>
+                <a:spcPts val="0"/>
+              </a:spcAft>
+              <a:buNone/>
+            </a:pPr>
+            <a:r>
+              <a:rPr lang="pl"/>
+              <a:t>Q: what is the last col?</a:t>
+            </a:r>
+            <a:endParaRPr/>
+          </a:p>
+          <a:p>
+            <a:pPr indent="0" lvl="0" marL="0" rtl="0" algn="l">
+              <a:spcBef>
+                <a:spcPts val="0"/>
+              </a:spcBef>
+              <a:spcAft>
+                <a:spcPts val="0"/>
+              </a:spcAft>
+              <a:buNone/>
+            </a:pPr>
+            <a:r>
+              <a:rPr lang="pl"/>
+              <a:t>A: view depth in the XML tree</a:t>
             </a:r>
             <a:endParaRPr/>
           </a:p>
@@ -1510,7 +1878,7 @@
   <p:cSld>
     <p:spTree>
       <p:nvGrpSpPr>
-        <p:cNvPr id="168" name="Shape 168"/>
+        <p:cNvPr id="167" name="Shape 167"/>
         <p:cNvGrpSpPr/>
         <p:nvPr/>
       </p:nvGrpSpPr>
@@ -1524,7 +1892,7 @@
       </p:grpSpPr>
       <p:sp>
         <p:nvSpPr>
-          <p:cNvPr id="169" name="Google Shape;169;g34a720c2f31_0_22:notes"/>
+          <p:cNvPr id="168" name="Google Shape;168;g3508c605f85_0_13:notes"/>
           <p:cNvSpPr/>
           <p:nvPr>
             <p:ph idx="2" type="sldImg"/>
@@ -1559,7 +1927,7 @@
       </p:sp>
       <p:sp>
         <p:nvSpPr>
-          <p:cNvPr id="170" name="Google Shape;170;g34a720c2f31_0_22:notes"/>
+          <p:cNvPr id="169" name="Google Shape;169;g3508c605f85_0_13:notes"/>
           <p:cNvSpPr txBox="1"/>
           <p:nvPr>
             <p:ph idx="1" type="body"/>
@@ -1609,7 +1977,7 @@
   <p:cSld>
     <p:spTree>
       <p:nvGrpSpPr>
-        <p:cNvPr id="173" name="Shape 173"/>
+        <p:cNvPr id="174" name="Shape 174"/>
         <p:cNvGrpSpPr/>
         <p:nvPr/>
       </p:nvGrpSpPr>
@@ -1623,7 +1991,7 @@
       </p:grpSpPr>
       <p:sp>
         <p:nvSpPr>
-          <p:cNvPr id="174" name="Google Shape;174;g34b8f2231fd_0_0:notes"/>
+          <p:cNvPr id="175" name="Google Shape;175;g3523cb17868_0_1:notes"/>
           <p:cNvSpPr/>
           <p:nvPr>
             <p:ph idx="2" type="sldImg"/>
@@ -1658,7 +2026,7 @@
       </p:sp>
       <p:sp>
         <p:nvSpPr>
-          <p:cNvPr id="175" name="Google Shape;175;g34b8f2231fd_0_0:notes"/>
+          <p:cNvPr id="176" name="Google Shape;176;g3523cb17868_0_1:notes"/>
           <p:cNvSpPr txBox="1"/>
           <p:nvPr>
             <p:ph idx="1" type="body"/>
@@ -1689,7 +2057,15 @@
               <a:buNone/>
             </a:pPr>
             <a:r>
-              <a:t/>
+              <a:rPr lang="pl"/>
+              <a:t>Q: why not price as numeric value?</a:t>
+            </a:r>
+            <a:br>
+              <a:rPr lang="pl"/>
+            </a:br>
+            <a:r>
+              <a:rPr lang="pl"/>
+              <a:t>A: coupons might have nontrivial discounts, like get one free if you have spent at least $xyz on some product group</a:t>
             </a:r>
             <a:endParaRPr/>
           </a:p>
@@ -1708,7 +2084,7 @@
   <p:cSld>
     <p:spTree>
       <p:nvGrpSpPr>
-        <p:cNvPr id="184" name="Shape 184"/>
+        <p:cNvPr id="181" name="Shape 181"/>
         <p:cNvGrpSpPr/>
         <p:nvPr/>
       </p:nvGrpSpPr>
@@ -1722,7 +2098,7 @@
       </p:grpSpPr>
       <p:sp>
         <p:nvSpPr>
-          <p:cNvPr id="185" name="Google Shape;185;g34a720c2f31_0_28:notes"/>
+          <p:cNvPr id="182" name="Google Shape;182;g34a720c2f31_0_22:notes"/>
           <p:cNvSpPr/>
           <p:nvPr>
             <p:ph idx="2" type="sldImg"/>
@@ -1757,7 +2133,7 @@
       </p:sp>
       <p:sp>
         <p:nvSpPr>
-          <p:cNvPr id="186" name="Google Shape;186;g34a720c2f31_0_28:notes"/>
+          <p:cNvPr id="183" name="Google Shape;183;g34a720c2f31_0_22:notes"/>
           <p:cNvSpPr txBox="1"/>
           <p:nvPr>
             <p:ph idx="1" type="body"/>
@@ -1788,7 +2164,15 @@
               <a:buNone/>
             </a:pPr>
             <a:r>
-              <a:t/>
+              <a:rPr lang="pl"/>
+              <a:t>Q: how llms guarantee that no private data is considered as coupon and sent to the server?</a:t>
+            </a:r>
+            <a:br>
+              <a:rPr lang="pl"/>
+            </a:br>
+            <a:r>
+              <a:rPr lang="pl"/>
+              <a:t>A: It does not xd (idk what to say here)</a:t>
             </a:r>
             <a:endParaRPr/>
           </a:p>
@@ -1807,7 +2191,7 @@
   <p:cSld>
     <p:spTree>
       <p:nvGrpSpPr>
-        <p:cNvPr id="193" name="Shape 193"/>
+        <p:cNvPr id="186" name="Shape 186"/>
         <p:cNvGrpSpPr/>
         <p:nvPr/>
       </p:nvGrpSpPr>
@@ -1821,7 +2205,7 @@
       </p:grpSpPr>
       <p:sp>
         <p:nvSpPr>
-          <p:cNvPr id="194" name="Google Shape;194;g34a720c2f31_0_35:notes"/>
+          <p:cNvPr id="187" name="Google Shape;187;g34b8f2231fd_0_0:notes"/>
           <p:cNvSpPr/>
           <p:nvPr>
             <p:ph idx="2" type="sldImg"/>
@@ -1856,7 +2240,7 @@
       </p:sp>
       <p:sp>
         <p:nvSpPr>
-          <p:cNvPr id="195" name="Google Shape;195;g34a720c2f31_0_35:notes"/>
+          <p:cNvPr id="188" name="Google Shape;188;g34b8f2231fd_0_0:notes"/>
           <p:cNvSpPr txBox="1"/>
           <p:nvPr>
             <p:ph idx="1" type="body"/>
@@ -10316,7 +10700,7 @@
   <p:cSld>
     <p:spTree>
       <p:nvGrpSpPr>
-        <p:cNvPr id="205" name="Shape 205"/>
+        <p:cNvPr id="200" name="Shape 200"/>
         <p:cNvGrpSpPr/>
         <p:nvPr/>
       </p:nvGrpSpPr>
@@ -10330,7 +10714,192 @@
       </p:grpSpPr>
       <p:sp>
         <p:nvSpPr>
-          <p:cNvPr id="206" name="Google Shape;206;p22"/>
+          <p:cNvPr id="201" name="Google Shape;201;p22"/>
+          <p:cNvSpPr txBox="1"/>
+          <p:nvPr>
+            <p:ph type="title"/>
+          </p:nvPr>
+        </p:nvSpPr>
+        <p:spPr>
+          <a:xfrm>
+            <a:off x="1297500" y="653450"/>
+            <a:ext cx="7038900" cy="914100"/>
+          </a:xfrm>
+          <a:prstGeom prst="rect">
+            <a:avLst/>
+          </a:prstGeom>
+        </p:spPr>
+        <p:txBody>
+          <a:bodyPr anchorCtr="0" anchor="t" bIns="91425" lIns="91425" spcFirstLastPara="1" rIns="91425" wrap="square" tIns="91425">
+            <a:normAutofit/>
+          </a:bodyPr>
+          <a:lstStyle/>
+          <a:p>
+            <a:pPr indent="0" lvl="0" marL="0" rtl="0" algn="l">
+              <a:spcBef>
+                <a:spcPts val="0"/>
+              </a:spcBef>
+              <a:spcAft>
+                <a:spcPts val="0"/>
+              </a:spcAft>
+              <a:buNone/>
+            </a:pPr>
+            <a:r>
+              <a:rPr lang="pl"/>
+              <a:t>What did Murmuras provide us with</a:t>
+            </a:r>
+            <a:endParaRPr/>
+          </a:p>
+        </p:txBody>
+      </p:sp>
+      <p:sp>
+        <p:nvSpPr>
+          <p:cNvPr id="202" name="Google Shape;202;p22"/>
+          <p:cNvSpPr txBox="1"/>
+          <p:nvPr>
+            <p:ph idx="1" type="body"/>
+          </p:nvPr>
+        </p:nvSpPr>
+        <p:spPr>
+          <a:xfrm>
+            <a:off x="1297500" y="1567550"/>
+            <a:ext cx="7038900" cy="2911200"/>
+          </a:xfrm>
+          <a:prstGeom prst="rect">
+            <a:avLst/>
+          </a:prstGeom>
+        </p:spPr>
+        <p:txBody>
+          <a:bodyPr anchorCtr="0" anchor="t" bIns="91425" lIns="91425" spcFirstLastPara="1" rIns="91425" wrap="square" tIns="91425">
+            <a:normAutofit/>
+          </a:bodyPr>
+          <a:lstStyle/>
+          <a:p>
+            <a:pPr indent="-342900" lvl="0" marL="457200" rtl="0" algn="l">
+              <a:spcBef>
+                <a:spcPts val="0"/>
+              </a:spcBef>
+              <a:spcAft>
+                <a:spcPts val="0"/>
+              </a:spcAft>
+              <a:buSzPts val="1800"/>
+              <a:buChar char="●"/>
+            </a:pPr>
+            <a:r>
+              <a:rPr lang="pl" sz="1800"/>
+              <a:t>Datasets</a:t>
+            </a:r>
+            <a:endParaRPr sz="1800"/>
+          </a:p>
+          <a:p>
+            <a:pPr indent="-342900" lvl="0" marL="457200" rtl="0" algn="l">
+              <a:spcBef>
+                <a:spcPts val="0"/>
+              </a:spcBef>
+              <a:spcAft>
+                <a:spcPts val="0"/>
+              </a:spcAft>
+              <a:buSzPts val="1800"/>
+              <a:buChar char="●"/>
+            </a:pPr>
+            <a:r>
+              <a:rPr lang="pl" sz="1800"/>
+              <a:t>Credits for ChatGPT</a:t>
+            </a:r>
+            <a:endParaRPr sz="1800"/>
+          </a:p>
+          <a:p>
+            <a:pPr indent="-342900" lvl="0" marL="457200" rtl="0" algn="l">
+              <a:spcBef>
+                <a:spcPts val="0"/>
+              </a:spcBef>
+              <a:spcAft>
+                <a:spcPts val="0"/>
+              </a:spcAft>
+              <a:buSzPts val="1800"/>
+              <a:buChar char="●"/>
+            </a:pPr>
+            <a:r>
+              <a:rPr lang="pl" sz="1800"/>
+              <a:t>Credits for Modal</a:t>
+            </a:r>
+            <a:endParaRPr sz="1800"/>
+          </a:p>
+          <a:p>
+            <a:pPr indent="-342900" lvl="0" marL="457200" rtl="0" algn="l">
+              <a:spcBef>
+                <a:spcPts val="0"/>
+              </a:spcBef>
+              <a:spcAft>
+                <a:spcPts val="0"/>
+              </a:spcAft>
+              <a:buSzPts val="1800"/>
+              <a:buChar char="●"/>
+            </a:pPr>
+            <a:r>
+              <a:rPr lang="pl" sz="1800"/>
+              <a:t>Weekly knowledge exchange</a:t>
+            </a:r>
+            <a:endParaRPr sz="1800"/>
+          </a:p>
+        </p:txBody>
+      </p:sp>
+      <p:pic>
+        <p:nvPicPr>
+          <p:cNvPr id="203" name="Google Shape;203;p22" title="Fw3P.gif"/>
+          <p:cNvPicPr preferRelativeResize="0"/>
+          <p:nvPr/>
+        </p:nvPicPr>
+        <p:blipFill>
+          <a:blip r:embed="rId3">
+            <a:alphaModFix/>
+          </a:blip>
+          <a:stretch>
+            <a:fillRect/>
+          </a:stretch>
+        </p:blipFill>
+        <p:spPr>
+          <a:xfrm>
+            <a:off x="5803150" y="1567550"/>
+            <a:ext cx="2533250" cy="2533250"/>
+          </a:xfrm>
+          <a:prstGeom prst="rect">
+            <a:avLst/>
+          </a:prstGeom>
+          <a:noFill/>
+          <a:ln>
+            <a:noFill/>
+          </a:ln>
+        </p:spPr>
+      </p:pic>
+    </p:spTree>
+  </p:cSld>
+  <p:clrMapOvr>
+    <a:masterClrMapping/>
+  </p:clrMapOvr>
+</p:sld>
+</file>
+
+<file path=ppt/slides/slide11.xml><?xml version="1.0" encoding="utf-8"?>
+<p:sld xmlns:a="http://schemas.openxmlformats.org/drawingml/2006/main" xmlns:r="http://schemas.openxmlformats.org/officeDocument/2006/relationships" xmlns:mc="http://schemas.openxmlformats.org/markup-compatibility/2006" xmlns:mv="urn:schemas-microsoft-com:mac:vml" xmlns:p="http://schemas.openxmlformats.org/presentationml/2006/main" xmlns:c="http://schemas.openxmlformats.org/drawingml/2006/chart" xmlns:dgm="http://schemas.openxmlformats.org/drawingml/2006/diagram" xmlns:o="urn:schemas-microsoft-com:office:office" xmlns:v="urn:schemas-microsoft-com:vml" xmlns:pvml="urn:schemas-microsoft-com:office:powerpoint" xmlns:com="http://schemas.openxmlformats.org/drawingml/2006/compatibility" xmlns:p14="http://schemas.microsoft.com/office/powerpoint/2010/main" xmlns:p15="http://schemas.microsoft.com/office/powerpoint/2012/main" xmlns:ahyp="http://schemas.microsoft.com/office/drawing/2018/hyperlinkcolor">
+  <p:cSld>
+    <p:spTree>
+      <p:nvGrpSpPr>
+        <p:cNvPr id="207" name="Shape 207"/>
+        <p:cNvGrpSpPr/>
+        <p:nvPr/>
+      </p:nvGrpSpPr>
+      <p:grpSpPr>
+        <a:xfrm>
+          <a:off x="0" y="0"/>
+          <a:ext cx="0" cy="0"/>
+          <a:chOff x="0" y="0"/>
+          <a:chExt cx="0" cy="0"/>
+        </a:xfrm>
+      </p:grpSpPr>
+      <p:sp>
+        <p:nvSpPr>
+          <p:cNvPr id="208" name="Google Shape;208;p23"/>
           <p:cNvSpPr txBox="1"/>
           <p:nvPr>
             <p:ph type="title"/>
@@ -10361,6 +10930,737 @@
               <a:buNone/>
             </a:pPr>
             <a:r>
+              <a:rPr lang="pl">
+                <a:latin typeface="Lato"/>
+                <a:ea typeface="Lato"/>
+                <a:cs typeface="Lato"/>
+                <a:sym typeface="Lato"/>
+              </a:rPr>
+              <a:t>Approach 1: simply prompt it - Llama</a:t>
+            </a:r>
+            <a:endParaRPr>
+              <a:latin typeface="Lato"/>
+              <a:ea typeface="Lato"/>
+              <a:cs typeface="Lato"/>
+              <a:sym typeface="Lato"/>
+            </a:endParaRPr>
+          </a:p>
+        </p:txBody>
+      </p:sp>
+      <p:sp>
+        <p:nvSpPr>
+          <p:cNvPr id="209" name="Google Shape;209;p23"/>
+          <p:cNvSpPr txBox="1"/>
+          <p:nvPr>
+            <p:ph idx="1" type="body"/>
+          </p:nvPr>
+        </p:nvSpPr>
+        <p:spPr>
+          <a:xfrm>
+            <a:off x="1127125" y="1396400"/>
+            <a:ext cx="3698700" cy="1210200"/>
+          </a:xfrm>
+          <a:prstGeom prst="rect">
+            <a:avLst/>
+          </a:prstGeom>
+        </p:spPr>
+        <p:txBody>
+          <a:bodyPr anchorCtr="0" anchor="t" bIns="91425" lIns="91425" spcFirstLastPara="1" rIns="91425" wrap="square" tIns="91425">
+            <a:normAutofit/>
+          </a:bodyPr>
+          <a:lstStyle/>
+          <a:p>
+            <a:pPr indent="0" lvl="0" marL="0" rtl="0" algn="l">
+              <a:spcBef>
+                <a:spcPts val="0"/>
+              </a:spcBef>
+              <a:spcAft>
+                <a:spcPts val="1200"/>
+              </a:spcAft>
+              <a:buNone/>
+            </a:pPr>
+            <a:r>
+              <a:rPr lang="pl"/>
+              <a:t>We need relatively smart model</a:t>
+            </a:r>
+            <a:br>
+              <a:rPr lang="pl"/>
+            </a:br>
+            <a:br>
+              <a:rPr lang="pl"/>
+            </a:br>
+            <a:r>
+              <a:rPr lang="pl"/>
+              <a:t>Further optimizations: Q5 quantizations, Llama.cpp</a:t>
+            </a:r>
+            <a:endParaRPr/>
+          </a:p>
+        </p:txBody>
+      </p:sp>
+      <p:sp>
+        <p:nvSpPr>
+          <p:cNvPr id="210" name="Google Shape;210;p23"/>
+          <p:cNvSpPr txBox="1"/>
+          <p:nvPr>
+            <p:ph idx="1" type="body"/>
+          </p:nvPr>
+        </p:nvSpPr>
+        <p:spPr>
+          <a:xfrm>
+            <a:off x="5043400" y="1396400"/>
+            <a:ext cx="3964200" cy="959400"/>
+          </a:xfrm>
+          <a:prstGeom prst="rect">
+            <a:avLst/>
+          </a:prstGeom>
+        </p:spPr>
+        <p:txBody>
+          <a:bodyPr anchorCtr="0" anchor="t" bIns="91425" lIns="91425" spcFirstLastPara="1" rIns="91425" wrap="square" tIns="91425">
+            <a:normAutofit/>
+          </a:bodyPr>
+          <a:lstStyle/>
+          <a:p>
+            <a:pPr indent="0" lvl="0" marL="0" rtl="0" algn="l">
+              <a:spcBef>
+                <a:spcPts val="0"/>
+              </a:spcBef>
+              <a:spcAft>
+                <a:spcPts val="0"/>
+              </a:spcAft>
+              <a:buNone/>
+            </a:pPr>
+            <a:r>
+              <a:rPr lang="pl"/>
+              <a:t>Llama-3.2</a:t>
+            </a:r>
+            <a:endParaRPr/>
+          </a:p>
+          <a:p>
+            <a:pPr indent="0" lvl="0" marL="0" rtl="0" algn="l">
+              <a:spcBef>
+                <a:spcPts val="1200"/>
+              </a:spcBef>
+              <a:spcAft>
+                <a:spcPts val="1200"/>
+              </a:spcAft>
+              <a:buNone/>
+            </a:pPr>
+            <a:r>
+              <a:rPr lang="pl"/>
+              <a:t>appr. 1 billion params</a:t>
+            </a:r>
+            <a:endParaRPr/>
+          </a:p>
+        </p:txBody>
+      </p:sp>
+      <p:sp>
+        <p:nvSpPr>
+          <p:cNvPr id="211" name="Google Shape;211;p23"/>
+          <p:cNvSpPr txBox="1"/>
+          <p:nvPr/>
+        </p:nvSpPr>
+        <p:spPr>
+          <a:xfrm>
+            <a:off x="1127125" y="3029800"/>
+            <a:ext cx="3698700" cy="1462200"/>
+          </a:xfrm>
+          <a:prstGeom prst="rect">
+            <a:avLst/>
+          </a:prstGeom>
+          <a:noFill/>
+          <a:ln>
+            <a:noFill/>
+          </a:ln>
+        </p:spPr>
+        <p:txBody>
+          <a:bodyPr anchorCtr="0" anchor="t" bIns="91425" lIns="91425" spcFirstLastPara="1" rIns="91425" wrap="square" tIns="91425">
+            <a:spAutoFit/>
+          </a:bodyPr>
+          <a:lstStyle/>
+          <a:p>
+            <a:pPr indent="0" lvl="0" marL="0" rtl="0" algn="l">
+              <a:spcBef>
+                <a:spcPts val="0"/>
+              </a:spcBef>
+              <a:spcAft>
+                <a:spcPts val="0"/>
+              </a:spcAft>
+              <a:buNone/>
+            </a:pPr>
+            <a:r>
+              <a:rPr lang="pl" sz="1300">
+                <a:solidFill>
+                  <a:schemeClr val="dk2"/>
+                </a:solidFill>
+                <a:latin typeface="Lato"/>
+                <a:ea typeface="Lato"/>
+                <a:cs typeface="Lato"/>
+                <a:sym typeface="Lato"/>
+              </a:rPr>
+              <a:t>Fine tuning - Uns</a:t>
+            </a:r>
+            <a:r>
+              <a:rPr lang="pl" sz="1300">
+                <a:solidFill>
+                  <a:schemeClr val="dk2"/>
+                </a:solidFill>
+                <a:latin typeface="Lato"/>
+                <a:ea typeface="Lato"/>
+                <a:cs typeface="Lato"/>
+                <a:sym typeface="Lato"/>
+              </a:rPr>
+              <a:t>loth</a:t>
+            </a:r>
+            <a:r>
+              <a:rPr lang="pl" sz="1300">
+                <a:solidFill>
+                  <a:schemeClr val="dk2"/>
+                </a:solidFill>
+                <a:latin typeface="Lato"/>
+                <a:ea typeface="Lato"/>
+                <a:cs typeface="Lato"/>
+                <a:sym typeface="Lato"/>
+              </a:rPr>
+              <a:t>, Modal, LoRA</a:t>
+            </a:r>
+            <a:br>
+              <a:rPr lang="pl" sz="1300">
+                <a:solidFill>
+                  <a:schemeClr val="dk2"/>
+                </a:solidFill>
+                <a:latin typeface="Lato"/>
+                <a:ea typeface="Lato"/>
+                <a:cs typeface="Lato"/>
+                <a:sym typeface="Lato"/>
+              </a:rPr>
+            </a:br>
+            <a:br>
+              <a:rPr lang="pl" sz="1300">
+                <a:solidFill>
+                  <a:schemeClr val="dk2"/>
+                </a:solidFill>
+                <a:latin typeface="Lato"/>
+                <a:ea typeface="Lato"/>
+                <a:cs typeface="Lato"/>
+                <a:sym typeface="Lato"/>
+              </a:rPr>
+            </a:br>
+            <a:r>
+              <a:rPr lang="pl" sz="1300">
+                <a:solidFill>
+                  <a:schemeClr val="dk2"/>
+                </a:solidFill>
+                <a:latin typeface="Lato"/>
+                <a:ea typeface="Lato"/>
+                <a:cs typeface="Lato"/>
+                <a:sym typeface="Lato"/>
+              </a:rPr>
+              <a:t>Our dataset - around 10k samples</a:t>
+            </a:r>
+            <a:br>
+              <a:rPr lang="pl" sz="1300">
+                <a:solidFill>
+                  <a:schemeClr val="dk2"/>
+                </a:solidFill>
+                <a:latin typeface="Lato"/>
+                <a:ea typeface="Lato"/>
+                <a:cs typeface="Lato"/>
+                <a:sym typeface="Lato"/>
+              </a:rPr>
+            </a:br>
+            <a:br>
+              <a:rPr lang="pl" sz="1300">
+                <a:solidFill>
+                  <a:schemeClr val="dk2"/>
+                </a:solidFill>
+                <a:latin typeface="Lato"/>
+                <a:ea typeface="Lato"/>
+                <a:cs typeface="Lato"/>
+                <a:sym typeface="Lato"/>
+              </a:rPr>
+            </a:br>
+            <a:r>
+              <a:rPr lang="pl" sz="1300">
+                <a:solidFill>
+                  <a:schemeClr val="dk2"/>
+                </a:solidFill>
+                <a:latin typeface="Lato"/>
+                <a:ea typeface="Lato"/>
+                <a:cs typeface="Lato"/>
+                <a:sym typeface="Lato"/>
+              </a:rPr>
+              <a:t>Single fine tuning ~30min on H100</a:t>
+            </a:r>
+            <a:endParaRPr sz="1300">
+              <a:solidFill>
+                <a:schemeClr val="dk2"/>
+              </a:solidFill>
+              <a:latin typeface="Lato"/>
+              <a:ea typeface="Lato"/>
+              <a:cs typeface="Lato"/>
+              <a:sym typeface="Lato"/>
+            </a:endParaRPr>
+          </a:p>
+          <a:p>
+            <a:pPr indent="0" lvl="0" marL="0" rtl="0" algn="l">
+              <a:spcBef>
+                <a:spcPts val="0"/>
+              </a:spcBef>
+              <a:spcAft>
+                <a:spcPts val="0"/>
+              </a:spcAft>
+              <a:buNone/>
+            </a:pPr>
+            <a:r>
+              <a:t/>
+            </a:r>
+            <a:endParaRPr sz="1800">
+              <a:solidFill>
+                <a:schemeClr val="dk2"/>
+              </a:solidFill>
+              <a:latin typeface="Lato"/>
+              <a:ea typeface="Lato"/>
+              <a:cs typeface="Lato"/>
+              <a:sym typeface="Lato"/>
+            </a:endParaRPr>
+          </a:p>
+        </p:txBody>
+      </p:sp>
+      <p:pic>
+        <p:nvPicPr>
+          <p:cNvPr id="212" name="Google Shape;212;p23"/>
+          <p:cNvPicPr preferRelativeResize="0"/>
+          <p:nvPr/>
+        </p:nvPicPr>
+        <p:blipFill>
+          <a:blip r:embed="rId3">
+            <a:alphaModFix/>
+          </a:blip>
+          <a:stretch>
+            <a:fillRect/>
+          </a:stretch>
+        </p:blipFill>
+        <p:spPr>
+          <a:xfrm>
+            <a:off x="5043400" y="2571750"/>
+            <a:ext cx="2853050" cy="1953150"/>
+          </a:xfrm>
+          <a:prstGeom prst="rect">
+            <a:avLst/>
+          </a:prstGeom>
+          <a:noFill/>
+          <a:ln>
+            <a:noFill/>
+          </a:ln>
+        </p:spPr>
+      </p:pic>
+    </p:spTree>
+  </p:cSld>
+  <p:clrMapOvr>
+    <a:masterClrMapping/>
+  </p:clrMapOvr>
+</p:sld>
+</file>
+
+<file path=ppt/slides/slide12.xml><?xml version="1.0" encoding="utf-8"?>
+<p:sld xmlns:a="http://schemas.openxmlformats.org/drawingml/2006/main" xmlns:r="http://schemas.openxmlformats.org/officeDocument/2006/relationships" xmlns:mc="http://schemas.openxmlformats.org/markup-compatibility/2006" xmlns:mv="urn:schemas-microsoft-com:mac:vml" xmlns:p="http://schemas.openxmlformats.org/presentationml/2006/main" xmlns:c="http://schemas.openxmlformats.org/drawingml/2006/chart" xmlns:dgm="http://schemas.openxmlformats.org/drawingml/2006/diagram" xmlns:o="urn:schemas-microsoft-com:office:office" xmlns:v="urn:schemas-microsoft-com:vml" xmlns:pvml="urn:schemas-microsoft-com:office:powerpoint" xmlns:com="http://schemas.openxmlformats.org/drawingml/2006/compatibility" xmlns:p14="http://schemas.microsoft.com/office/powerpoint/2010/main" xmlns:p15="http://schemas.microsoft.com/office/powerpoint/2012/main" xmlns:ahyp="http://schemas.microsoft.com/office/drawing/2018/hyperlinkcolor">
+  <p:cSld>
+    <p:spTree>
+      <p:nvGrpSpPr>
+        <p:cNvPr id="216" name="Shape 216"/>
+        <p:cNvGrpSpPr/>
+        <p:nvPr/>
+      </p:nvGrpSpPr>
+      <p:grpSpPr>
+        <a:xfrm>
+          <a:off x="0" y="0"/>
+          <a:ext cx="0" cy="0"/>
+          <a:chOff x="0" y="0"/>
+          <a:chExt cx="0" cy="0"/>
+        </a:xfrm>
+      </p:grpSpPr>
+      <p:sp>
+        <p:nvSpPr>
+          <p:cNvPr id="217" name="Google Shape;217;p24"/>
+          <p:cNvSpPr txBox="1"/>
+          <p:nvPr>
+            <p:ph type="title"/>
+          </p:nvPr>
+        </p:nvSpPr>
+        <p:spPr>
+          <a:xfrm>
+            <a:off x="1297500" y="505250"/>
+            <a:ext cx="7038900" cy="914100"/>
+          </a:xfrm>
+          <a:prstGeom prst="rect">
+            <a:avLst/>
+          </a:prstGeom>
+        </p:spPr>
+        <p:txBody>
+          <a:bodyPr anchorCtr="0" anchor="t" bIns="91425" lIns="91425" spcFirstLastPara="1" rIns="91425" wrap="square" tIns="91425">
+            <a:normAutofit/>
+          </a:bodyPr>
+          <a:lstStyle/>
+          <a:p>
+            <a:pPr indent="0" lvl="0" marL="0" rtl="0" algn="l">
+              <a:spcBef>
+                <a:spcPts val="0"/>
+              </a:spcBef>
+              <a:spcAft>
+                <a:spcPts val="0"/>
+              </a:spcAft>
+              <a:buNone/>
+            </a:pPr>
+            <a:r>
+              <a:rPr lang="pl">
+                <a:latin typeface="Lato"/>
+                <a:ea typeface="Lato"/>
+                <a:cs typeface="Lato"/>
+                <a:sym typeface="Lato"/>
+              </a:rPr>
+              <a:t>Approach 2: utilize NER</a:t>
+            </a:r>
+            <a:endParaRPr>
+              <a:latin typeface="Lato"/>
+              <a:ea typeface="Lato"/>
+              <a:cs typeface="Lato"/>
+              <a:sym typeface="Lato"/>
+            </a:endParaRPr>
+          </a:p>
+        </p:txBody>
+      </p:sp>
+      <p:sp>
+        <p:nvSpPr>
+          <p:cNvPr id="218" name="Google Shape;218;p24"/>
+          <p:cNvSpPr txBox="1"/>
+          <p:nvPr>
+            <p:ph idx="1" type="body"/>
+          </p:nvPr>
+        </p:nvSpPr>
+        <p:spPr>
+          <a:xfrm>
+            <a:off x="1297500" y="1475050"/>
+            <a:ext cx="3013800" cy="1041000"/>
+          </a:xfrm>
+          <a:prstGeom prst="rect">
+            <a:avLst/>
+          </a:prstGeom>
+        </p:spPr>
+        <p:txBody>
+          <a:bodyPr anchorCtr="0" anchor="t" bIns="91425" lIns="91425" spcFirstLastPara="1" rIns="91425" wrap="square" tIns="91425">
+            <a:normAutofit/>
+          </a:bodyPr>
+          <a:lstStyle/>
+          <a:p>
+            <a:pPr indent="0" lvl="0" marL="0" rtl="0" algn="l">
+              <a:spcBef>
+                <a:spcPts val="0"/>
+              </a:spcBef>
+              <a:spcAft>
+                <a:spcPts val="0"/>
+              </a:spcAft>
+              <a:buNone/>
+            </a:pPr>
+            <a:r>
+              <a:rPr lang="pl"/>
+              <a:t>Named Entity Recognition</a:t>
+            </a:r>
+            <a:endParaRPr/>
+          </a:p>
+          <a:p>
+            <a:pPr indent="0" lvl="0" marL="0" rtl="0" algn="l">
+              <a:spcBef>
+                <a:spcPts val="1200"/>
+              </a:spcBef>
+              <a:spcAft>
+                <a:spcPts val="1200"/>
+              </a:spcAft>
+              <a:buNone/>
+            </a:pPr>
+            <a:r>
+              <a:rPr lang="pl"/>
+              <a:t>Powered By BERT - around 150mln params</a:t>
+            </a:r>
+            <a:endParaRPr/>
+          </a:p>
+        </p:txBody>
+      </p:sp>
+      <p:sp>
+        <p:nvSpPr>
+          <p:cNvPr id="219" name="Google Shape;219;p24"/>
+          <p:cNvSpPr txBox="1"/>
+          <p:nvPr/>
+        </p:nvSpPr>
+        <p:spPr>
+          <a:xfrm>
+            <a:off x="1297500" y="2571750"/>
+            <a:ext cx="3274500" cy="1169700"/>
+          </a:xfrm>
+          <a:prstGeom prst="rect">
+            <a:avLst/>
+          </a:prstGeom>
+          <a:noFill/>
+          <a:ln>
+            <a:noFill/>
+          </a:ln>
+        </p:spPr>
+        <p:txBody>
+          <a:bodyPr anchorCtr="0" anchor="t" bIns="91425" lIns="91425" spcFirstLastPara="1" rIns="91425" wrap="square" tIns="91425">
+            <a:spAutoFit/>
+          </a:bodyPr>
+          <a:lstStyle/>
+          <a:p>
+            <a:pPr indent="0" lvl="0" marL="0" rtl="0" algn="l">
+              <a:spcBef>
+                <a:spcPts val="0"/>
+              </a:spcBef>
+              <a:spcAft>
+                <a:spcPts val="0"/>
+              </a:spcAft>
+              <a:buNone/>
+            </a:pPr>
+            <a:r>
+              <a:rPr lang="pl" sz="1600">
+                <a:solidFill>
+                  <a:schemeClr val="dk2"/>
+                </a:solidFill>
+                <a:latin typeface="Lato"/>
+                <a:ea typeface="Lato"/>
+                <a:cs typeface="Lato"/>
+                <a:sym typeface="Lato"/>
+              </a:rPr>
+              <a:t>Two phases:</a:t>
+            </a:r>
+            <a:endParaRPr sz="1600">
+              <a:solidFill>
+                <a:schemeClr val="dk2"/>
+              </a:solidFill>
+              <a:latin typeface="Lato"/>
+              <a:ea typeface="Lato"/>
+              <a:cs typeface="Lato"/>
+              <a:sym typeface="Lato"/>
+            </a:endParaRPr>
+          </a:p>
+          <a:p>
+            <a:pPr indent="-330200" lvl="0" marL="457200" rtl="0" algn="l">
+              <a:spcBef>
+                <a:spcPts val="0"/>
+              </a:spcBef>
+              <a:spcAft>
+                <a:spcPts val="0"/>
+              </a:spcAft>
+              <a:buClr>
+                <a:schemeClr val="dk2"/>
+              </a:buClr>
+              <a:buSzPts val="1600"/>
+              <a:buFont typeface="Lato"/>
+              <a:buChar char="●"/>
+            </a:pPr>
+            <a:r>
+              <a:rPr lang="pl" sz="1600">
+                <a:solidFill>
+                  <a:schemeClr val="dk2"/>
+                </a:solidFill>
+                <a:latin typeface="Lato"/>
+                <a:ea typeface="Lato"/>
+                <a:cs typeface="Lato"/>
+                <a:sym typeface="Lato"/>
+              </a:rPr>
+              <a:t>Select coupon contents</a:t>
+            </a:r>
+            <a:endParaRPr sz="1600">
+              <a:solidFill>
+                <a:schemeClr val="dk2"/>
+              </a:solidFill>
+              <a:latin typeface="Lato"/>
+              <a:ea typeface="Lato"/>
+              <a:cs typeface="Lato"/>
+              <a:sym typeface="Lato"/>
+            </a:endParaRPr>
+          </a:p>
+          <a:p>
+            <a:pPr indent="-330200" lvl="0" marL="457200" rtl="0" algn="l">
+              <a:spcBef>
+                <a:spcPts val="0"/>
+              </a:spcBef>
+              <a:spcAft>
+                <a:spcPts val="0"/>
+              </a:spcAft>
+              <a:buClr>
+                <a:schemeClr val="dk2"/>
+              </a:buClr>
+              <a:buSzPts val="1600"/>
+              <a:buFont typeface="Lato"/>
+              <a:buChar char="●"/>
+            </a:pPr>
+            <a:r>
+              <a:rPr lang="pl" sz="1600">
+                <a:solidFill>
+                  <a:schemeClr val="dk2"/>
+                </a:solidFill>
+                <a:latin typeface="Lato"/>
+                <a:ea typeface="Lato"/>
+                <a:cs typeface="Lato"/>
+                <a:sym typeface="Lato"/>
+              </a:rPr>
+              <a:t>select coupon attributes inside contents</a:t>
+            </a:r>
+            <a:endParaRPr sz="1600">
+              <a:solidFill>
+                <a:schemeClr val="dk2"/>
+              </a:solidFill>
+              <a:latin typeface="Lato"/>
+              <a:ea typeface="Lato"/>
+              <a:cs typeface="Lato"/>
+              <a:sym typeface="Lato"/>
+            </a:endParaRPr>
+          </a:p>
+        </p:txBody>
+      </p:sp>
+      <p:sp>
+        <p:nvSpPr>
+          <p:cNvPr id="220" name="Google Shape;220;p24"/>
+          <p:cNvSpPr txBox="1"/>
+          <p:nvPr/>
+        </p:nvSpPr>
+        <p:spPr>
+          <a:xfrm>
+            <a:off x="1297500" y="4000925"/>
+            <a:ext cx="3698700" cy="431100"/>
+          </a:xfrm>
+          <a:prstGeom prst="rect">
+            <a:avLst/>
+          </a:prstGeom>
+          <a:noFill/>
+          <a:ln>
+            <a:noFill/>
+          </a:ln>
+        </p:spPr>
+        <p:txBody>
+          <a:bodyPr anchorCtr="0" anchor="t" bIns="91425" lIns="91425" spcFirstLastPara="1" rIns="91425" wrap="square" tIns="91425">
+            <a:spAutoFit/>
+          </a:bodyPr>
+          <a:lstStyle/>
+          <a:p>
+            <a:pPr indent="0" lvl="0" marL="0" rtl="0" algn="l">
+              <a:spcBef>
+                <a:spcPts val="0"/>
+              </a:spcBef>
+              <a:spcAft>
+                <a:spcPts val="0"/>
+              </a:spcAft>
+              <a:buNone/>
+            </a:pPr>
+            <a:r>
+              <a:rPr lang="pl" sz="1600">
+                <a:solidFill>
+                  <a:schemeClr val="dk2"/>
+                </a:solidFill>
+                <a:latin typeface="Lato"/>
+                <a:ea typeface="Lato"/>
+                <a:cs typeface="Lato"/>
+                <a:sym typeface="Lato"/>
+              </a:rPr>
+              <a:t>More lightweight</a:t>
+            </a:r>
+            <a:endParaRPr sz="1600">
+              <a:solidFill>
+                <a:schemeClr val="dk2"/>
+              </a:solidFill>
+              <a:latin typeface="Lato"/>
+              <a:ea typeface="Lato"/>
+              <a:cs typeface="Lato"/>
+              <a:sym typeface="Lato"/>
+            </a:endParaRPr>
+          </a:p>
+        </p:txBody>
+      </p:sp>
+      <p:pic>
+        <p:nvPicPr>
+          <p:cNvPr id="221" name="Google Shape;221;p24"/>
+          <p:cNvPicPr preferRelativeResize="0"/>
+          <p:nvPr/>
+        </p:nvPicPr>
+        <p:blipFill>
+          <a:blip r:embed="rId4">
+            <a:alphaModFix/>
+          </a:blip>
+          <a:stretch>
+            <a:fillRect/>
+          </a:stretch>
+        </p:blipFill>
+        <p:spPr>
+          <a:xfrm>
+            <a:off x="4572000" y="2115975"/>
+            <a:ext cx="3843000" cy="1825425"/>
+          </a:xfrm>
+          <a:prstGeom prst="rect">
+            <a:avLst/>
+          </a:prstGeom>
+          <a:noFill/>
+          <a:ln>
+            <a:noFill/>
+          </a:ln>
+        </p:spPr>
+      </p:pic>
+    </p:spTree>
+  </p:cSld>
+  <p:clrMapOvr>
+    <a:masterClrMapping/>
+  </p:clrMapOvr>
+</p:sld>
+</file>
+
+<file path=ppt/slides/slide13.xml><?xml version="1.0" encoding="utf-8"?>
+<p:sld xmlns:a="http://schemas.openxmlformats.org/drawingml/2006/main" xmlns:r="http://schemas.openxmlformats.org/officeDocument/2006/relationships" xmlns:mc="http://schemas.openxmlformats.org/markup-compatibility/2006" xmlns:mv="urn:schemas-microsoft-com:mac:vml" xmlns:p="http://schemas.openxmlformats.org/presentationml/2006/main" xmlns:c="http://schemas.openxmlformats.org/drawingml/2006/chart" xmlns:dgm="http://schemas.openxmlformats.org/drawingml/2006/diagram" xmlns:o="urn:schemas-microsoft-com:office:office" xmlns:v="urn:schemas-microsoft-com:vml" xmlns:pvml="urn:schemas-microsoft-com:office:powerpoint" xmlns:com="http://schemas.openxmlformats.org/drawingml/2006/compatibility" xmlns:p14="http://schemas.microsoft.com/office/powerpoint/2010/main" xmlns:p15="http://schemas.microsoft.com/office/powerpoint/2012/main" xmlns:ahyp="http://schemas.microsoft.com/office/drawing/2018/hyperlinkcolor">
+  <p:cSld>
+    <p:spTree>
+      <p:nvGrpSpPr>
+        <p:cNvPr id="225" name="Shape 225"/>
+        <p:cNvGrpSpPr/>
+        <p:nvPr/>
+      </p:nvGrpSpPr>
+      <p:grpSpPr>
+        <a:xfrm>
+          <a:off x="0" y="0"/>
+          <a:ext cx="0" cy="0"/>
+          <a:chOff x="0" y="0"/>
+          <a:chExt cx="0" cy="0"/>
+        </a:xfrm>
+      </p:grpSpPr>
+      <p:sp>
+        <p:nvSpPr>
+          <p:cNvPr id="226" name="Google Shape;226;p25"/>
+          <p:cNvSpPr txBox="1"/>
+          <p:nvPr>
+            <p:ph type="title"/>
+          </p:nvPr>
+        </p:nvSpPr>
+        <p:spPr>
+          <a:xfrm>
+            <a:off x="1297500" y="393750"/>
+            <a:ext cx="7038900" cy="914100"/>
+          </a:xfrm>
+          <a:prstGeom prst="rect">
+            <a:avLst/>
+          </a:prstGeom>
+        </p:spPr>
+        <p:txBody>
+          <a:bodyPr anchorCtr="0" anchor="t" bIns="91425" lIns="91425" spcFirstLastPara="1" rIns="91425" wrap="square" tIns="91425">
+            <a:normAutofit/>
+          </a:bodyPr>
+          <a:lstStyle/>
+          <a:p>
+            <a:pPr indent="0" lvl="0" marL="0" rtl="0" algn="l">
+              <a:spcBef>
+                <a:spcPts val="0"/>
+              </a:spcBef>
+              <a:spcAft>
+                <a:spcPts val="0"/>
+              </a:spcAft>
+              <a:buNone/>
+            </a:pPr>
+            <a:r>
               <a:rPr lang="pl"/>
               <a:t>Architecture</a:t>
             </a:r>
@@ -10370,7 +11670,7 @@
       </p:sp>
       <p:pic>
         <p:nvPicPr>
-          <p:cNvPr id="207" name="Google Shape;207;p22" title="zpp.png"/>
+          <p:cNvPr id="227" name="Google Shape;227;p25" title="zpp.png"/>
           <p:cNvPicPr preferRelativeResize="0"/>
           <p:nvPr/>
         </p:nvPicPr>
@@ -10404,12 +11704,12 @@
 </p:sld>
 </file>
 
-<file path=ppt/slides/slide11.xml><?xml version="1.0" encoding="utf-8"?>
+<file path=ppt/slides/slide14.xml><?xml version="1.0" encoding="utf-8"?>
 <p:sld xmlns:a="http://schemas.openxmlformats.org/drawingml/2006/main" xmlns:r="http://schemas.openxmlformats.org/officeDocument/2006/relationships" xmlns:mc="http://schemas.openxmlformats.org/markup-compatibility/2006" xmlns:mv="urn:schemas-microsoft-com:mac:vml" xmlns:p="http://schemas.openxmlformats.org/presentationml/2006/main" xmlns:c="http://schemas.openxmlformats.org/drawingml/2006/chart" xmlns:dgm="http://schemas.openxmlformats.org/drawingml/2006/diagram" xmlns:o="urn:schemas-microsoft-com:office:office" xmlns:v="urn:schemas-microsoft-com:vml" xmlns:pvml="urn:schemas-microsoft-com:office:powerpoint" xmlns:com="http://schemas.openxmlformats.org/drawingml/2006/compatibility" xmlns:p14="http://schemas.microsoft.com/office/powerpoint/2010/main" xmlns:p15="http://schemas.microsoft.com/office/powerpoint/2012/main" xmlns:ahyp="http://schemas.microsoft.com/office/drawing/2018/hyperlinkcolor">
   <p:cSld>
     <p:spTree>
       <p:nvGrpSpPr>
-        <p:cNvPr id="211" name="Shape 211"/>
+        <p:cNvPr id="231" name="Shape 231"/>
         <p:cNvGrpSpPr/>
         <p:nvPr/>
       </p:nvGrpSpPr>
@@ -10423,7 +11723,7 @@
       </p:grpSpPr>
       <p:sp>
         <p:nvSpPr>
-          <p:cNvPr id="212" name="Google Shape;212;p23"/>
+          <p:cNvPr id="232" name="Google Shape;232;p26"/>
           <p:cNvSpPr txBox="1"/>
           <p:nvPr>
             <p:ph type="title"/>
@@ -10473,7 +11773,7 @@
       </p:sp>
       <p:sp>
         <p:nvSpPr>
-          <p:cNvPr id="213" name="Google Shape;213;p23"/>
+          <p:cNvPr id="233" name="Google Shape;233;p26"/>
           <p:cNvSpPr txBox="1"/>
           <p:nvPr>
             <p:ph idx="1" type="body"/>
@@ -10566,7 +11866,7 @@
       </p:sp>
       <p:pic>
         <p:nvPicPr>
-          <p:cNvPr id="214" name="Google Shape;214;p23" title="llama_vs_bert_precision.png"/>
+          <p:cNvPr id="234" name="Google Shape;234;p26" title="llama_vs_bert_precision.png"/>
           <p:cNvPicPr preferRelativeResize="0"/>
           <p:nvPr/>
         </p:nvPicPr>
@@ -10594,7 +11894,7 @@
       </p:pic>
       <p:pic>
         <p:nvPicPr>
-          <p:cNvPr id="215" name="Google Shape;215;p23" title="llama_vs_bert_recall.png"/>
+          <p:cNvPr id="235" name="Google Shape;235;p26" title="llama_vs_bert_recall.png"/>
           <p:cNvPicPr preferRelativeResize="0"/>
           <p:nvPr/>
         </p:nvPicPr>
@@ -10628,12 +11928,12 @@
 </p:sld>
 </file>
 
-<file path=ppt/slides/slide12.xml><?xml version="1.0" encoding="utf-8"?>
+<file path=ppt/slides/slide15.xml><?xml version="1.0" encoding="utf-8"?>
 <p:sld xmlns:a="http://schemas.openxmlformats.org/drawingml/2006/main" xmlns:r="http://schemas.openxmlformats.org/officeDocument/2006/relationships" xmlns:mc="http://schemas.openxmlformats.org/markup-compatibility/2006" xmlns:mv="urn:schemas-microsoft-com:mac:vml" xmlns:p="http://schemas.openxmlformats.org/presentationml/2006/main" xmlns:c="http://schemas.openxmlformats.org/drawingml/2006/chart" xmlns:dgm="http://schemas.openxmlformats.org/drawingml/2006/diagram" xmlns:o="urn:schemas-microsoft-com:office:office" xmlns:v="urn:schemas-microsoft-com:vml" xmlns:pvml="urn:schemas-microsoft-com:office:powerpoint" xmlns:com="http://schemas.openxmlformats.org/drawingml/2006/compatibility" xmlns:p14="http://schemas.microsoft.com/office/powerpoint/2010/main" xmlns:p15="http://schemas.microsoft.com/office/powerpoint/2012/main" xmlns:ahyp="http://schemas.microsoft.com/office/drawing/2018/hyperlinkcolor">
   <p:cSld>
     <p:spTree>
       <p:nvGrpSpPr>
-        <p:cNvPr id="219" name="Shape 219"/>
+        <p:cNvPr id="239" name="Shape 239"/>
         <p:cNvGrpSpPr/>
         <p:nvPr/>
       </p:nvGrpSpPr>
@@ -10647,7 +11947,7 @@
       </p:grpSpPr>
       <p:sp>
         <p:nvSpPr>
-          <p:cNvPr id="220" name="Google Shape;220;p24"/>
+          <p:cNvPr id="240" name="Google Shape;240;p27"/>
           <p:cNvSpPr txBox="1"/>
           <p:nvPr>
             <p:ph type="title"/>
@@ -10715,7 +12015,7 @@
       </p:sp>
       <p:sp>
         <p:nvSpPr>
-          <p:cNvPr id="221" name="Google Shape;221;p24"/>
+          <p:cNvPr id="241" name="Google Shape;241;p27"/>
           <p:cNvSpPr txBox="1"/>
           <p:nvPr>
             <p:ph idx="1" type="body"/>
@@ -10755,7 +12055,7 @@
       </p:sp>
       <p:pic>
         <p:nvPicPr>
-          <p:cNvPr id="222" name="Google Shape;222;p24"/>
+          <p:cNvPr id="242" name="Google Shape;242;p27"/>
           <p:cNvPicPr preferRelativeResize="0"/>
           <p:nvPr/>
         </p:nvPicPr>
@@ -10783,7 +12083,7 @@
       </p:pic>
       <p:sp>
         <p:nvSpPr>
-          <p:cNvPr id="223" name="Google Shape;223;p24"/>
+          <p:cNvPr id="243" name="Google Shape;243;p27"/>
           <p:cNvSpPr txBox="1"/>
           <p:nvPr>
             <p:ph idx="1" type="body"/>
@@ -11145,7 +12445,7 @@
         </p:nvSpPr>
         <p:spPr>
           <a:xfrm>
-            <a:off x="1297500" y="581950"/>
+            <a:off x="1297500" y="636275"/>
             <a:ext cx="7038900" cy="914100"/>
           </a:xfrm>
           <a:prstGeom prst="rect">
@@ -11168,29 +12468,10 @@
               <a:buNone/>
             </a:pPr>
             <a:r>
-              <a:rPr lang="pl">
-                <a:latin typeface="Lato"/>
-                <a:ea typeface="Lato"/>
-                <a:cs typeface="Lato"/>
-                <a:sym typeface="Lato"/>
-              </a:rPr>
-              <a:t>Additional</a:t>
+              <a:rPr lang="pl"/>
+              <a:t>Project assumptions</a:t>
             </a:r>
-            <a:r>
-              <a:rPr lang="pl">
-                <a:latin typeface="Lato"/>
-                <a:ea typeface="Lato"/>
-                <a:cs typeface="Lato"/>
-                <a:sym typeface="Lato"/>
-              </a:rPr>
-              <a:t> challenge - privacy</a:t>
-            </a:r>
-            <a:endParaRPr>
-              <a:latin typeface="Lato"/>
-              <a:ea typeface="Lato"/>
-              <a:cs typeface="Lato"/>
-              <a:sym typeface="Lato"/>
-            </a:endParaRPr>
+            <a:endParaRPr/>
           </a:p>
         </p:txBody>
       </p:sp>
@@ -11204,8 +12485,8 @@
         </p:nvSpPr>
         <p:spPr>
           <a:xfrm>
-            <a:off x="1297500" y="1668225"/>
-            <a:ext cx="3065400" cy="1579500"/>
+            <a:off x="1297500" y="1801350"/>
+            <a:ext cx="4535100" cy="1850700"/>
           </a:xfrm>
           <a:prstGeom prst="rect">
             <a:avLst/>
@@ -11217,48 +12498,61 @@
           </a:bodyPr>
           <a:lstStyle/>
           <a:p>
-            <a:pPr indent="0" lvl="0" marL="0" rtl="0" algn="l">
-              <a:spcBef>
-                <a:spcPts val="0"/>
-              </a:spcBef>
-              <a:spcAft>
-                <a:spcPts val="0"/>
-              </a:spcAft>
-              <a:buNone/>
+            <a:pPr indent="-323850" lvl="0" marL="457200" rtl="0" algn="l">
+              <a:spcBef>
+                <a:spcPts val="0"/>
+              </a:spcBef>
+              <a:spcAft>
+                <a:spcPts val="0"/>
+              </a:spcAft>
+              <a:buSzPts val="1500"/>
+              <a:buAutoNum type="arabicPeriod"/>
             </a:pPr>
             <a:r>
-              <a:rPr lang="pl"/>
-              <a:t>We have to process layouts locally</a:t>
+              <a:rPr lang="pl" sz="1500"/>
+              <a:t>Our solution should be, in theory, deployable on mobile device</a:t>
             </a:r>
-            <a:br>
-              <a:rPr lang="pl"/>
-            </a:br>
-            <a:br>
-              <a:rPr lang="pl"/>
-            </a:br>
-            <a:endParaRPr/>
+            <a:endParaRPr sz="1500"/>
           </a:p>
           <a:p>
-            <a:pPr indent="0" lvl="0" marL="0" rtl="0" algn="l">
-              <a:spcBef>
-                <a:spcPts val="1200"/>
-              </a:spcBef>
-              <a:spcAft>
-                <a:spcPts val="1200"/>
-              </a:spcAft>
-              <a:buNone/>
+            <a:pPr indent="-323850" lvl="0" marL="457200" rtl="0" algn="l">
+              <a:spcBef>
+                <a:spcPts val="0"/>
+              </a:spcBef>
+              <a:spcAft>
+                <a:spcPts val="0"/>
+              </a:spcAft>
+              <a:buSzPts val="1500"/>
+              <a:buAutoNum type="arabicPeriod"/>
             </a:pPr>
             <a:r>
-              <a:rPr lang="pl"/>
-              <a:t>This means limited resources</a:t>
+              <a:rPr lang="pl" sz="1500"/>
+              <a:t>We focus on maximizing recall</a:t>
             </a:r>
-            <a:endParaRPr/>
+            <a:endParaRPr sz="1500"/>
+          </a:p>
+          <a:p>
+            <a:pPr indent="-323850" lvl="0" marL="457200" rtl="0" algn="l">
+              <a:spcBef>
+                <a:spcPts val="0"/>
+              </a:spcBef>
+              <a:spcAft>
+                <a:spcPts val="0"/>
+              </a:spcAft>
+              <a:buSzPts val="1500"/>
+              <a:buAutoNum type="arabicPeriod"/>
+            </a:pPr>
+            <a:r>
+              <a:rPr lang="pl" sz="1500"/>
+              <a:t>Our solution should be easily generalizable to other domains</a:t>
+            </a:r>
+            <a:endParaRPr sz="1500"/>
           </a:p>
         </p:txBody>
       </p:sp>
       <p:pic>
         <p:nvPicPr>
-          <p:cNvPr id="153" name="Google Shape;153;p15"/>
+          <p:cNvPr id="153" name="Google Shape;153;p15" title="nerd-emoji-icegif-6.gif"/>
           <p:cNvPicPr preferRelativeResize="0"/>
           <p:nvPr/>
         </p:nvPicPr>
@@ -11272,8 +12566,8 @@
         </p:blipFill>
         <p:spPr>
           <a:xfrm>
-            <a:off x="5808975" y="900425"/>
-            <a:ext cx="2684327" cy="3342650"/>
+            <a:off x="5873825" y="1068450"/>
+            <a:ext cx="3006600" cy="3006600"/>
           </a:xfrm>
           <a:prstGeom prst="rect">
             <a:avLst/>
@@ -11319,7 +12613,211 @@
         </p:nvSpPr>
         <p:spPr>
           <a:xfrm>
-            <a:off x="1297500" y="533125"/>
+            <a:off x="1297500" y="581950"/>
+            <a:ext cx="7038900" cy="914100"/>
+          </a:xfrm>
+          <a:prstGeom prst="rect">
+            <a:avLst/>
+          </a:prstGeom>
+        </p:spPr>
+        <p:txBody>
+          <a:bodyPr anchorCtr="0" anchor="t" bIns="91425" lIns="91425" spcFirstLastPara="1" rIns="91425" wrap="square" tIns="91425">
+            <a:normAutofit/>
+          </a:bodyPr>
+          <a:lstStyle/>
+          <a:p>
+            <a:pPr indent="0" lvl="0" marL="0" rtl="0" algn="l">
+              <a:spcBef>
+                <a:spcPts val="0"/>
+              </a:spcBef>
+              <a:spcAft>
+                <a:spcPts val="0"/>
+              </a:spcAft>
+              <a:buNone/>
+            </a:pPr>
+            <a:r>
+              <a:rPr lang="pl">
+                <a:latin typeface="Lato"/>
+                <a:ea typeface="Lato"/>
+                <a:cs typeface="Lato"/>
+                <a:sym typeface="Lato"/>
+              </a:rPr>
+              <a:t>Additional</a:t>
+            </a:r>
+            <a:r>
+              <a:rPr lang="pl">
+                <a:latin typeface="Lato"/>
+                <a:ea typeface="Lato"/>
+                <a:cs typeface="Lato"/>
+                <a:sym typeface="Lato"/>
+              </a:rPr>
+              <a:t> challenge - privacy</a:t>
+            </a:r>
+            <a:endParaRPr>
+              <a:latin typeface="Lato"/>
+              <a:ea typeface="Lato"/>
+              <a:cs typeface="Lato"/>
+              <a:sym typeface="Lato"/>
+            </a:endParaRPr>
+          </a:p>
+        </p:txBody>
+      </p:sp>
+      <p:sp>
+        <p:nvSpPr>
+          <p:cNvPr id="159" name="Google Shape;159;p16"/>
+          <p:cNvSpPr txBox="1"/>
+          <p:nvPr>
+            <p:ph idx="1" type="body"/>
+          </p:nvPr>
+        </p:nvSpPr>
+        <p:spPr>
+          <a:xfrm>
+            <a:off x="1297500" y="1668225"/>
+            <a:ext cx="4424100" cy="2145300"/>
+          </a:xfrm>
+          <a:prstGeom prst="rect">
+            <a:avLst/>
+          </a:prstGeom>
+        </p:spPr>
+        <p:txBody>
+          <a:bodyPr anchorCtr="0" anchor="t" bIns="91425" lIns="91425" spcFirstLastPara="1" rIns="91425" wrap="square" tIns="91425">
+            <a:normAutofit/>
+          </a:bodyPr>
+          <a:lstStyle/>
+          <a:p>
+            <a:pPr indent="-323850" lvl="0" marL="457200" rtl="0" algn="l">
+              <a:spcBef>
+                <a:spcPts val="0"/>
+              </a:spcBef>
+              <a:spcAft>
+                <a:spcPts val="0"/>
+              </a:spcAft>
+              <a:buSzPts val="1500"/>
+              <a:buChar char="●"/>
+            </a:pPr>
+            <a:r>
+              <a:rPr lang="pl" sz="1500"/>
+              <a:t>Users are being paid to use our app</a:t>
+            </a:r>
+            <a:endParaRPr sz="1500"/>
+          </a:p>
+          <a:p>
+            <a:pPr indent="-323850" lvl="0" marL="457200" rtl="0" algn="l">
+              <a:spcBef>
+                <a:spcPts val="0"/>
+              </a:spcBef>
+              <a:spcAft>
+                <a:spcPts val="0"/>
+              </a:spcAft>
+              <a:buSzPts val="1500"/>
+              <a:buChar char="●"/>
+            </a:pPr>
+            <a:r>
+              <a:rPr lang="pl" sz="1500"/>
+              <a:t>Still, we have to protect their privacy</a:t>
+            </a:r>
+            <a:endParaRPr sz="1500"/>
+          </a:p>
+          <a:p>
+            <a:pPr indent="-323850" lvl="0" marL="457200" rtl="0" algn="l">
+              <a:spcBef>
+                <a:spcPts val="0"/>
+              </a:spcBef>
+              <a:spcAft>
+                <a:spcPts val="0"/>
+              </a:spcAft>
+              <a:buSzPts val="1500"/>
+              <a:buChar char="●"/>
+            </a:pPr>
+            <a:r>
+              <a:rPr lang="pl" sz="1500"/>
+              <a:t>For that to happen, we perform the inference locally, on the end device</a:t>
+            </a:r>
+            <a:endParaRPr sz="1500"/>
+          </a:p>
+          <a:p>
+            <a:pPr indent="-323850" lvl="0" marL="457200" rtl="0" algn="l">
+              <a:spcBef>
+                <a:spcPts val="0"/>
+              </a:spcBef>
+              <a:spcAft>
+                <a:spcPts val="0"/>
+              </a:spcAft>
+              <a:buSzPts val="1500"/>
+              <a:buChar char="●"/>
+            </a:pPr>
+            <a:r>
+              <a:rPr lang="pl" sz="1500"/>
+              <a:t>This means limited resources</a:t>
+            </a:r>
+            <a:endParaRPr sz="1500"/>
+          </a:p>
+        </p:txBody>
+      </p:sp>
+      <p:pic>
+        <p:nvPicPr>
+          <p:cNvPr id="160" name="Google Shape;160;p16"/>
+          <p:cNvPicPr preferRelativeResize="0"/>
+          <p:nvPr/>
+        </p:nvPicPr>
+        <p:blipFill>
+          <a:blip r:embed="rId4">
+            <a:alphaModFix/>
+          </a:blip>
+          <a:stretch>
+            <a:fillRect/>
+          </a:stretch>
+        </p:blipFill>
+        <p:spPr>
+          <a:xfrm>
+            <a:off x="5808975" y="900425"/>
+            <a:ext cx="2684327" cy="3342650"/>
+          </a:xfrm>
+          <a:prstGeom prst="rect">
+            <a:avLst/>
+          </a:prstGeom>
+          <a:noFill/>
+          <a:ln>
+            <a:noFill/>
+          </a:ln>
+        </p:spPr>
+      </p:pic>
+    </p:spTree>
+  </p:cSld>
+  <p:clrMapOvr>
+    <a:masterClrMapping/>
+  </p:clrMapOvr>
+</p:sld>
+</file>
+
+<file path=ppt/slides/slide5.xml><?xml version="1.0" encoding="utf-8"?>
+<p:sld xmlns:a="http://schemas.openxmlformats.org/drawingml/2006/main" xmlns:r="http://schemas.openxmlformats.org/officeDocument/2006/relationships" xmlns:mc="http://schemas.openxmlformats.org/markup-compatibility/2006" xmlns:mv="urn:schemas-microsoft-com:mac:vml" xmlns:p="http://schemas.openxmlformats.org/presentationml/2006/main" xmlns:c="http://schemas.openxmlformats.org/drawingml/2006/chart" xmlns:dgm="http://schemas.openxmlformats.org/drawingml/2006/diagram" xmlns:o="urn:schemas-microsoft-com:office:office" xmlns:v="urn:schemas-microsoft-com:vml" xmlns:pvml="urn:schemas-microsoft-com:office:powerpoint" xmlns:com="http://schemas.openxmlformats.org/drawingml/2006/compatibility" xmlns:p14="http://schemas.microsoft.com/office/powerpoint/2010/main" xmlns:p15="http://schemas.microsoft.com/office/powerpoint/2012/main" xmlns:ahyp="http://schemas.microsoft.com/office/drawing/2018/hyperlinkcolor">
+  <p:cSld>
+    <p:spTree>
+      <p:nvGrpSpPr>
+        <p:cNvPr id="164" name="Shape 164"/>
+        <p:cNvGrpSpPr/>
+        <p:nvPr/>
+      </p:nvGrpSpPr>
+      <p:grpSpPr>
+        <a:xfrm>
+          <a:off x="0" y="0"/>
+          <a:ext cx="0" cy="0"/>
+          <a:chOff x="0" y="0"/>
+          <a:chExt cx="0" cy="0"/>
+        </a:xfrm>
+      </p:grpSpPr>
+      <p:sp>
+        <p:nvSpPr>
+          <p:cNvPr id="165" name="Google Shape;165;p17"/>
+          <p:cNvSpPr txBox="1"/>
+          <p:nvPr>
+            <p:ph type="title"/>
+          </p:nvPr>
+        </p:nvSpPr>
+        <p:spPr>
+          <a:xfrm>
+            <a:off x="1297500" y="634175"/>
             <a:ext cx="7038900" cy="914100"/>
           </a:xfrm>
           <a:prstGeom prst="rect">
@@ -11361,7 +12859,7 @@
       </p:sp>
       <p:pic>
         <p:nvPicPr>
-          <p:cNvPr id="159" name="Google Shape;159;p16"/>
+          <p:cNvPr id="166" name="Google Shape;166;p17"/>
           <p:cNvPicPr preferRelativeResize="0"/>
           <p:nvPr/>
         </p:nvPicPr>
@@ -11395,12 +12893,12 @@
 </p:sld>
 </file>
 
-<file path=ppt/slides/slide5.xml><?xml version="1.0" encoding="utf-8"?>
+<file path=ppt/slides/slide6.xml><?xml version="1.0" encoding="utf-8"?>
 <p:sld xmlns:a="http://schemas.openxmlformats.org/drawingml/2006/main" xmlns:r="http://schemas.openxmlformats.org/officeDocument/2006/relationships" xmlns:mc="http://schemas.openxmlformats.org/markup-compatibility/2006" xmlns:mv="urn:schemas-microsoft-com:mac:vml" xmlns:p="http://schemas.openxmlformats.org/presentationml/2006/main" xmlns:c="http://schemas.openxmlformats.org/drawingml/2006/chart" xmlns:dgm="http://schemas.openxmlformats.org/drawingml/2006/diagram" xmlns:o="urn:schemas-microsoft-com:office:office" xmlns:v="urn:schemas-microsoft-com:vml" xmlns:pvml="urn:schemas-microsoft-com:office:powerpoint" xmlns:com="http://schemas.openxmlformats.org/drawingml/2006/compatibility" xmlns:p14="http://schemas.microsoft.com/office/powerpoint/2010/main" xmlns:p15="http://schemas.microsoft.com/office/powerpoint/2012/main" xmlns:ahyp="http://schemas.microsoft.com/office/drawing/2018/hyperlinkcolor">
   <p:cSld>
     <p:spTree>
       <p:nvGrpSpPr>
-        <p:cNvPr id="163" name="Shape 163"/>
+        <p:cNvPr id="170" name="Shape 170"/>
         <p:cNvGrpSpPr/>
         <p:nvPr/>
       </p:nvGrpSpPr>
@@ -11414,7 +12912,7 @@
       </p:grpSpPr>
       <p:sp>
         <p:nvSpPr>
-          <p:cNvPr id="164" name="Google Shape;164;p17"/>
+          <p:cNvPr id="171" name="Google Shape;171;p18"/>
           <p:cNvSpPr txBox="1"/>
           <p:nvPr>
             <p:ph type="title"/>
@@ -11422,7 +12920,7 @@
         </p:nvSpPr>
         <p:spPr>
           <a:xfrm>
-            <a:off x="1297500" y="393750"/>
+            <a:off x="1297500" y="567600"/>
             <a:ext cx="7038900" cy="914100"/>
           </a:xfrm>
           <a:prstGeom prst="rect">
@@ -11446,6 +12944,191 @@
             </a:pPr>
             <a:r>
               <a:rPr lang="pl"/>
+              <a:t>Dataset details</a:t>
+            </a:r>
+            <a:endParaRPr/>
+          </a:p>
+        </p:txBody>
+      </p:sp>
+      <p:sp>
+        <p:nvSpPr>
+          <p:cNvPr id="172" name="Google Shape;172;p18"/>
+          <p:cNvSpPr txBox="1"/>
+          <p:nvPr>
+            <p:ph idx="1" type="body"/>
+          </p:nvPr>
+        </p:nvSpPr>
+        <p:spPr>
+          <a:xfrm>
+            <a:off x="1297500" y="1567550"/>
+            <a:ext cx="4685400" cy="2911200"/>
+          </a:xfrm>
+          <a:prstGeom prst="rect">
+            <a:avLst/>
+          </a:prstGeom>
+        </p:spPr>
+        <p:txBody>
+          <a:bodyPr anchorCtr="0" anchor="t" bIns="91425" lIns="91425" spcFirstLastPara="1" rIns="91425" wrap="square" tIns="91425">
+            <a:normAutofit/>
+          </a:bodyPr>
+          <a:lstStyle/>
+          <a:p>
+            <a:pPr indent="-323850" lvl="0" marL="457200" rtl="0" algn="l">
+              <a:spcBef>
+                <a:spcPts val="0"/>
+              </a:spcBef>
+              <a:spcAft>
+                <a:spcPts val="0"/>
+              </a:spcAft>
+              <a:buSzPts val="1500"/>
+              <a:buChar char="●"/>
+            </a:pPr>
+            <a:r>
+              <a:rPr lang="pl" sz="1500"/>
+              <a:t>Data from 5 shops: Lidl, Rewe, Rossman, DM, Penny</a:t>
+            </a:r>
+            <a:endParaRPr sz="1500"/>
+          </a:p>
+          <a:p>
+            <a:pPr indent="-323850" lvl="0" marL="457200" rtl="0" algn="l">
+              <a:spcBef>
+                <a:spcPts val="0"/>
+              </a:spcBef>
+              <a:spcAft>
+                <a:spcPts val="0"/>
+              </a:spcAft>
+              <a:buSzPts val="1500"/>
+              <a:buChar char="●"/>
+            </a:pPr>
+            <a:r>
+              <a:rPr lang="pl" sz="1500"/>
+              <a:t>Split into two CSV files: phone screen dump, and target coupons</a:t>
+            </a:r>
+            <a:endParaRPr sz="1500"/>
+          </a:p>
+          <a:p>
+            <a:pPr indent="-323850" lvl="0" marL="457200" rtl="0" algn="l">
+              <a:spcBef>
+                <a:spcPts val="0"/>
+              </a:spcBef>
+              <a:spcAft>
+                <a:spcPts val="0"/>
+              </a:spcAft>
+              <a:buSzPts val="1500"/>
+              <a:buChar char="●"/>
+            </a:pPr>
+            <a:r>
+              <a:rPr lang="pl" sz="1500"/>
+              <a:t>Initially over 2 140 000 rows of screen dumps, and 69500 rows of target data</a:t>
+            </a:r>
+            <a:endParaRPr sz="1500"/>
+          </a:p>
+          <a:p>
+            <a:pPr indent="-323850" lvl="0" marL="457200" rtl="0" algn="l">
+              <a:spcBef>
+                <a:spcPts val="0"/>
+              </a:spcBef>
+              <a:spcAft>
+                <a:spcPts val="0"/>
+              </a:spcAft>
+              <a:buSzPts val="1500"/>
+              <a:buChar char="●"/>
+            </a:pPr>
+            <a:r>
+              <a:rPr lang="pl" sz="1500"/>
+              <a:t>After cleanup: 11 000 rows in HF Datasets</a:t>
+            </a:r>
+            <a:endParaRPr sz="1500"/>
+          </a:p>
+        </p:txBody>
+      </p:sp>
+      <p:pic>
+        <p:nvPicPr>
+          <p:cNvPr id="173" name="Google Shape;173;p18"/>
+          <p:cNvPicPr preferRelativeResize="0"/>
+          <p:nvPr/>
+        </p:nvPicPr>
+        <p:blipFill>
+          <a:blip r:embed="rId3">
+            <a:alphaModFix/>
+          </a:blip>
+          <a:stretch>
+            <a:fillRect/>
+          </a:stretch>
+        </p:blipFill>
+        <p:spPr>
+          <a:xfrm>
+            <a:off x="6202800" y="1567550"/>
+            <a:ext cx="2133600" cy="2143125"/>
+          </a:xfrm>
+          <a:prstGeom prst="rect">
+            <a:avLst/>
+          </a:prstGeom>
+          <a:noFill/>
+          <a:ln>
+            <a:noFill/>
+          </a:ln>
+        </p:spPr>
+      </p:pic>
+    </p:spTree>
+  </p:cSld>
+  <p:clrMapOvr>
+    <a:masterClrMapping/>
+  </p:clrMapOvr>
+</p:sld>
+</file>
+
+<file path=ppt/slides/slide7.xml><?xml version="1.0" encoding="utf-8"?>
+<p:sld xmlns:a="http://schemas.openxmlformats.org/drawingml/2006/main" xmlns:r="http://schemas.openxmlformats.org/officeDocument/2006/relationships" xmlns:mc="http://schemas.openxmlformats.org/markup-compatibility/2006" xmlns:mv="urn:schemas-microsoft-com:mac:vml" xmlns:p="http://schemas.openxmlformats.org/presentationml/2006/main" xmlns:c="http://schemas.openxmlformats.org/drawingml/2006/chart" xmlns:dgm="http://schemas.openxmlformats.org/drawingml/2006/diagram" xmlns:o="urn:schemas-microsoft-com:office:office" xmlns:v="urn:schemas-microsoft-com:vml" xmlns:pvml="urn:schemas-microsoft-com:office:powerpoint" xmlns:com="http://schemas.openxmlformats.org/drawingml/2006/compatibility" xmlns:p14="http://schemas.microsoft.com/office/powerpoint/2010/main" xmlns:p15="http://schemas.microsoft.com/office/powerpoint/2012/main" xmlns:ahyp="http://schemas.microsoft.com/office/drawing/2018/hyperlinkcolor">
+  <p:cSld>
+    <p:spTree>
+      <p:nvGrpSpPr>
+        <p:cNvPr id="177" name="Shape 177"/>
+        <p:cNvGrpSpPr/>
+        <p:nvPr/>
+      </p:nvGrpSpPr>
+      <p:grpSpPr>
+        <a:xfrm>
+          <a:off x="0" y="0"/>
+          <a:ext cx="0" cy="0"/>
+          <a:chOff x="0" y="0"/>
+          <a:chExt cx="0" cy="0"/>
+        </a:xfrm>
+      </p:grpSpPr>
+      <p:sp>
+        <p:nvSpPr>
+          <p:cNvPr id="178" name="Google Shape;178;p19"/>
+          <p:cNvSpPr txBox="1"/>
+          <p:nvPr>
+            <p:ph type="title"/>
+          </p:nvPr>
+        </p:nvSpPr>
+        <p:spPr>
+          <a:xfrm>
+            <a:off x="1297500" y="575625"/>
+            <a:ext cx="7038900" cy="914100"/>
+          </a:xfrm>
+          <a:prstGeom prst="rect">
+            <a:avLst/>
+          </a:prstGeom>
+        </p:spPr>
+        <p:txBody>
+          <a:bodyPr anchorCtr="0" anchor="t" bIns="91425" lIns="91425" spcFirstLastPara="1" rIns="91425" wrap="square" tIns="91425">
+            <a:normAutofit/>
+          </a:bodyPr>
+          <a:lstStyle/>
+          <a:p>
+            <a:pPr indent="0" lvl="0" marL="0" rtl="0" algn="l">
+              <a:spcBef>
+                <a:spcPts val="0"/>
+              </a:spcBef>
+              <a:spcAft>
+                <a:spcPts val="0"/>
+              </a:spcAft>
+              <a:buNone/>
+            </a:pPr>
+            <a:r>
+              <a:rPr lang="pl"/>
               <a:t>What we want to get?</a:t>
             </a:r>
             <a:endParaRPr/>
@@ -11454,7 +13137,7 @@
       </p:sp>
       <p:sp>
         <p:nvSpPr>
-          <p:cNvPr id="165" name="Google Shape;165;p17"/>
+          <p:cNvPr id="179" name="Google Shape;179;p19"/>
           <p:cNvSpPr txBox="1"/>
           <p:nvPr>
             <p:ph idx="1" type="body"/>
@@ -11462,8 +13145,8 @@
         </p:nvSpPr>
         <p:spPr>
           <a:xfrm>
-            <a:off x="1008375" y="1436400"/>
-            <a:ext cx="3563700" cy="738900"/>
+            <a:off x="1008300" y="1678725"/>
+            <a:ext cx="3563700" cy="2256000"/>
           </a:xfrm>
           <a:prstGeom prst="rect">
             <a:avLst/>
@@ -11471,7 +13154,7 @@
         </p:spPr>
         <p:txBody>
           <a:bodyPr anchorCtr="0" anchor="t" bIns="91425" lIns="91425" spcFirstLastPara="1" rIns="91425" wrap="square" tIns="91425">
-            <a:normAutofit lnSpcReduction="20000"/>
+            <a:normAutofit fontScale="85000" lnSpcReduction="20000"/>
           </a:bodyPr>
           <a:lstStyle/>
           <a:p>
@@ -11480,7 +13163,7 @@
                 <a:spcPts val="0"/>
               </a:spcBef>
               <a:spcAft>
-                <a:spcPts val="1200"/>
+                <a:spcPts val="0"/>
               </a:spcAft>
               <a:buNone/>
             </a:pPr>
@@ -11492,13 +13175,116 @@
               </a:rPr>
               <a:t>Discount coupons in a form of JSON list</a:t>
             </a:r>
-            <a:endParaRPr/>
+            <a:endParaRPr sz="1800">
+              <a:solidFill>
+                <a:schemeClr val="dk2"/>
+              </a:solidFill>
+            </a:endParaRPr>
+          </a:p>
+          <a:p>
+            <a:pPr indent="0" lvl="0" marL="0" rtl="0" algn="l">
+              <a:spcBef>
+                <a:spcPts val="1200"/>
+              </a:spcBef>
+              <a:spcAft>
+                <a:spcPts val="0"/>
+              </a:spcAft>
+              <a:buNone/>
+            </a:pPr>
+            <a:r>
+              <a:t/>
+            </a:r>
+            <a:endParaRPr sz="1800">
+              <a:solidFill>
+                <a:schemeClr val="dk2"/>
+              </a:solidFill>
+            </a:endParaRPr>
+          </a:p>
+          <a:p>
+            <a:pPr indent="0" lvl="0" marL="0" rtl="0" algn="l">
+              <a:lnSpc>
+                <a:spcPct val="100000"/>
+              </a:lnSpc>
+              <a:spcBef>
+                <a:spcPts val="1200"/>
+              </a:spcBef>
+              <a:spcAft>
+                <a:spcPts val="0"/>
+              </a:spcAft>
+              <a:buNone/>
+            </a:pPr>
+            <a:r>
+              <a:rPr lang="pl" sz="1800">
+                <a:solidFill>
+                  <a:schemeClr val="dk2"/>
+                </a:solidFill>
+              </a:rPr>
+              <a:t>More General:</a:t>
+            </a:r>
+            <a:endParaRPr sz="1800">
+              <a:solidFill>
+                <a:schemeClr val="dk2"/>
+              </a:solidFill>
+            </a:endParaRPr>
+          </a:p>
+          <a:p>
+            <a:pPr indent="0" lvl="0" marL="0" rtl="0" algn="l">
+              <a:spcBef>
+                <a:spcPts val="0"/>
+              </a:spcBef>
+              <a:spcAft>
+                <a:spcPts val="1200"/>
+              </a:spcAft>
+              <a:buNone/>
+            </a:pPr>
+            <a:r>
+              <a:rPr lang="pl" sz="1800">
+                <a:solidFill>
+                  <a:schemeClr val="dk2"/>
+                </a:solidFill>
+              </a:rPr>
+              <a:t>Concise summary of the screen</a:t>
+            </a:r>
+            <a:br>
+              <a:rPr lang="pl" sz="1800">
+                <a:solidFill>
+                  <a:schemeClr val="dk2"/>
+                </a:solidFill>
+              </a:rPr>
+            </a:br>
+            <a:r>
+              <a:rPr lang="pl" sz="1800">
+                <a:solidFill>
+                  <a:schemeClr val="dk2"/>
+                </a:solidFill>
+              </a:rPr>
+              <a:t>contents</a:t>
+            </a:r>
+            <a:br>
+              <a:rPr lang="pl" sz="1800">
+                <a:solidFill>
+                  <a:schemeClr val="dk2"/>
+                </a:solidFill>
+              </a:rPr>
+            </a:br>
+            <a:br>
+              <a:rPr lang="pl" sz="1800">
+                <a:solidFill>
+                  <a:schemeClr val="dk2"/>
+                </a:solidFill>
+              </a:rPr>
+            </a:br>
+            <a:endParaRPr sz="1800">
+              <a:solidFill>
+                <a:schemeClr val="dk2"/>
+              </a:solidFill>
+            </a:endParaRPr>
           </a:p>
         </p:txBody>
       </p:sp>
       <p:pic>
         <p:nvPicPr>
-          <p:cNvPr id="166" name="Google Shape;166;p17"/>
+          <p:cNvPr id="180" name="Google Shape;180;p19"/>
           <p:cNvPicPr preferRelativeResize="0"/>
           <p:nvPr/>
         </p:nvPicPr>
@@ -11524,119 +13310,6 @@
           </a:ln>
         </p:spPr>
       </p:pic>
-      <p:sp>
-        <p:nvSpPr>
-          <p:cNvPr id="167" name="Google Shape;167;p17"/>
-          <p:cNvSpPr txBox="1"/>
-          <p:nvPr/>
-        </p:nvSpPr>
-        <p:spPr>
-          <a:xfrm>
-            <a:off x="1062375" y="2571750"/>
-            <a:ext cx="3455700" cy="1015800"/>
-          </a:xfrm>
-          <a:prstGeom prst="rect">
-            <a:avLst/>
-          </a:prstGeom>
-          <a:noFill/>
-          <a:ln>
-            <a:noFill/>
-          </a:ln>
-        </p:spPr>
-        <p:txBody>
-          <a:bodyPr anchorCtr="0" anchor="t" bIns="91425" lIns="91425" spcFirstLastPara="1" rIns="91425" wrap="square" tIns="91425">
-            <a:spAutoFit/>
-          </a:bodyPr>
-          <a:lstStyle/>
-          <a:p>
-            <a:pPr indent="0" lvl="0" marL="0" rtl="0" algn="l">
-              <a:spcBef>
-                <a:spcPts val="0"/>
-              </a:spcBef>
-              <a:spcAft>
-                <a:spcPts val="0"/>
-              </a:spcAft>
-              <a:buNone/>
-            </a:pPr>
-            <a:r>
-              <a:rPr lang="pl" sz="1800">
-                <a:solidFill>
-                  <a:schemeClr val="dk2"/>
-                </a:solidFill>
-                <a:latin typeface="Lato"/>
-                <a:ea typeface="Lato"/>
-                <a:cs typeface="Lato"/>
-                <a:sym typeface="Lato"/>
-              </a:rPr>
-              <a:t>More General:</a:t>
-            </a:r>
-            <a:endParaRPr sz="1800">
-              <a:solidFill>
-                <a:schemeClr val="dk2"/>
-              </a:solidFill>
-              <a:latin typeface="Lato"/>
-              <a:ea typeface="Lato"/>
-              <a:cs typeface="Lato"/>
-              <a:sym typeface="Lato"/>
-            </a:endParaRPr>
-          </a:p>
-          <a:p>
-            <a:pPr indent="0" lvl="0" marL="0" rtl="0" algn="l">
-              <a:spcBef>
-                <a:spcPts val="0"/>
-              </a:spcBef>
-              <a:spcAft>
-                <a:spcPts val="0"/>
-              </a:spcAft>
-              <a:buNone/>
-            </a:pPr>
-            <a:r>
-              <a:rPr lang="pl" sz="1800">
-                <a:solidFill>
-                  <a:schemeClr val="dk2"/>
-                </a:solidFill>
-                <a:latin typeface="Lato"/>
-                <a:ea typeface="Lato"/>
-                <a:cs typeface="Lato"/>
-                <a:sym typeface="Lato"/>
-              </a:rPr>
-              <a:t>Concise summary of the screen</a:t>
-            </a:r>
-            <a:br>
-              <a:rPr lang="pl" sz="1800">
-                <a:solidFill>
-                  <a:schemeClr val="dk2"/>
-                </a:solidFill>
-                <a:latin typeface="Lato"/>
-                <a:ea typeface="Lato"/>
-                <a:cs typeface="Lato"/>
-                <a:sym typeface="Lato"/>
-              </a:rPr>
-            </a:br>
-            <a:r>
-              <a:rPr lang="pl" sz="1800">
-                <a:solidFill>
-                  <a:schemeClr val="dk2"/>
-                </a:solidFill>
-                <a:latin typeface="Lato"/>
-                <a:ea typeface="Lato"/>
-                <a:cs typeface="Lato"/>
-                <a:sym typeface="Lato"/>
-              </a:rPr>
-              <a:t>contents</a:t>
-            </a:r>
-            <a:endParaRPr sz="1800">
-              <a:solidFill>
-                <a:schemeClr val="dk2"/>
-              </a:solidFill>
-              <a:latin typeface="Lato"/>
-              <a:ea typeface="Lato"/>
-              <a:cs typeface="Lato"/>
-              <a:sym typeface="Lato"/>
-            </a:endParaRPr>
-          </a:p>
-        </p:txBody>
-      </p:sp>
     </p:spTree>
   </p:cSld>
   <p:clrMapOvr>
@@ -11645,12 +13318,12 @@
 </p:sld>
 </file>
 
-<file path=ppt/slides/slide6.xml><?xml version="1.0" encoding="utf-8"?>
+<file path=ppt/slides/slide8.xml><?xml version="1.0" encoding="utf-8"?>
 <p:sld xmlns:a="http://schemas.openxmlformats.org/drawingml/2006/main" xmlns:r="http://schemas.openxmlformats.org/officeDocument/2006/relationships" xmlns:mc="http://schemas.openxmlformats.org/markup-compatibility/2006" xmlns:mv="urn:schemas-microsoft-com:mac:vml" xmlns:p="http://schemas.openxmlformats.org/presentationml/2006/main" xmlns:c="http://schemas.openxmlformats.org/drawingml/2006/chart" xmlns:dgm="http://schemas.openxmlformats.org/drawingml/2006/diagram" xmlns:o="urn:schemas-microsoft-com:office:office" xmlns:v="urn:schemas-microsoft-com:vml" xmlns:pvml="urn:schemas-microsoft-com:office:powerpoint" xmlns:com="http://schemas.openxmlformats.org/drawingml/2006/compatibility" xmlns:p14="http://schemas.microsoft.com/office/powerpoint/2010/main" xmlns:p15="http://schemas.microsoft.com/office/powerpoint/2012/main" xmlns:ahyp="http://schemas.microsoft.com/office/drawing/2018/hyperlinkcolor">
   <p:cSld>
     <p:spTree>
       <p:nvGrpSpPr>
-        <p:cNvPr id="171" name="Shape 171"/>
+        <p:cNvPr id="184" name="Shape 184"/>
         <p:cNvGrpSpPr/>
         <p:nvPr/>
       </p:nvGrpSpPr>
@@ -11664,7 +13337,7 @@
       </p:grpSpPr>
       <p:sp>
         <p:nvSpPr>
-          <p:cNvPr id="172" name="Google Shape;172;p18"/>
+          <p:cNvPr id="185" name="Google Shape;185;p20"/>
           <p:cNvSpPr txBox="1"/>
           <p:nvPr>
             <p:ph type="title"/>
@@ -11720,12 +13393,12 @@
 </p:sld>
 </file>
 
-<file path=ppt/slides/slide7.xml><?xml version="1.0" encoding="utf-8"?>
+<file path=ppt/slides/slide9.xml><?xml version="1.0" encoding="utf-8"?>
 <p:sld xmlns:a="http://schemas.openxmlformats.org/drawingml/2006/main" xmlns:r="http://schemas.openxmlformats.org/officeDocument/2006/relationships" xmlns:mc="http://schemas.openxmlformats.org/markup-compatibility/2006" xmlns:mv="urn:schemas-microsoft-com:mac:vml" xmlns:p="http://schemas.openxmlformats.org/presentationml/2006/main" xmlns:c="http://schemas.openxmlformats.org/drawingml/2006/chart" xmlns:dgm="http://schemas.openxmlformats.org/drawingml/2006/diagram" xmlns:o="urn:schemas-microsoft-com:office:office" xmlns:v="urn:schemas-microsoft-com:vml" xmlns:pvml="urn:schemas-microsoft-com:office:powerpoint" xmlns:com="http://schemas.openxmlformats.org/drawingml/2006/compatibility" xmlns:p14="http://schemas.microsoft.com/office/powerpoint/2010/main" xmlns:p15="http://schemas.microsoft.com/office/powerpoint/2012/main" xmlns:ahyp="http://schemas.microsoft.com/office/drawing/2018/hyperlinkcolor">
   <p:cSld>
     <p:spTree>
       <p:nvGrpSpPr>
-        <p:cNvPr id="176" name="Shape 176"/>
+        <p:cNvPr id="189" name="Shape 189"/>
         <p:cNvGrpSpPr/>
         <p:nvPr/>
       </p:nvGrpSpPr>
@@ -11739,7 +13412,7 @@
       </p:grpSpPr>
       <p:sp>
         <p:nvSpPr>
-          <p:cNvPr id="177" name="Google Shape;177;p19"/>
+          <p:cNvPr id="190" name="Google Shape;190;p21"/>
           <p:cNvSpPr txBox="1"/>
           <p:nvPr>
             <p:ph type="title"/>
@@ -11789,7 +13462,7 @@
       </p:sp>
       <p:pic>
         <p:nvPicPr>
-          <p:cNvPr id="178" name="Google Shape;178;p19"/>
+          <p:cNvPr id="191" name="Google Shape;191;p21"/>
           <p:cNvPicPr preferRelativeResize="0"/>
           <p:nvPr/>
         </p:nvPicPr>
@@ -11817,7 +13490,7 @@
       </p:pic>
       <p:pic>
         <p:nvPicPr>
-          <p:cNvPr id="179" name="Google Shape;179;p19"/>
+          <p:cNvPr id="192" name="Google Shape;192;p21"/>
           <p:cNvPicPr preferRelativeResize="0"/>
           <p:nvPr/>
         </p:nvPicPr>
@@ -11845,7 +13518,7 @@
       </p:pic>
       <p:pic>
         <p:nvPicPr>
-          <p:cNvPr id="180" name="Google Shape;180;p19"/>
+          <p:cNvPr id="193" name="Google Shape;193;p21"/>
           <p:cNvPicPr preferRelativeResize="0"/>
           <p:nvPr/>
         </p:nvPicPr>
@@ -11873,7 +13546,7 @@
       </p:pic>
       <p:pic>
         <p:nvPicPr>
-          <p:cNvPr id="181" name="Google Shape;181;p19"/>
+          <p:cNvPr id="194" name="Google Shape;194;p21"/>
           <p:cNvPicPr preferRelativeResize="0"/>
           <p:nvPr/>
         </p:nvPicPr>
@@ -11901,7 +13574,7 @@
       </p:pic>
       <p:pic>
         <p:nvPicPr>
-          <p:cNvPr id="182" name="Google Shape;182;p19"/>
+          <p:cNvPr id="195" name="Google Shape;195;p21"/>
           <p:cNvPicPr preferRelativeResize="0"/>
           <p:nvPr/>
         </p:nvPicPr>
@@ -11929,7 +13602,7 @@
       </p:pic>
       <p:pic>
         <p:nvPicPr>
-          <p:cNvPr id="183" name="Google Shape;183;p19"/>
+          <p:cNvPr id="196" name="Google Shape;196;p21"/>
           <p:cNvPicPr preferRelativeResize="0"/>
           <p:nvPr/>
         </p:nvPicPr>
@@ -11963,738 +13636,286 @@
 </p:sld>
 </file>
 
-<file path=ppt/slides/slide8.xml><?xml version="1.0" encoding="utf-8"?>
-<p:sld xmlns:a="http://schemas.openxmlformats.org/drawingml/2006/main" xmlns:r="http://schemas.openxmlformats.org/officeDocument/2006/relationships" xmlns:mc="http://schemas.openxmlformats.org/markup-compatibility/2006" xmlns:mv="urn:schemas-microsoft-com:mac:vml" xmlns:p="http://schemas.openxmlformats.org/presentationml/2006/main" xmlns:c="http://schemas.openxmlformats.org/drawingml/2006/chart" xmlns:dgm="http://schemas.openxmlformats.org/drawingml/2006/diagram" xmlns:o="urn:schemas-microsoft-com:office:office" xmlns:v="urn:schemas-microsoft-com:vml" xmlns:pvml="urn:schemas-microsoft-com:office:powerpoint" xmlns:com="http://schemas.openxmlformats.org/drawingml/2006/compatibility" xmlns:p14="http://schemas.microsoft.com/office/powerpoint/2010/main" xmlns:p15="http://schemas.microsoft.com/office/powerpoint/2012/main" xmlns:ahyp="http://schemas.microsoft.com/office/drawing/2018/hyperlinkcolor">
-  <p:cSld>
-    <p:spTree>
-      <p:nvGrpSpPr>
-        <p:cNvPr id="187" name="Shape 187"/>
-        <p:cNvGrpSpPr/>
-        <p:nvPr/>
-      </p:nvGrpSpPr>
-      <p:grpSpPr>
-        <a:xfrm>
-          <a:off x="0" y="0"/>
-          <a:ext cx="0" cy="0"/>
-          <a:chOff x="0" y="0"/>
-          <a:chExt cx="0" cy="0"/>
-        </a:xfrm>
-      </p:grpSpPr>
-      <p:sp>
-        <p:nvSpPr>
-          <p:cNvPr id="188" name="Google Shape;188;p20"/>
-          <p:cNvSpPr txBox="1"/>
-          <p:nvPr>
-            <p:ph type="title"/>
-          </p:nvPr>
-        </p:nvSpPr>
-        <p:spPr>
-          <a:xfrm>
-            <a:off x="1297500" y="393750"/>
-            <a:ext cx="7038900" cy="914100"/>
-          </a:xfrm>
-          <a:prstGeom prst="rect">
-            <a:avLst/>
-          </a:prstGeom>
-        </p:spPr>
-        <p:txBody>
-          <a:bodyPr anchorCtr="0" anchor="t" bIns="91425" lIns="91425" spcFirstLastPara="1" rIns="91425" wrap="square" tIns="91425">
-            <a:normAutofit/>
-          </a:bodyPr>
-          <a:lstStyle/>
-          <a:p>
-            <a:pPr indent="0" lvl="0" marL="0" rtl="0" algn="l">
-              <a:spcBef>
-                <a:spcPts val="0"/>
-              </a:spcBef>
-              <a:spcAft>
-                <a:spcPts val="0"/>
-              </a:spcAft>
-              <a:buNone/>
-            </a:pPr>
-            <a:r>
-              <a:rPr lang="pl">
-                <a:latin typeface="Lato"/>
-                <a:ea typeface="Lato"/>
-                <a:cs typeface="Lato"/>
-                <a:sym typeface="Lato"/>
-              </a:rPr>
-              <a:t>Approach 1: simply prompt it - Llama</a:t>
-            </a:r>
-            <a:endParaRPr>
-              <a:latin typeface="Lato"/>
-              <a:ea typeface="Lato"/>
-              <a:cs typeface="Lato"/>
-              <a:sym typeface="Lato"/>
-            </a:endParaRPr>
-          </a:p>
-        </p:txBody>
-      </p:sp>
-      <p:sp>
-        <p:nvSpPr>
-          <p:cNvPr id="189" name="Google Shape;189;p20"/>
-          <p:cNvSpPr txBox="1"/>
-          <p:nvPr>
-            <p:ph idx="1" type="body"/>
-          </p:nvPr>
-        </p:nvSpPr>
-        <p:spPr>
-          <a:xfrm>
-            <a:off x="1127125" y="1396400"/>
-            <a:ext cx="3698700" cy="1210200"/>
-          </a:xfrm>
-          <a:prstGeom prst="rect">
-            <a:avLst/>
-          </a:prstGeom>
-        </p:spPr>
-        <p:txBody>
-          <a:bodyPr anchorCtr="0" anchor="t" bIns="91425" lIns="91425" spcFirstLastPara="1" rIns="91425" wrap="square" tIns="91425">
-            <a:normAutofit/>
-          </a:bodyPr>
-          <a:lstStyle/>
-          <a:p>
-            <a:pPr indent="0" lvl="0" marL="0" rtl="0" algn="l">
-              <a:spcBef>
-                <a:spcPts val="0"/>
-              </a:spcBef>
-              <a:spcAft>
-                <a:spcPts val="1200"/>
-              </a:spcAft>
-              <a:buNone/>
-            </a:pPr>
-            <a:r>
-              <a:rPr lang="pl"/>
-              <a:t>We need relatively smart model</a:t>
-            </a:r>
-            <a:br>
-              <a:rPr lang="pl"/>
-            </a:br>
-            <a:br>
-              <a:rPr lang="pl"/>
-            </a:br>
-            <a:r>
-              <a:rPr lang="pl"/>
-              <a:t>Further optimizations: Q5 quantizations, Llama.cpp</a:t>
-            </a:r>
-            <a:endParaRPr/>
-          </a:p>
-        </p:txBody>
-      </p:sp>
-      <p:sp>
-        <p:nvSpPr>
-          <p:cNvPr id="190" name="Google Shape;190;p20"/>
-          <p:cNvSpPr txBox="1"/>
-          <p:nvPr>
-            <p:ph idx="1" type="body"/>
-          </p:nvPr>
-        </p:nvSpPr>
-        <p:spPr>
-          <a:xfrm>
-            <a:off x="5043400" y="1396400"/>
-            <a:ext cx="3964200" cy="959400"/>
-          </a:xfrm>
-          <a:prstGeom prst="rect">
-            <a:avLst/>
-          </a:prstGeom>
-        </p:spPr>
-        <p:txBody>
-          <a:bodyPr anchorCtr="0" anchor="t" bIns="91425" lIns="91425" spcFirstLastPara="1" rIns="91425" wrap="square" tIns="91425">
-            <a:normAutofit/>
-          </a:bodyPr>
-          <a:lstStyle/>
-          <a:p>
-            <a:pPr indent="0" lvl="0" marL="0" rtl="0" algn="l">
-              <a:spcBef>
-                <a:spcPts val="0"/>
-              </a:spcBef>
-              <a:spcAft>
-                <a:spcPts val="0"/>
-              </a:spcAft>
-              <a:buNone/>
-            </a:pPr>
-            <a:r>
-              <a:rPr lang="pl"/>
-              <a:t>Llama-3.2</a:t>
-            </a:r>
-            <a:endParaRPr/>
-          </a:p>
-          <a:p>
-            <a:pPr indent="0" lvl="0" marL="0" rtl="0" algn="l">
-              <a:spcBef>
-                <a:spcPts val="1200"/>
-              </a:spcBef>
-              <a:spcAft>
-                <a:spcPts val="1200"/>
-              </a:spcAft>
-              <a:buNone/>
-            </a:pPr>
-            <a:r>
-              <a:rPr lang="pl"/>
-              <a:t>appr. 1 billion params</a:t>
-            </a:r>
-            <a:endParaRPr/>
-          </a:p>
-        </p:txBody>
-      </p:sp>
-      <p:sp>
-        <p:nvSpPr>
-          <p:cNvPr id="191" name="Google Shape;191;p20"/>
-          <p:cNvSpPr txBox="1"/>
-          <p:nvPr/>
-        </p:nvSpPr>
-        <p:spPr>
-          <a:xfrm>
-            <a:off x="1127125" y="3029800"/>
-            <a:ext cx="3698700" cy="1462200"/>
-          </a:xfrm>
-          <a:prstGeom prst="rect">
-            <a:avLst/>
-          </a:prstGeom>
-          <a:noFill/>
-          <a:ln>
-            <a:noFill/>
-          </a:ln>
-        </p:spPr>
-        <p:txBody>
-          <a:bodyPr anchorCtr="0" anchor="t" bIns="91425" lIns="91425" spcFirstLastPara="1" rIns="91425" wrap="square" tIns="91425">
-            <a:spAutoFit/>
-          </a:bodyPr>
-          <a:lstStyle/>
-          <a:p>
-            <a:pPr indent="0" lvl="0" marL="0" rtl="0" algn="l">
-              <a:spcBef>
-                <a:spcPts val="0"/>
-              </a:spcBef>
-              <a:spcAft>
-                <a:spcPts val="0"/>
-              </a:spcAft>
-              <a:buNone/>
-            </a:pPr>
-            <a:r>
-              <a:rPr lang="pl" sz="1300">
-                <a:solidFill>
-                  <a:schemeClr val="dk2"/>
-                </a:solidFill>
-                <a:latin typeface="Lato"/>
-                <a:ea typeface="Lato"/>
-                <a:cs typeface="Lato"/>
-                <a:sym typeface="Lato"/>
-              </a:rPr>
-              <a:t>Fine tuning - Uns</a:t>
-            </a:r>
-            <a:r>
-              <a:rPr lang="pl" sz="1300">
-                <a:solidFill>
-                  <a:schemeClr val="dk2"/>
-                </a:solidFill>
-                <a:latin typeface="Lato"/>
-                <a:ea typeface="Lato"/>
-                <a:cs typeface="Lato"/>
-                <a:sym typeface="Lato"/>
-              </a:rPr>
-              <a:t>loth</a:t>
-            </a:r>
-            <a:r>
-              <a:rPr lang="pl" sz="1300">
-                <a:solidFill>
-                  <a:schemeClr val="dk2"/>
-                </a:solidFill>
-                <a:latin typeface="Lato"/>
-                <a:ea typeface="Lato"/>
-                <a:cs typeface="Lato"/>
-                <a:sym typeface="Lato"/>
-              </a:rPr>
-              <a:t>, Modal, LoRA</a:t>
-            </a:r>
-            <a:br>
-              <a:rPr lang="pl" sz="1300">
-                <a:solidFill>
-                  <a:schemeClr val="dk2"/>
-                </a:solidFill>
-                <a:latin typeface="Lato"/>
-                <a:ea typeface="Lato"/>
-                <a:cs typeface="Lato"/>
-                <a:sym typeface="Lato"/>
-              </a:rPr>
-            </a:br>
-            <a:br>
-              <a:rPr lang="pl" sz="1300">
-                <a:solidFill>
-                  <a:schemeClr val="dk2"/>
-                </a:solidFill>
-                <a:latin typeface="Lato"/>
-                <a:ea typeface="Lato"/>
-                <a:cs typeface="Lato"/>
-                <a:sym typeface="Lato"/>
-              </a:rPr>
-            </a:br>
-            <a:r>
-              <a:rPr lang="pl" sz="1300">
-                <a:solidFill>
-                  <a:schemeClr val="dk2"/>
-                </a:solidFill>
-                <a:latin typeface="Lato"/>
-                <a:ea typeface="Lato"/>
-                <a:cs typeface="Lato"/>
-                <a:sym typeface="Lato"/>
-              </a:rPr>
-              <a:t>Our dataset - around 10k samples</a:t>
-            </a:r>
-            <a:br>
-              <a:rPr lang="pl" sz="1300">
-                <a:solidFill>
-                  <a:schemeClr val="dk2"/>
-                </a:solidFill>
-                <a:latin typeface="Lato"/>
-                <a:ea typeface="Lato"/>
-                <a:cs typeface="Lato"/>
-                <a:sym typeface="Lato"/>
-              </a:rPr>
-            </a:br>
-            <a:br>
-              <a:rPr lang="pl" sz="1300">
-                <a:solidFill>
-                  <a:schemeClr val="dk2"/>
-                </a:solidFill>
-                <a:latin typeface="Lato"/>
-                <a:ea typeface="Lato"/>
-                <a:cs typeface="Lato"/>
-                <a:sym typeface="Lato"/>
-              </a:rPr>
-            </a:br>
-            <a:r>
-              <a:rPr lang="pl" sz="1300">
-                <a:solidFill>
-                  <a:schemeClr val="dk2"/>
-                </a:solidFill>
-                <a:latin typeface="Lato"/>
-                <a:ea typeface="Lato"/>
-                <a:cs typeface="Lato"/>
-                <a:sym typeface="Lato"/>
-              </a:rPr>
-              <a:t>Single fine tuning ~30min on H100</a:t>
-            </a:r>
-            <a:endParaRPr sz="1300">
-              <a:solidFill>
-                <a:schemeClr val="dk2"/>
-              </a:solidFill>
-              <a:latin typeface="Lato"/>
-              <a:ea typeface="Lato"/>
-              <a:cs typeface="Lato"/>
-              <a:sym typeface="Lato"/>
-            </a:endParaRPr>
-          </a:p>
-          <a:p>
-            <a:pPr indent="0" lvl="0" marL="0" rtl="0" algn="l">
-              <a:spcBef>
-                <a:spcPts val="0"/>
-              </a:spcBef>
-              <a:spcAft>
-                <a:spcPts val="0"/>
-              </a:spcAft>
-              <a:buNone/>
-            </a:pPr>
-            <a:r>
-              <a:t/>
-            </a:r>
-            <a:endParaRPr sz="1800">
-              <a:solidFill>
-                <a:schemeClr val="dk2"/>
-              </a:solidFill>
-              <a:latin typeface="Lato"/>
-              <a:ea typeface="Lato"/>
-              <a:cs typeface="Lato"/>
-              <a:sym typeface="Lato"/>
-            </a:endParaRPr>
-          </a:p>
-        </p:txBody>
-      </p:sp>
-      <p:pic>
-        <p:nvPicPr>
-          <p:cNvPr id="192" name="Google Shape;192;p20"/>
-          <p:cNvPicPr preferRelativeResize="0"/>
-          <p:nvPr/>
-        </p:nvPicPr>
-        <p:blipFill>
-          <a:blip r:embed="rId3">
-            <a:alphaModFix/>
-          </a:blip>
-          <a:stretch>
-            <a:fillRect/>
-          </a:stretch>
-        </p:blipFill>
-        <p:spPr>
-          <a:xfrm>
-            <a:off x="5043400" y="2571750"/>
-            <a:ext cx="2853050" cy="1953150"/>
-          </a:xfrm>
-          <a:prstGeom prst="rect">
-            <a:avLst/>
-          </a:prstGeom>
-          <a:noFill/>
-          <a:ln>
-            <a:noFill/>
-          </a:ln>
-        </p:spPr>
-      </p:pic>
-    </p:spTree>
-  </p:cSld>
-  <p:clrMapOvr>
-    <a:masterClrMapping/>
-  </p:clrMapOvr>
-</p:sld>
+<file path=ppt/theme/theme1.xml><?xml version="1.0" encoding="utf-8"?>
+<a:theme xmlns:a="http://schemas.openxmlformats.org/drawingml/2006/main" xmlns:r="http://schemas.openxmlformats.org/officeDocument/2006/relationships" name="Focus">
+  <a:themeElements>
+    <a:clrScheme name="Focus">
+      <a:dk1>
+        <a:srgbClr val="1B212C"/>
+      </a:dk1>
+      <a:lt1>
+        <a:srgbClr val="FFFFFF"/>
+      </a:lt1>
+      <a:dk2>
+        <a:srgbClr val="D9D9D9"/>
+      </a:dk2>
+      <a:lt2>
+        <a:srgbClr val="82C7A5"/>
+      </a:lt2>
+      <a:accent1>
+        <a:srgbClr val="0145AC"/>
+      </a:accent1>
+      <a:accent2>
+        <a:srgbClr val="EECE1A"/>
+      </a:accent2>
+      <a:accent3>
+        <a:srgbClr val="4E5567"/>
+      </a:accent3>
+      <a:accent4>
+        <a:srgbClr val="F4D6AD"/>
+      </a:accent4>
+      <a:accent5>
+        <a:srgbClr val="7890CD"/>
+      </a:accent5>
+      <a:accent6>
+        <a:srgbClr val="F15E22"/>
+      </a:accent6>
+      <a:hlink>
+        <a:srgbClr val="7890CD"/>
+      </a:hlink>
+      <a:folHlink>
+        <a:srgbClr val="7890CD"/>
+      </a:folHlink>
+    </a:clrScheme>
+    <a:fontScheme name="Office">
+      <a:majorFont>
+        <a:latin typeface="Arial"/>
+        <a:ea typeface=""/>
+        <a:cs typeface=""/>
+        <a:font script="Jpan" typeface="ＭＳ Ｐゴシック"/>
+        <a:font script="Hang" typeface="맑은 고딕"/>
+        <a:font script="Hans" typeface="宋体"/>
+        <a:font script="Hant" typeface="新細明體"/>
+        <a:font script="Arab" typeface="Times New Roman"/>
+        <a:font script="Hebr" typeface="Times New Roman"/>
+        <a:font script="Thai" typeface="Angsana New"/>
+        <a:font script="Ethi" typeface="Nyala"/>
+        <a:font script="Beng" typeface="Vrinda"/>
+        <a:font script="Gujr" typeface="Shruti"/>
+        <a:font script="Khmr" typeface="MoolBoran"/>
+        <a:font script="Knda" typeface="Tunga"/>
+        <a:font script="Guru" typeface="Raavi"/>
+        <a:font script="Cans" typeface="Euphemia"/>
+        <a:font script="Cher" typeface="Plantagenet Cherokee"/>
+        <a:font script="Yiii" typeface="Microsoft Yi Baiti"/>
+        <a:font script="Tibt" typeface="Microsoft Himalaya"/>
+        <a:font script="Thaa" typeface="MV Boli"/>
+        <a:font script="Deva" typeface="Mangal"/>
+        <a:font script="Telu" typeface="Gautami"/>
+        <a:font script="Taml" typeface="Latha"/>
+        <a:font script="Syrc" typeface="Estrangelo Edessa"/>
+        <a:font script="Orya" typeface="Kalinga"/>
+        <a:font script="Mlym" typeface="Kartika"/>
+        <a:font script="Laoo" typeface="DokChampa"/>
+        <a:font script="Sinh" typeface="Iskoola Pota"/>
+        <a:font script="Mong" typeface="Mongolian Baiti"/>
+        <a:font script="Viet" typeface="Times New Roman"/>
+        <a:font script="Uigh" typeface="Microsoft Uighur"/>
+        <a:font script="Geor" typeface="Sylfaen"/>
+      </a:majorFont>
+      <a:minorFont>
+        <a:latin typeface="Arial"/>
+        <a:ea typeface=""/>
+        <a:cs typeface=""/>
+        <a:font script="Jpan" typeface="ＭＳ Ｐゴシック"/>
+        <a:font script="Hang" typeface="맑은 고딕"/>
+        <a:font script="Hans" typeface="宋体"/>
+        <a:font script="Hant" typeface="新細明體"/>
+        <a:font script="Arab" typeface="Arial"/>
+        <a:font script="Hebr" typeface="Arial"/>
+        <a:font script="Thai" typeface="Cordia New"/>
+        <a:font script="Ethi" typeface="Nyala"/>
+        <a:font script="Beng" typeface="Vrinda"/>
+        <a:font script="Gujr" typeface="Shruti"/>
+        <a:font script="Khmr" typeface="DaunPenh"/>
+        <a:font script="Knda" typeface="Tunga"/>
+        <a:font script="Guru" typeface="Raavi"/>
+        <a:font script="Cans" typeface="Euphemia"/>
+        <a:font script="Cher" typeface="Plantagenet Cherokee"/>
+        <a:font script="Yiii" typeface="Microsoft Yi Baiti"/>
+        <a:font script="Tibt" typeface="Microsoft Himalaya"/>
+        <a:font script="Thaa" typeface="MV Boli"/>
+        <a:font script="Deva" typeface="Mangal"/>
+        <a:font script="Telu" typeface="Gautami"/>
+        <a:font script="Taml" typeface="Latha"/>
+        <a:font script="Syrc" typeface="Estrangelo Edessa"/>
+        <a:font script="Orya" typeface="Kalinga"/>
+        <a:font script="Mlym" typeface="Kartika"/>
+        <a:font script="Laoo" typeface="DokChampa"/>
+        <a:font script="Sinh" typeface="Iskoola Pota"/>
+        <a:font script="Mong" typeface="Mongolian Baiti"/>
+        <a:font script="Viet" typeface="Arial"/>
+        <a:font script="Uigh" typeface="Microsoft Uighur"/>
+        <a:font script="Geor" typeface="Sylfaen"/>
+      </a:minorFont>
+    </a:fontScheme>
+    <a:fmtScheme name="Office">
+      <a:fillStyleLst>
+        <a:solidFill>
+          <a:schemeClr val="phClr"/>
+        </a:solidFill>
+        <a:gradFill rotWithShape="1">
+          <a:gsLst>
+            <a:gs pos="0">
+              <a:schemeClr val="phClr">
+                <a:tint val="50000"/>
+                <a:satMod val="300000"/>
+              </a:schemeClr>
+            </a:gs>
+            <a:gs pos="35000">
+              <a:schemeClr val="phClr">
+                <a:tint val="37000"/>
+                <a:satMod val="300000"/>
+              </a:schemeClr>
+            </a:gs>
+            <a:gs pos="100000">
+              <a:schemeClr val="phClr">
+                <a:tint val="15000"/>
+                <a:satMod val="350000"/>
+              </a:schemeClr>
+            </a:gs>
+          </a:gsLst>
+          <a:lin ang="16200000" scaled="1"/>
+        </a:gradFill>
+        <a:gradFill rotWithShape="1">
+          <a:gsLst>
+            <a:gs pos="0">
+              <a:schemeClr val="phClr">
+                <a:tint val="100000"/>
+                <a:shade val="100000"/>
+                <a:satMod val="130000"/>
+              </a:schemeClr>
+            </a:gs>
+            <a:gs pos="100000">
+              <a:schemeClr val="phClr">
+                <a:tint val="50000"/>
+                <a:shade val="100000"/>
+                <a:satMod val="350000"/>
+              </a:schemeClr>
+            </a:gs>
+          </a:gsLst>
+          <a:lin ang="16200000" scaled="0"/>
+        </a:gradFill>
+      </a:fillStyleLst>
+      <a:lnStyleLst>
+        <a:ln w="9525" cap="flat" cmpd="sng" algn="ctr">
+          <a:solidFill>
+            <a:schemeClr val="phClr">
+              <a:shade val="95000"/>
+              <a:satMod val="105000"/>
+            </a:schemeClr>
+          </a:solidFill>
+          <a:prstDash val="solid"/>
+        </a:ln>
+        <a:ln w="25400" cap="flat" cmpd="sng" algn="ctr">
+          <a:solidFill>
+            <a:schemeClr val="phClr"/>
+          </a:solidFill>
+          <a:prstDash val="solid"/>
+        </a:ln>
+        <a:ln w="38100" cap="flat" cmpd="sng" algn="ctr">
+          <a:solidFill>
+            <a:schemeClr val="phClr"/>
+          </a:solidFill>
+          <a:prstDash val="solid"/>
+        </a:ln>
+      </a:lnStyleLst>
+      <a:effectStyleLst>
+        <a:effectStyle>
+          <a:effectLst>
+            <a:outerShdw blurRad="40000" dist="20000" dir="5400000" rotWithShape="0">
+              <a:srgbClr val="000000">
+                <a:alpha val="38000"/>
+              </a:srgbClr>
+            </a:outerShdw>
+          </a:effectLst>
+        </a:effectStyle>
+        <a:effectStyle>
+          <a:effectLst>
+            <a:outerShdw blurRad="40000" dist="23000" dir="5400000" rotWithShape="0">
+              <a:srgbClr val="000000">
+                <a:alpha val="35000"/>
+              </a:srgbClr>
+            </a:outerShdw>
+          </a:effectLst>
+        </a:effectStyle>
+        <a:effectStyle>
+          <a:effectLst>
+            <a:outerShdw blurRad="40000" dist="23000" dir="5400000" rotWithShape="0">
+              <a:srgbClr val="000000">
+                <a:alpha val="35000"/>
+              </a:srgbClr>
+            </a:outerShdw>
+          </a:effectLst>
+          <a:scene3d>
+            <a:camera prst="orthographicFront">
+              <a:rot lat="0" lon="0" rev="0"/>
+            </a:camera>
+            <a:lightRig rig="threePt" dir="t">
+              <a:rot lat="0" lon="0" rev="1200000"/>
+            </a:lightRig>
+          </a:scene3d>
+          <a:sp3d>
+            <a:bevelT w="63500" h="25400"/>
+          </a:sp3d>
+        </a:effectStyle>
+      </a:effectStyleLst>
+      <a:bgFillStyleLst>
+        <a:solidFill>
+          <a:schemeClr val="phClr"/>
+        </a:solidFill>
+        <a:gradFill rotWithShape="1">
+          <a:gsLst>
+            <a:gs pos="0">
+              <a:schemeClr val="phClr">
+                <a:tint val="40000"/>
+                <a:satMod val="350000"/>
+              </a:schemeClr>
+            </a:gs>
+            <a:gs pos="40000">
+              <a:schemeClr val="phClr">
+                <a:tint val="45000"/>
+                <a:shade val="99000"/>
+                <a:satMod val="350000"/>
+              </a:schemeClr>
+            </a:gs>
+            <a:gs pos="100000">
+              <a:schemeClr val="phClr">
+                <a:shade val="20000"/>
+                <a:satMod val="255000"/>
+              </a:schemeClr>
+            </a:gs>
+          </a:gsLst>
+          <a:path path="circle">
+            <a:fillToRect l="50000" t="-80000" r="50000" b="180000"/>
+          </a:path>
+        </a:gradFill>
+        <a:gradFill rotWithShape="1">
+          <a:gsLst>
+            <a:gs pos="0">
+              <a:schemeClr val="phClr">
+                <a:tint val="80000"/>
+                <a:satMod val="300000"/>
+              </a:schemeClr>
+            </a:gs>
+            <a:gs pos="100000">
+              <a:schemeClr val="phClr">
+                <a:shade val="30000"/>
+                <a:satMod val="200000"/>
+              </a:schemeClr>
+            </a:gs>
+          </a:gsLst>
+          <a:path path="circle">
+            <a:fillToRect l="50000" t="50000" r="50000" b="50000"/>
+          </a:path>
+        </a:gradFill>
+      </a:bgFillStyleLst>
+    </a:fmtScheme>
+  </a:themeElements>
+</a:theme>
 </file>
 
-<file path=ppt/slides/slide9.xml><?xml version="1.0" encoding="utf-8"?>
-<p:sld xmlns:a="http://schemas.openxmlformats.org/drawingml/2006/main" xmlns:r="http://schemas.openxmlformats.org/officeDocument/2006/relationships" xmlns:mc="http://schemas.openxmlformats.org/markup-compatibility/2006" xmlns:mv="urn:schemas-microsoft-com:mac:vml" xmlns:p="http://schemas.openxmlformats.org/presentationml/2006/main" xmlns:c="http://schemas.openxmlformats.org/drawingml/2006/chart" xmlns:dgm="http://schemas.openxmlformats.org/drawingml/2006/diagram" xmlns:o="urn:schemas-microsoft-com:office:office" xmlns:v="urn:schemas-microsoft-com:vml" xmlns:pvml="urn:schemas-microsoft-com:office:powerpoint" xmlns:com="http://schemas.openxmlformats.org/drawingml/2006/compatibility" xmlns:p14="http://schemas.microsoft.com/office/powerpoint/2010/main" xmlns:p15="http://schemas.microsoft.com/office/powerpoint/2012/main" xmlns:ahyp="http://schemas.microsoft.com/office/drawing/2018/hyperlinkcolor">
-  <p:cSld>
-    <p:spTree>
-      <p:nvGrpSpPr>
-        <p:cNvPr id="196" name="Shape 196"/>
-        <p:cNvGrpSpPr/>
-        <p:nvPr/>
-      </p:nvGrpSpPr>
-      <p:grpSpPr>
-        <a:xfrm>
-          <a:off x="0" y="0"/>
-          <a:ext cx="0" cy="0"/>
-          <a:chOff x="0" y="0"/>
-          <a:chExt cx="0" cy="0"/>
-        </a:xfrm>
-      </p:grpSpPr>
-      <p:sp>
-        <p:nvSpPr>
-          <p:cNvPr id="197" name="Google Shape;197;p21"/>
-          <p:cNvSpPr txBox="1"/>
-          <p:nvPr>
-            <p:ph type="title"/>
-          </p:nvPr>
-        </p:nvSpPr>
-        <p:spPr>
-          <a:xfrm>
-            <a:off x="1297500" y="505250"/>
-            <a:ext cx="7038900" cy="914100"/>
-          </a:xfrm>
-          <a:prstGeom prst="rect">
-            <a:avLst/>
-          </a:prstGeom>
-        </p:spPr>
-        <p:txBody>
-          <a:bodyPr anchorCtr="0" anchor="t" bIns="91425" lIns="91425" spcFirstLastPara="1" rIns="91425" wrap="square" tIns="91425">
-            <a:normAutofit/>
-          </a:bodyPr>
-          <a:lstStyle/>
-          <a:p>
-            <a:pPr indent="0" lvl="0" marL="0" rtl="0" algn="l">
-              <a:spcBef>
-                <a:spcPts val="0"/>
-              </a:spcBef>
-              <a:spcAft>
-                <a:spcPts val="0"/>
-              </a:spcAft>
-              <a:buNone/>
-            </a:pPr>
-            <a:r>
-              <a:rPr lang="pl">
-                <a:latin typeface="Lato"/>
-                <a:ea typeface="Lato"/>
-                <a:cs typeface="Lato"/>
-                <a:sym typeface="Lato"/>
-              </a:rPr>
-              <a:t>Approach 2: utilize NER</a:t>
-            </a:r>
-            <a:endParaRPr>
-              <a:latin typeface="Lato"/>
-              <a:ea typeface="Lato"/>
-              <a:cs typeface="Lato"/>
-              <a:sym typeface="Lato"/>
-            </a:endParaRPr>
-          </a:p>
-        </p:txBody>
-      </p:sp>
-      <p:sp>
-        <p:nvSpPr>
-          <p:cNvPr id="198" name="Google Shape;198;p21"/>
-          <p:cNvSpPr txBox="1"/>
-          <p:nvPr>
-            <p:ph idx="1" type="body"/>
-          </p:nvPr>
-        </p:nvSpPr>
-        <p:spPr>
-          <a:xfrm>
-            <a:off x="1297500" y="1475050"/>
-            <a:ext cx="3013800" cy="1041000"/>
-          </a:xfrm>
-          <a:prstGeom prst="rect">
-            <a:avLst/>
-          </a:prstGeom>
-        </p:spPr>
-        <p:txBody>
-          <a:bodyPr anchorCtr="0" anchor="t" bIns="91425" lIns="91425" spcFirstLastPara="1" rIns="91425" wrap="square" tIns="91425">
-            <a:normAutofit/>
-          </a:bodyPr>
-          <a:lstStyle/>
-          <a:p>
-            <a:pPr indent="0" lvl="0" marL="0" rtl="0" algn="l">
-              <a:spcBef>
-                <a:spcPts val="0"/>
-              </a:spcBef>
-              <a:spcAft>
-                <a:spcPts val="0"/>
-              </a:spcAft>
-              <a:buNone/>
-            </a:pPr>
-            <a:r>
-              <a:rPr lang="pl"/>
-              <a:t>Named Entity Recognition</a:t>
-            </a:r>
-            <a:endParaRPr/>
-          </a:p>
-          <a:p>
-            <a:pPr indent="0" lvl="0" marL="0" rtl="0" algn="l">
-              <a:spcBef>
-                <a:spcPts val="1200"/>
-              </a:spcBef>
-              <a:spcAft>
-                <a:spcPts val="1200"/>
-              </a:spcAft>
-              <a:buNone/>
-            </a:pPr>
-            <a:r>
-              <a:rPr lang="pl"/>
-              <a:t>Powered By BERT - around 150mln params</a:t>
-            </a:r>
-            <a:endParaRPr/>
-          </a:p>
-        </p:txBody>
-      </p:sp>
-      <p:sp>
-        <p:nvSpPr>
-          <p:cNvPr id="199" name="Google Shape;199;p21"/>
-          <p:cNvSpPr txBox="1"/>
-          <p:nvPr/>
-        </p:nvSpPr>
-        <p:spPr>
-          <a:xfrm>
-            <a:off x="1297500" y="2571750"/>
-            <a:ext cx="3274500" cy="1169700"/>
-          </a:xfrm>
-          <a:prstGeom prst="rect">
-            <a:avLst/>
-          </a:prstGeom>
-          <a:noFill/>
-          <a:ln>
-            <a:noFill/>
-          </a:ln>
-        </p:spPr>
-        <p:txBody>
-          <a:bodyPr anchorCtr="0" anchor="t" bIns="91425" lIns="91425" spcFirstLastPara="1" rIns="91425" wrap="square" tIns="91425">
-            <a:spAutoFit/>
-          </a:bodyPr>
-          <a:lstStyle/>
-          <a:p>
-            <a:pPr indent="0" lvl="0" marL="0" rtl="0" algn="l">
-              <a:spcBef>
-                <a:spcPts val="0"/>
-              </a:spcBef>
-              <a:spcAft>
-                <a:spcPts val="0"/>
-              </a:spcAft>
-              <a:buNone/>
-            </a:pPr>
-            <a:r>
-              <a:rPr lang="pl" sz="1600">
-                <a:solidFill>
-                  <a:schemeClr val="dk2"/>
-                </a:solidFill>
-                <a:latin typeface="Lato"/>
-                <a:ea typeface="Lato"/>
-                <a:cs typeface="Lato"/>
-                <a:sym typeface="Lato"/>
-              </a:rPr>
-              <a:t>Two phases:</a:t>
-            </a:r>
-            <a:endParaRPr sz="1600">
-              <a:solidFill>
-                <a:schemeClr val="dk2"/>
-              </a:solidFill>
-              <a:latin typeface="Lato"/>
-              <a:ea typeface="Lato"/>
-              <a:cs typeface="Lato"/>
-              <a:sym typeface="Lato"/>
-            </a:endParaRPr>
-          </a:p>
-          <a:p>
-            <a:pPr indent="-330200" lvl="0" marL="457200" rtl="0" algn="l">
-              <a:spcBef>
-                <a:spcPts val="0"/>
-              </a:spcBef>
-              <a:spcAft>
-                <a:spcPts val="0"/>
-              </a:spcAft>
-              <a:buClr>
-                <a:schemeClr val="dk2"/>
-              </a:buClr>
-              <a:buSzPts val="1600"/>
-              <a:buFont typeface="Lato"/>
-              <a:buChar char="●"/>
-            </a:pPr>
-            <a:r>
-              <a:rPr lang="pl" sz="1600">
-                <a:solidFill>
-                  <a:schemeClr val="dk2"/>
-                </a:solidFill>
-                <a:latin typeface="Lato"/>
-                <a:ea typeface="Lato"/>
-                <a:cs typeface="Lato"/>
-                <a:sym typeface="Lato"/>
-              </a:rPr>
-              <a:t>Select coupon contents</a:t>
-            </a:r>
-            <a:endParaRPr sz="1600">
-              <a:solidFill>
-                <a:schemeClr val="dk2"/>
-              </a:solidFill>
-              <a:latin typeface="Lato"/>
-              <a:ea typeface="Lato"/>
-              <a:cs typeface="Lato"/>
-              <a:sym typeface="Lato"/>
-            </a:endParaRPr>
-          </a:p>
-          <a:p>
-            <a:pPr indent="-330200" lvl="0" marL="457200" rtl="0" algn="l">
-              <a:spcBef>
-                <a:spcPts val="0"/>
-              </a:spcBef>
-              <a:spcAft>
-                <a:spcPts val="0"/>
-              </a:spcAft>
-              <a:buClr>
-                <a:schemeClr val="dk2"/>
-              </a:buClr>
-              <a:buSzPts val="1600"/>
-              <a:buFont typeface="Lato"/>
-              <a:buChar char="●"/>
-            </a:pPr>
-            <a:r>
-              <a:rPr lang="pl" sz="1600">
-                <a:solidFill>
-                  <a:schemeClr val="dk2"/>
-                </a:solidFill>
-                <a:latin typeface="Lato"/>
-                <a:ea typeface="Lato"/>
-                <a:cs typeface="Lato"/>
-                <a:sym typeface="Lato"/>
-              </a:rPr>
-              <a:t>select coupon attributes inside contents</a:t>
-            </a:r>
-            <a:endParaRPr sz="1600">
-              <a:solidFill>
-                <a:schemeClr val="dk2"/>
-              </a:solidFill>
-              <a:latin typeface="Lato"/>
-              <a:ea typeface="Lato"/>
-              <a:cs typeface="Lato"/>
-              <a:sym typeface="Lato"/>
-            </a:endParaRPr>
-          </a:p>
-        </p:txBody>
-      </p:sp>
-      <p:sp>
-        <p:nvSpPr>
-          <p:cNvPr id="200" name="Google Shape;200;p21"/>
-          <p:cNvSpPr txBox="1"/>
-          <p:nvPr/>
-        </p:nvSpPr>
-        <p:spPr>
-          <a:xfrm>
-            <a:off x="1297500" y="4000925"/>
-            <a:ext cx="3698700" cy="431100"/>
-          </a:xfrm>
-          <a:prstGeom prst="rect">
-            <a:avLst/>
-          </a:prstGeom>
-          <a:noFill/>
-          <a:ln>
-            <a:noFill/>
-          </a:ln>
-        </p:spPr>
-        <p:txBody>
-          <a:bodyPr anchorCtr="0" anchor="t" bIns="91425" lIns="91425" spcFirstLastPara="1" rIns="91425" wrap="square" tIns="91425">
-            <a:spAutoFit/>
-          </a:bodyPr>
-          <a:lstStyle/>
-          <a:p>
-            <a:pPr indent="0" lvl="0" marL="0" rtl="0" algn="l">
-              <a:spcBef>
-                <a:spcPts val="0"/>
-              </a:spcBef>
-              <a:spcAft>
-                <a:spcPts val="0"/>
-              </a:spcAft>
-              <a:buNone/>
-            </a:pPr>
-            <a:r>
-              <a:rPr lang="pl" sz="1600">
-                <a:solidFill>
-                  <a:schemeClr val="dk2"/>
-                </a:solidFill>
-                <a:latin typeface="Lato"/>
-                <a:ea typeface="Lato"/>
-                <a:cs typeface="Lato"/>
-                <a:sym typeface="Lato"/>
-              </a:rPr>
-              <a:t>More lightweight</a:t>
-            </a:r>
-            <a:endParaRPr sz="1600">
-              <a:solidFill>
-                <a:schemeClr val="dk2"/>
-              </a:solidFill>
-              <a:latin typeface="Lato"/>
-              <a:ea typeface="Lato"/>
-              <a:cs typeface="Lato"/>
-              <a:sym typeface="Lato"/>
-            </a:endParaRPr>
-          </a:p>
-        </p:txBody>
-      </p:sp>
-      <p:pic>
-        <p:nvPicPr>
-          <p:cNvPr id="201" name="Google Shape;201;p21"/>
-          <p:cNvPicPr preferRelativeResize="0"/>
-          <p:nvPr/>
-        </p:nvPicPr>
-        <p:blipFill>
-          <a:blip r:embed="rId3">
-            <a:alphaModFix/>
-          </a:blip>
-          <a:stretch>
-            <a:fillRect/>
-          </a:stretch>
-        </p:blipFill>
-        <p:spPr>
-          <a:xfrm>
-            <a:off x="4572000" y="2115975"/>
-            <a:ext cx="3843000" cy="1825425"/>
-          </a:xfrm>
-          <a:prstGeom prst="rect">
-            <a:avLst/>
-          </a:prstGeom>
-          <a:noFill/>
-          <a:ln>
-            <a:noFill/>
-          </a:ln>
-        </p:spPr>
-      </p:pic>
-    </p:spTree>
-  </p:cSld>
-  <p:clrMapOvr>
-    <a:masterClrMapping/>
-  </p:clrMapOvr>
-</p:sld>
-</file>
-
-<file path=ppt/theme/theme1.xml><?xml version="1.0" encoding="utf-8"?>
+<file path=ppt/theme/theme2.xml><?xml version="1.0" encoding="utf-8"?>
 <a:theme xmlns:a="http://schemas.openxmlformats.org/drawingml/2006/main" xmlns:r="http://schemas.openxmlformats.org/officeDocument/2006/relationships">
   <a:themeElements>
     <a:clrScheme name="Default">
@@ -12971,283 +14192,4 @@
     </a:fmtScheme>
   </a:themeElements>
 </a:theme>
-</file>
-
-<file path=ppt/theme/theme2.xml><?xml version="1.0" encoding="utf-8"?>
-<a:theme xmlns:a="http://schemas.openxmlformats.org/drawingml/2006/main" xmlns:r="http://schemas.openxmlformats.org/officeDocument/2006/relationships" name="Focus">
-  <a:themeElements>
-    <a:clrScheme name="Focus">
-      <a:dk1>
-        <a:srgbClr val="1B212C"/>
-      </a:dk1>
-      <a:lt1>
-        <a:srgbClr val="FFFFFF"/>
-      </a:lt1>
-      <a:dk2>
-        <a:srgbClr val="D9D9D9"/>
-      </a:dk2>
-      <a:lt2>
-        <a:srgbClr val="82C7A5"/>
-      </a:lt2>
-      <a:accent1>
-        <a:srgbClr val="0145AC"/>
-      </a:accent1>
-      <a:accent2>
-        <a:srgbClr val="EECE1A"/>
-      </a:accent2>
-      <a:accent3>
-        <a:srgbClr val="4E5567"/>
-      </a:accent3>
-      <a:accent4>
-        <a:srgbClr val="F4D6AD"/>
-      </a:accent4>
-      <a:accent5>
-        <a:srgbClr val="7890CD"/>
-      </a:accent5>
-      <a:accent6>
-        <a:srgbClr val="F15E22"/>
-      </a:accent6>
-      <a:hlink>
-        <a:srgbClr val="7890CD"/>
-      </a:hlink>
-      <a:folHlink>
-        <a:srgbClr val="7890CD"/>
-      </a:folHlink>
-    </a:clrScheme>
-    <a:fontScheme name="Office">
-      <a:majorFont>
-        <a:latin typeface="Arial"/>
-        <a:ea typeface=""/>
-        <a:cs typeface=""/>
-        <a:font script="Jpan" typeface="ＭＳ Ｐゴシック"/>
-        <a:font script="Hang" typeface="맑은 고딕"/>
-        <a:font script="Hans" typeface="宋体"/>
-        <a:font script="Hant" typeface="新細明體"/>
-        <a:font script="Arab" typeface="Times New Roman"/>
-        <a:font script="Hebr" typeface="Times New Roman"/>
-        <a:font script="Thai" typeface="Angsana New"/>
-        <a:font script="Ethi" typeface="Nyala"/>
-        <a:font script="Beng" typeface="Vrinda"/>
-        <a:font script="Gujr" typeface="Shruti"/>
-        <a:font script="Khmr" typeface="MoolBoran"/>
-        <a:font script="Knda" typeface="Tunga"/>
-        <a:font script="Guru" typeface="Raavi"/>
-        <a:font script="Cans" typeface="Euphemia"/>
-        <a:font script="Cher" typeface="Plantagenet Cherokee"/>
-        <a:font script="Yiii" typeface="Microsoft Yi Baiti"/>
-        <a:font script="Tibt" typeface="Microsoft Himalaya"/>
-        <a:font script="Thaa" typeface="MV Boli"/>
-        <a:font script="Deva" typeface="Mangal"/>
-        <a:font script="Telu" typeface="Gautami"/>
-        <a:font script="Taml" typeface="Latha"/>
-        <a:font script="Syrc" typeface="Estrangelo Edessa"/>
-        <a:font script="Orya" typeface="Kalinga"/>
-        <a:font script="Mlym" typeface="Kartika"/>
-        <a:font script="Laoo" typeface="DokChampa"/>
-        <a:font script="Sinh" typeface="Iskoola Pota"/>
-        <a:font script="Mong" typeface="Mongolian Baiti"/>
-        <a:font script="Viet" typeface="Times New Roman"/>
-        <a:font script="Uigh" typeface="Microsoft Uighur"/>
-        <a:font script="Geor" typeface="Sylfaen"/>
-      </a:majorFont>
-      <a:minorFont>
-        <a:latin typeface="Arial"/>
-        <a:ea typeface=""/>
-        <a:cs typeface=""/>
-        <a:font script="Jpan" typeface="ＭＳ Ｐゴシック"/>
-        <a:font script="Hang" typeface="맑은 고딕"/>
-        <a:font script="Hans" typeface="宋体"/>
-        <a:font script="Hant" typeface="新細明體"/>
-        <a:font script="Arab" typeface="Arial"/>
-        <a:font script="Hebr" typeface="Arial"/>
-        <a:font script="Thai" typeface="Cordia New"/>
-        <a:font script="Ethi" typeface="Nyala"/>
-        <a:font script="Beng" typeface="Vrinda"/>
-        <a:font script="Gujr" typeface="Shruti"/>
-        <a:font script="Khmr" typeface="DaunPenh"/>
-        <a:font script="Knda" typeface="Tunga"/>
-        <a:font script="Guru" typeface="Raavi"/>
-        <a:font script="Cans" typeface="Euphemia"/>
-        <a:font script="Cher" typeface="Plantagenet Cherokee"/>
-        <a:font script="Yiii" typeface="Microsoft Yi Baiti"/>
-        <a:font script="Tibt" typeface="Microsoft Himalaya"/>
-        <a:font script="Thaa" typeface="MV Boli"/>
-        <a:font script="Deva" typeface="Mangal"/>
-        <a:font script="Telu" typeface="Gautami"/>
-        <a:font script="Taml" typeface="Latha"/>
-        <a:font script="Syrc" typeface="Estrangelo Edessa"/>
-        <a:font script="Orya" typeface="Kalinga"/>
-        <a:font script="Mlym" typeface="Kartika"/>
-        <a:font script="Laoo" typeface="DokChampa"/>
-        <a:font script="Sinh" typeface="Iskoola Pota"/>
-        <a:font script="Mong" typeface="Mongolian Baiti"/>
-        <a:font script="Viet" typeface="Arial"/>
-        <a:font script="Uigh" typeface="Microsoft Uighur"/>
-        <a:font script="Geor" typeface="Sylfaen"/>
-      </a:minorFont>
-    </a:fontScheme>
-    <a:fmtScheme name="Office">
-      <a:fillStyleLst>
-        <a:solidFill>
-          <a:schemeClr val="phClr"/>
-        </a:solidFill>
-        <a:gradFill rotWithShape="1">
-          <a:gsLst>
-            <a:gs pos="0">
-              <a:schemeClr val="phClr">
-                <a:tint val="50000"/>
-                <a:satMod val="300000"/>
-              </a:schemeClr>
-            </a:gs>
-            <a:gs pos="35000">
-              <a:schemeClr val="phClr">
-                <a:tint val="37000"/>
-                <a:satMod val="300000"/>
-              </a:schemeClr>
-            </a:gs>
-            <a:gs pos="100000">
-              <a:schemeClr val="phClr">
-                <a:tint val="15000"/>
-                <a:satMod val="350000"/>
-              </a:schemeClr>
-            </a:gs>
-          </a:gsLst>
-          <a:lin ang="16200000" scaled="1"/>
-        </a:gradFill>
-        <a:gradFill rotWithShape="1">
-          <a:gsLst>
-            <a:gs pos="0">
-              <a:schemeClr val="phClr">
-                <a:tint val="100000"/>
-                <a:shade val="100000"/>
-                <a:satMod val="130000"/>
-              </a:schemeClr>
-            </a:gs>
-            <a:gs pos="100000">
-              <a:schemeClr val="phClr">
-                <a:tint val="50000"/>
-                <a:shade val="100000"/>
-                <a:satMod val="350000"/>
-              </a:schemeClr>
-            </a:gs>
-          </a:gsLst>
-          <a:lin ang="16200000" scaled="0"/>
-        </a:gradFill>
-      </a:fillStyleLst>
-      <a:lnStyleLst>
-        <a:ln w="9525" cap="flat" cmpd="sng" algn="ctr">
-          <a:solidFill>
-            <a:schemeClr val="phClr">
-              <a:shade val="95000"/>
-              <a:satMod val="105000"/>
-            </a:schemeClr>
-          </a:solidFill>
-          <a:prstDash val="solid"/>
-        </a:ln>
-        <a:ln w="25400" cap="flat" cmpd="sng" algn="ctr">
-          <a:solidFill>
-            <a:schemeClr val="phClr"/>
-          </a:solidFill>
-          <a:prstDash val="solid"/>
-        </a:ln>
-        <a:ln w="38100" cap="flat" cmpd="sng" algn="ctr">
-          <a:solidFill>
-            <a:schemeClr val="phClr"/>
-          </a:solidFill>
-          <a:prstDash val="solid"/>
-        </a:ln>
-      </a:lnStyleLst>
-      <a:effectStyleLst>
-        <a:effectStyle>
-          <a:effectLst>
-            <a:outerShdw blurRad="40000" dist="20000" dir="5400000" rotWithShape="0">
-              <a:srgbClr val="000000">
-                <a:alpha val="38000"/>
-              </a:srgbClr>
-            </a:outerShdw>
-          </a:effectLst>
-        </a:effectStyle>
-        <a:effectStyle>
-          <a:effectLst>
-            <a:outerShdw blurRad="40000" dist="23000" dir="5400000" rotWithShape="0">
-              <a:srgbClr val="000000">
-                <a:alpha val="35000"/>
-              </a:srgbClr>
-            </a:outerShdw>
-          </a:effectLst>
-        </a:effectStyle>
-        <a:effectStyle>
-          <a:effectLst>
-            <a:outerShdw blurRad="40000" dist="23000" dir="5400000" rotWithShape="0">
-              <a:srgbClr val="000000">
-                <a:alpha val="35000"/>
-              </a:srgbClr>
-            </a:outerShdw>
-          </a:effectLst>
-          <a:scene3d>
-            <a:camera prst="orthographicFront">
-              <a:rot lat="0" lon="0" rev="0"/>
-            </a:camera>
-            <a:lightRig rig="threePt" dir="t">
-              <a:rot lat="0" lon="0" rev="1200000"/>
-            </a:lightRig>
-          </a:scene3d>
-          <a:sp3d>
-            <a:bevelT w="63500" h="25400"/>
-          </a:sp3d>
-        </a:effectStyle>
-      </a:effectStyleLst>
-      <a:bgFillStyleLst>
-        <a:solidFill>
-          <a:schemeClr val="phClr"/>
-        </a:solidFill>
-        <a:gradFill rotWithShape="1">
-          <a:gsLst>
-            <a:gs pos="0">
-              <a:schemeClr val="phClr">
-                <a:tint val="40000"/>
-                <a:satMod val="350000"/>
-              </a:schemeClr>
-            </a:gs>
-            <a:gs pos="40000">
-              <a:schemeClr val="phClr">
-                <a:tint val="45000"/>
-                <a:shade val="99000"/>
-                <a:satMod val="350000"/>
-              </a:schemeClr>
-            </a:gs>
-            <a:gs pos="100000">
-              <a:schemeClr val="phClr">
-                <a:shade val="20000"/>
-                <a:satMod val="255000"/>
-              </a:schemeClr>
-            </a:gs>
-          </a:gsLst>
-          <a:path path="circle">
-            <a:fillToRect l="50000" t="-80000" r="50000" b="180000"/>
-          </a:path>
-        </a:gradFill>
-        <a:gradFill rotWithShape="1">
-          <a:gsLst>
-            <a:gs pos="0">
-              <a:schemeClr val="phClr">
-                <a:tint val="80000"/>
-                <a:satMod val="300000"/>
-              </a:schemeClr>
-            </a:gs>
-            <a:gs pos="100000">
-              <a:schemeClr val="phClr">
-                <a:shade val="30000"/>
-                <a:satMod val="200000"/>
-              </a:schemeClr>
-            </a:gs>
-          </a:gsLst>
-          <a:path path="circle">
-            <a:fillToRect l="50000" t="50000" r="50000" b="50000"/>
-          </a:path>
-        </a:gradFill>
-      </a:bgFillStyleLst>
-    </a:fmtScheme>
-  </a:themeElements>
-</a:theme>
 </file>
</xml_diff>